<commit_message>
feat: add difference and prefix sum.
</commit_message>
<xml_diff>
--- a/basic/figures.pptx
+++ b/basic/figures.pptx
@@ -3522,7 +3522,7 @@
                   <a:avLst/>
                 </a:prstGeom>
                 <a:blipFill>
-                  <a:blip r:embed="rId2"/>
+                  <a:blip r:embed="rId3"/>
                   <a:stretch>
                     <a:fillRect/>
                   </a:stretch>
@@ -3624,7 +3624,7 @@
                   <a:avLst/>
                 </a:prstGeom>
                 <a:blipFill>
-                  <a:blip r:embed="rId3"/>
+                  <a:blip r:embed="rId4"/>
                   <a:stretch>
                     <a:fillRect b="-5882"/>
                   </a:stretch>
@@ -3726,7 +3726,7 @@
                   <a:avLst/>
                 </a:prstGeom>
                 <a:blipFill>
-                  <a:blip r:embed="rId3"/>
+                  <a:blip r:embed="rId4"/>
                   <a:stretch>
                     <a:fillRect b="-5882"/>
                   </a:stretch>
@@ -3938,7 +3938,7 @@
                     <a:avLst/>
                   </a:prstGeom>
                   <a:blipFill>
-                    <a:blip r:embed="rId4"/>
+                    <a:blip r:embed="rId5"/>
                     <a:stretch>
                       <a:fillRect b="-5882"/>
                     </a:stretch>
@@ -4085,7 +4085,7 @@
                     <a:avLst/>
                   </a:prstGeom>
                   <a:blipFill>
-                    <a:blip r:embed="rId5"/>
+                    <a:blip r:embed="rId6"/>
                     <a:stretch>
                       <a:fillRect b="-8000"/>
                     </a:stretch>
@@ -4232,7 +4232,7 @@
                     <a:avLst/>
                   </a:prstGeom>
                   <a:blipFill>
-                    <a:blip r:embed="rId6"/>
+                    <a:blip r:embed="rId7"/>
                     <a:stretch>
                       <a:fillRect b="-8000"/>
                     </a:stretch>
@@ -4379,7 +4379,7 @@
                     <a:avLst/>
                   </a:prstGeom>
                   <a:blipFill>
-                    <a:blip r:embed="rId4"/>
+                    <a:blip r:embed="rId5"/>
                     <a:stretch>
                       <a:fillRect b="-5882"/>
                     </a:stretch>
@@ -4596,9 +4596,4009 @@
                   <a:avLst/>
                 </a:prstGeom>
                 <a:blipFill>
-                  <a:blip r:embed="rId7"/>
+                  <a:blip r:embed="rId8"/>
                   <a:stretch>
                     <a:fillRect b="-5882"/>
+                  </a:stretch>
+                </a:blipFill>
+              </p:spPr>
+              <p:txBody>
+                <a:bodyPr/>
+                <a:lstStyle/>
+                <a:p>
+                  <a:r>
+                    <a:rPr lang="en-US">
+                      <a:noFill/>
+                    </a:rPr>
+                    <a:t> </a:t>
+                  </a:r>
+                </a:p>
+              </p:txBody>
+            </p:sp>
+          </mc:Fallback>
+        </mc:AlternateContent>
+      </p:grpSp>
+      <p:grpSp>
+        <p:nvGrpSpPr>
+          <p:cNvPr id="82" name="Group 81">
+            <a:extLst>
+              <a:ext uri="{FF2B5EF4-FFF2-40B4-BE49-F238E27FC236}">
+                <a16:creationId xmlns:a16="http://schemas.microsoft.com/office/drawing/2014/main" id="{C326BF47-9974-EF8C-FB68-4D5B427658FA}"/>
+              </a:ext>
+            </a:extLst>
+          </p:cNvPr>
+          <p:cNvGrpSpPr/>
+          <p:nvPr/>
+        </p:nvGrpSpPr>
+        <p:grpSpPr>
+          <a:xfrm>
+            <a:off x="779507" y="2921881"/>
+            <a:ext cx="3273827" cy="3561978"/>
+            <a:chOff x="5633606" y="1336644"/>
+            <a:chExt cx="3273827" cy="3561978"/>
+          </a:xfrm>
+        </p:grpSpPr>
+        <p:sp>
+          <p:nvSpPr>
+            <p:cNvPr id="37" name="Rectangle 36">
+              <a:extLst>
+                <a:ext uri="{FF2B5EF4-FFF2-40B4-BE49-F238E27FC236}">
+                  <a16:creationId xmlns:a16="http://schemas.microsoft.com/office/drawing/2014/main" id="{AB1C15C8-FB32-28EB-3206-E078220F1707}"/>
+                </a:ext>
+              </a:extLst>
+            </p:cNvPr>
+            <p:cNvSpPr/>
+            <p:nvPr/>
+          </p:nvSpPr>
+          <p:spPr>
+            <a:xfrm>
+              <a:off x="6126480" y="3019510"/>
+              <a:ext cx="655320" cy="655320"/>
+            </a:xfrm>
+            <a:prstGeom prst="rect">
+              <a:avLst/>
+            </a:prstGeom>
+            <a:noFill/>
+            <a:ln>
+              <a:solidFill>
+                <a:schemeClr val="tx1"/>
+              </a:solidFill>
+            </a:ln>
+          </p:spPr>
+          <p:style>
+            <a:lnRef idx="2">
+              <a:schemeClr val="accent1">
+                <a:shade val="50000"/>
+              </a:schemeClr>
+            </a:lnRef>
+            <a:fillRef idx="1">
+              <a:schemeClr val="accent1"/>
+            </a:fillRef>
+            <a:effectRef idx="0">
+              <a:schemeClr val="accent1"/>
+            </a:effectRef>
+            <a:fontRef idx="minor">
+              <a:schemeClr val="lt1"/>
+            </a:fontRef>
+          </p:style>
+          <p:txBody>
+            <a:bodyPr rtlCol="0" anchor="ctr"/>
+            <a:lstStyle/>
+            <a:p>
+              <a:pPr algn="ctr"/>
+              <a:endParaRPr lang="en-US"/>
+            </a:p>
+          </p:txBody>
+        </p:sp>
+        <p:sp>
+          <p:nvSpPr>
+            <p:cNvPr id="15" name="Rectangle 14">
+              <a:extLst>
+                <a:ext uri="{FF2B5EF4-FFF2-40B4-BE49-F238E27FC236}">
+                  <a16:creationId xmlns:a16="http://schemas.microsoft.com/office/drawing/2014/main" id="{51DDAB30-8530-C1DF-8F53-449E1BCFA887}"/>
+                </a:ext>
+              </a:extLst>
+            </p:cNvPr>
+            <p:cNvSpPr/>
+            <p:nvPr/>
+          </p:nvSpPr>
+          <p:spPr>
+            <a:xfrm>
+              <a:off x="6126480" y="1708870"/>
+              <a:ext cx="655320" cy="655320"/>
+            </a:xfrm>
+            <a:prstGeom prst="rect">
+              <a:avLst/>
+            </a:prstGeom>
+            <a:noFill/>
+            <a:ln>
+              <a:solidFill>
+                <a:schemeClr val="tx1"/>
+              </a:solidFill>
+            </a:ln>
+          </p:spPr>
+          <p:style>
+            <a:lnRef idx="2">
+              <a:schemeClr val="accent1">
+                <a:shade val="50000"/>
+              </a:schemeClr>
+            </a:lnRef>
+            <a:fillRef idx="1">
+              <a:schemeClr val="accent1"/>
+            </a:fillRef>
+            <a:effectRef idx="0">
+              <a:schemeClr val="accent1"/>
+            </a:effectRef>
+            <a:fontRef idx="minor">
+              <a:schemeClr val="lt1"/>
+            </a:fontRef>
+          </p:style>
+          <p:txBody>
+            <a:bodyPr rtlCol="0" anchor="ctr"/>
+            <a:lstStyle/>
+            <a:p>
+              <a:pPr algn="ctr"/>
+              <a:endParaRPr lang="en-US"/>
+            </a:p>
+          </p:txBody>
+        </p:sp>
+        <p:sp>
+          <p:nvSpPr>
+            <p:cNvPr id="16" name="Rectangle 15">
+              <a:extLst>
+                <a:ext uri="{FF2B5EF4-FFF2-40B4-BE49-F238E27FC236}">
+                  <a16:creationId xmlns:a16="http://schemas.microsoft.com/office/drawing/2014/main" id="{7D54AE00-356B-92BD-1DCC-F27C22AD49D4}"/>
+                </a:ext>
+              </a:extLst>
+            </p:cNvPr>
+            <p:cNvSpPr/>
+            <p:nvPr/>
+          </p:nvSpPr>
+          <p:spPr>
+            <a:xfrm>
+              <a:off x="6781800" y="1708870"/>
+              <a:ext cx="655320" cy="655320"/>
+            </a:xfrm>
+            <a:prstGeom prst="rect">
+              <a:avLst/>
+            </a:prstGeom>
+            <a:noFill/>
+            <a:ln>
+              <a:solidFill>
+                <a:schemeClr val="tx1"/>
+              </a:solidFill>
+            </a:ln>
+          </p:spPr>
+          <p:style>
+            <a:lnRef idx="2">
+              <a:schemeClr val="accent1">
+                <a:shade val="50000"/>
+              </a:schemeClr>
+            </a:lnRef>
+            <a:fillRef idx="1">
+              <a:schemeClr val="accent1"/>
+            </a:fillRef>
+            <a:effectRef idx="0">
+              <a:schemeClr val="accent1"/>
+            </a:effectRef>
+            <a:fontRef idx="minor">
+              <a:schemeClr val="lt1"/>
+            </a:fontRef>
+          </p:style>
+          <p:txBody>
+            <a:bodyPr rtlCol="0" anchor="ctr"/>
+            <a:lstStyle/>
+            <a:p>
+              <a:pPr algn="ctr"/>
+              <a:endParaRPr lang="en-US"/>
+            </a:p>
+          </p:txBody>
+        </p:sp>
+        <p:sp>
+          <p:nvSpPr>
+            <p:cNvPr id="20" name="Rectangle 19">
+              <a:extLst>
+                <a:ext uri="{FF2B5EF4-FFF2-40B4-BE49-F238E27FC236}">
+                  <a16:creationId xmlns:a16="http://schemas.microsoft.com/office/drawing/2014/main" id="{5D505DF0-9C33-A587-6217-B4598F43D6EE}"/>
+                </a:ext>
+              </a:extLst>
+            </p:cNvPr>
+            <p:cNvSpPr/>
+            <p:nvPr/>
+          </p:nvSpPr>
+          <p:spPr>
+            <a:xfrm>
+              <a:off x="7438503" y="1708870"/>
+              <a:ext cx="655320" cy="655320"/>
+            </a:xfrm>
+            <a:prstGeom prst="rect">
+              <a:avLst/>
+            </a:prstGeom>
+            <a:noFill/>
+            <a:ln>
+              <a:solidFill>
+                <a:schemeClr val="tx1"/>
+              </a:solidFill>
+            </a:ln>
+          </p:spPr>
+          <p:style>
+            <a:lnRef idx="2">
+              <a:schemeClr val="accent1">
+                <a:shade val="50000"/>
+              </a:schemeClr>
+            </a:lnRef>
+            <a:fillRef idx="1">
+              <a:schemeClr val="accent1"/>
+            </a:fillRef>
+            <a:effectRef idx="0">
+              <a:schemeClr val="accent1"/>
+            </a:effectRef>
+            <a:fontRef idx="minor">
+              <a:schemeClr val="lt1"/>
+            </a:fontRef>
+          </p:style>
+          <p:txBody>
+            <a:bodyPr rtlCol="0" anchor="ctr"/>
+            <a:lstStyle/>
+            <a:p>
+              <a:pPr algn="ctr"/>
+              <a:endParaRPr lang="en-US"/>
+            </a:p>
+          </p:txBody>
+        </p:sp>
+        <p:sp>
+          <p:nvSpPr>
+            <p:cNvPr id="27" name="Rectangle 26">
+              <a:extLst>
+                <a:ext uri="{FF2B5EF4-FFF2-40B4-BE49-F238E27FC236}">
+                  <a16:creationId xmlns:a16="http://schemas.microsoft.com/office/drawing/2014/main" id="{60F97CC5-26C5-1322-DCB4-723F2E0037E6}"/>
+                </a:ext>
+              </a:extLst>
+            </p:cNvPr>
+            <p:cNvSpPr/>
+            <p:nvPr/>
+          </p:nvSpPr>
+          <p:spPr>
+            <a:xfrm>
+              <a:off x="8092440" y="1708870"/>
+              <a:ext cx="655320" cy="655320"/>
+            </a:xfrm>
+            <a:prstGeom prst="rect">
+              <a:avLst/>
+            </a:prstGeom>
+            <a:noFill/>
+            <a:ln>
+              <a:solidFill>
+                <a:schemeClr val="tx1"/>
+              </a:solidFill>
+            </a:ln>
+          </p:spPr>
+          <p:style>
+            <a:lnRef idx="2">
+              <a:schemeClr val="accent1">
+                <a:shade val="50000"/>
+              </a:schemeClr>
+            </a:lnRef>
+            <a:fillRef idx="1">
+              <a:schemeClr val="accent1"/>
+            </a:fillRef>
+            <a:effectRef idx="0">
+              <a:schemeClr val="accent1"/>
+            </a:effectRef>
+            <a:fontRef idx="minor">
+              <a:schemeClr val="lt1"/>
+            </a:fontRef>
+          </p:style>
+          <p:txBody>
+            <a:bodyPr rtlCol="0" anchor="ctr"/>
+            <a:lstStyle/>
+            <a:p>
+              <a:pPr algn="ctr"/>
+              <a:endParaRPr lang="en-US"/>
+            </a:p>
+          </p:txBody>
+        </p:sp>
+        <p:sp>
+          <p:nvSpPr>
+            <p:cNvPr id="78" name="Rectangle 77">
+              <a:extLst>
+                <a:ext uri="{FF2B5EF4-FFF2-40B4-BE49-F238E27FC236}">
+                  <a16:creationId xmlns:a16="http://schemas.microsoft.com/office/drawing/2014/main" id="{7D856BB6-0F03-694D-1C94-290276FDDD2A}"/>
+                </a:ext>
+              </a:extLst>
+            </p:cNvPr>
+            <p:cNvSpPr/>
+            <p:nvPr/>
+          </p:nvSpPr>
+          <p:spPr>
+            <a:xfrm>
+              <a:off x="6124405" y="1705090"/>
+              <a:ext cx="651227" cy="1961678"/>
+            </a:xfrm>
+            <a:prstGeom prst="rect">
+              <a:avLst/>
+            </a:prstGeom>
+            <a:solidFill>
+              <a:schemeClr val="accent4">
+                <a:lumMod val="20000"/>
+                <a:lumOff val="80000"/>
+                <a:alpha val="79000"/>
+              </a:schemeClr>
+            </a:solidFill>
+            <a:ln>
+              <a:noFill/>
+            </a:ln>
+          </p:spPr>
+          <p:style>
+            <a:lnRef idx="2">
+              <a:schemeClr val="accent1">
+                <a:shade val="50000"/>
+              </a:schemeClr>
+            </a:lnRef>
+            <a:fillRef idx="1">
+              <a:schemeClr val="accent1"/>
+            </a:fillRef>
+            <a:effectRef idx="0">
+              <a:schemeClr val="accent1"/>
+            </a:effectRef>
+            <a:fontRef idx="minor">
+              <a:schemeClr val="lt1"/>
+            </a:fontRef>
+          </p:style>
+          <p:txBody>
+            <a:bodyPr rtlCol="0" anchor="ctr"/>
+            <a:lstStyle/>
+            <a:p>
+              <a:pPr algn="ctr"/>
+              <a:endParaRPr lang="en-US"/>
+            </a:p>
+          </p:txBody>
+        </p:sp>
+        <p:sp>
+          <p:nvSpPr>
+            <p:cNvPr id="33" name="Rectangle 32">
+              <a:extLst>
+                <a:ext uri="{FF2B5EF4-FFF2-40B4-BE49-F238E27FC236}">
+                  <a16:creationId xmlns:a16="http://schemas.microsoft.com/office/drawing/2014/main" id="{3CC534CC-37F8-70BF-39A7-5973700296A6}"/>
+                </a:ext>
+              </a:extLst>
+            </p:cNvPr>
+            <p:cNvSpPr/>
+            <p:nvPr/>
+          </p:nvSpPr>
+          <p:spPr>
+            <a:xfrm>
+              <a:off x="6126480" y="2364190"/>
+              <a:ext cx="655320" cy="655320"/>
+            </a:xfrm>
+            <a:prstGeom prst="rect">
+              <a:avLst/>
+            </a:prstGeom>
+            <a:noFill/>
+            <a:ln>
+              <a:solidFill>
+                <a:schemeClr val="tx1"/>
+              </a:solidFill>
+            </a:ln>
+          </p:spPr>
+          <p:style>
+            <a:lnRef idx="2">
+              <a:schemeClr val="accent1">
+                <a:shade val="50000"/>
+              </a:schemeClr>
+            </a:lnRef>
+            <a:fillRef idx="1">
+              <a:schemeClr val="accent1"/>
+            </a:fillRef>
+            <a:effectRef idx="0">
+              <a:schemeClr val="accent1"/>
+            </a:effectRef>
+            <a:fontRef idx="minor">
+              <a:schemeClr val="lt1"/>
+            </a:fontRef>
+          </p:style>
+          <p:txBody>
+            <a:bodyPr rtlCol="0" anchor="ctr"/>
+            <a:lstStyle/>
+            <a:p>
+              <a:pPr algn="ctr"/>
+              <a:endParaRPr lang="en-US"/>
+            </a:p>
+          </p:txBody>
+        </p:sp>
+        <p:sp>
+          <p:nvSpPr>
+            <p:cNvPr id="34" name="Rectangle 33">
+              <a:extLst>
+                <a:ext uri="{FF2B5EF4-FFF2-40B4-BE49-F238E27FC236}">
+                  <a16:creationId xmlns:a16="http://schemas.microsoft.com/office/drawing/2014/main" id="{98475437-5042-AC88-2E3E-2458BAA65C6B}"/>
+                </a:ext>
+              </a:extLst>
+            </p:cNvPr>
+            <p:cNvSpPr/>
+            <p:nvPr/>
+          </p:nvSpPr>
+          <p:spPr>
+            <a:xfrm>
+              <a:off x="6781800" y="2364190"/>
+              <a:ext cx="655320" cy="655320"/>
+            </a:xfrm>
+            <a:prstGeom prst="rect">
+              <a:avLst/>
+            </a:prstGeom>
+            <a:noFill/>
+            <a:ln>
+              <a:solidFill>
+                <a:schemeClr val="tx1"/>
+              </a:solidFill>
+            </a:ln>
+          </p:spPr>
+          <p:style>
+            <a:lnRef idx="2">
+              <a:schemeClr val="accent1">
+                <a:shade val="50000"/>
+              </a:schemeClr>
+            </a:lnRef>
+            <a:fillRef idx="1">
+              <a:schemeClr val="accent1"/>
+            </a:fillRef>
+            <a:effectRef idx="0">
+              <a:schemeClr val="accent1"/>
+            </a:effectRef>
+            <a:fontRef idx="minor">
+              <a:schemeClr val="lt1"/>
+            </a:fontRef>
+          </p:style>
+          <p:txBody>
+            <a:bodyPr rtlCol="0" anchor="ctr"/>
+            <a:lstStyle/>
+            <a:p>
+              <a:pPr algn="ctr"/>
+              <a:endParaRPr lang="en-US"/>
+            </a:p>
+          </p:txBody>
+        </p:sp>
+        <p:sp>
+          <p:nvSpPr>
+            <p:cNvPr id="35" name="Rectangle 34">
+              <a:extLst>
+                <a:ext uri="{FF2B5EF4-FFF2-40B4-BE49-F238E27FC236}">
+                  <a16:creationId xmlns:a16="http://schemas.microsoft.com/office/drawing/2014/main" id="{B6358261-CD6F-59C8-71FA-1736074F912C}"/>
+                </a:ext>
+              </a:extLst>
+            </p:cNvPr>
+            <p:cNvSpPr/>
+            <p:nvPr/>
+          </p:nvSpPr>
+          <p:spPr>
+            <a:xfrm>
+              <a:off x="7438503" y="2364190"/>
+              <a:ext cx="655320" cy="655320"/>
+            </a:xfrm>
+            <a:prstGeom prst="rect">
+              <a:avLst/>
+            </a:prstGeom>
+            <a:noFill/>
+            <a:ln>
+              <a:solidFill>
+                <a:schemeClr val="tx1"/>
+              </a:solidFill>
+            </a:ln>
+          </p:spPr>
+          <p:style>
+            <a:lnRef idx="2">
+              <a:schemeClr val="accent1">
+                <a:shade val="50000"/>
+              </a:schemeClr>
+            </a:lnRef>
+            <a:fillRef idx="1">
+              <a:schemeClr val="accent1"/>
+            </a:fillRef>
+            <a:effectRef idx="0">
+              <a:schemeClr val="accent1"/>
+            </a:effectRef>
+            <a:fontRef idx="minor">
+              <a:schemeClr val="lt1"/>
+            </a:fontRef>
+          </p:style>
+          <p:txBody>
+            <a:bodyPr rtlCol="0" anchor="ctr"/>
+            <a:lstStyle/>
+            <a:p>
+              <a:pPr algn="ctr"/>
+              <a:endParaRPr lang="en-US"/>
+            </a:p>
+          </p:txBody>
+        </p:sp>
+        <p:sp>
+          <p:nvSpPr>
+            <p:cNvPr id="36" name="Rectangle 35">
+              <a:extLst>
+                <a:ext uri="{FF2B5EF4-FFF2-40B4-BE49-F238E27FC236}">
+                  <a16:creationId xmlns:a16="http://schemas.microsoft.com/office/drawing/2014/main" id="{D79001A0-8ECB-1B61-7607-20D8FD5494D1}"/>
+                </a:ext>
+              </a:extLst>
+            </p:cNvPr>
+            <p:cNvSpPr/>
+            <p:nvPr/>
+          </p:nvSpPr>
+          <p:spPr>
+            <a:xfrm>
+              <a:off x="8092440" y="2364190"/>
+              <a:ext cx="655320" cy="655320"/>
+            </a:xfrm>
+            <a:prstGeom prst="rect">
+              <a:avLst/>
+            </a:prstGeom>
+            <a:noFill/>
+            <a:ln>
+              <a:solidFill>
+                <a:schemeClr val="tx1"/>
+              </a:solidFill>
+            </a:ln>
+          </p:spPr>
+          <p:style>
+            <a:lnRef idx="2">
+              <a:schemeClr val="accent1">
+                <a:shade val="50000"/>
+              </a:schemeClr>
+            </a:lnRef>
+            <a:fillRef idx="1">
+              <a:schemeClr val="accent1"/>
+            </a:fillRef>
+            <a:effectRef idx="0">
+              <a:schemeClr val="accent1"/>
+            </a:effectRef>
+            <a:fontRef idx="minor">
+              <a:schemeClr val="lt1"/>
+            </a:fontRef>
+          </p:style>
+          <p:txBody>
+            <a:bodyPr rtlCol="0" anchor="ctr"/>
+            <a:lstStyle/>
+            <a:p>
+              <a:pPr algn="ctr"/>
+              <a:endParaRPr lang="en-US"/>
+            </a:p>
+          </p:txBody>
+        </p:sp>
+        <p:sp>
+          <p:nvSpPr>
+            <p:cNvPr id="77" name="Rectangle 76">
+              <a:extLst>
+                <a:ext uri="{FF2B5EF4-FFF2-40B4-BE49-F238E27FC236}">
+                  <a16:creationId xmlns:a16="http://schemas.microsoft.com/office/drawing/2014/main" id="{889AF9A3-9930-8679-1E4C-6B42B7D0F506}"/>
+                </a:ext>
+              </a:extLst>
+            </p:cNvPr>
+            <p:cNvSpPr/>
+            <p:nvPr/>
+          </p:nvSpPr>
+          <p:spPr>
+            <a:xfrm>
+              <a:off x="6125788" y="1716430"/>
+              <a:ext cx="1965270" cy="655320"/>
+            </a:xfrm>
+            <a:prstGeom prst="rect">
+              <a:avLst/>
+            </a:prstGeom>
+            <a:solidFill>
+              <a:schemeClr val="accent5">
+                <a:lumMod val="20000"/>
+                <a:lumOff val="80000"/>
+                <a:alpha val="65000"/>
+              </a:schemeClr>
+            </a:solidFill>
+            <a:ln>
+              <a:noFill/>
+            </a:ln>
+          </p:spPr>
+          <p:style>
+            <a:lnRef idx="2">
+              <a:schemeClr val="accent1">
+                <a:shade val="50000"/>
+              </a:schemeClr>
+            </a:lnRef>
+            <a:fillRef idx="1">
+              <a:schemeClr val="accent1"/>
+            </a:fillRef>
+            <a:effectRef idx="0">
+              <a:schemeClr val="accent1"/>
+            </a:effectRef>
+            <a:fontRef idx="minor">
+              <a:schemeClr val="lt1"/>
+            </a:fontRef>
+          </p:style>
+          <p:txBody>
+            <a:bodyPr rtlCol="0" anchor="ctr"/>
+            <a:lstStyle/>
+            <a:p>
+              <a:pPr algn="ctr"/>
+              <a:endParaRPr lang="en-US"/>
+            </a:p>
+          </p:txBody>
+        </p:sp>
+        <p:sp>
+          <p:nvSpPr>
+            <p:cNvPr id="38" name="Rectangle 37">
+              <a:extLst>
+                <a:ext uri="{FF2B5EF4-FFF2-40B4-BE49-F238E27FC236}">
+                  <a16:creationId xmlns:a16="http://schemas.microsoft.com/office/drawing/2014/main" id="{CFB31262-413F-EE38-1672-02B466F7DE5B}"/>
+                </a:ext>
+              </a:extLst>
+            </p:cNvPr>
+            <p:cNvSpPr/>
+            <p:nvPr/>
+          </p:nvSpPr>
+          <p:spPr>
+            <a:xfrm>
+              <a:off x="6781800" y="3019510"/>
+              <a:ext cx="655320" cy="655320"/>
+            </a:xfrm>
+            <a:prstGeom prst="rect">
+              <a:avLst/>
+            </a:prstGeom>
+            <a:noFill/>
+            <a:ln>
+              <a:solidFill>
+                <a:schemeClr val="tx1"/>
+              </a:solidFill>
+            </a:ln>
+          </p:spPr>
+          <p:style>
+            <a:lnRef idx="2">
+              <a:schemeClr val="accent1">
+                <a:shade val="50000"/>
+              </a:schemeClr>
+            </a:lnRef>
+            <a:fillRef idx="1">
+              <a:schemeClr val="accent1"/>
+            </a:fillRef>
+            <a:effectRef idx="0">
+              <a:schemeClr val="accent1"/>
+            </a:effectRef>
+            <a:fontRef idx="minor">
+              <a:schemeClr val="lt1"/>
+            </a:fontRef>
+          </p:style>
+          <p:txBody>
+            <a:bodyPr rtlCol="0" anchor="ctr"/>
+            <a:lstStyle/>
+            <a:p>
+              <a:pPr algn="ctr"/>
+              <a:endParaRPr lang="en-US"/>
+            </a:p>
+          </p:txBody>
+        </p:sp>
+        <p:sp>
+          <p:nvSpPr>
+            <p:cNvPr id="39" name="Rectangle 38">
+              <a:extLst>
+                <a:ext uri="{FF2B5EF4-FFF2-40B4-BE49-F238E27FC236}">
+                  <a16:creationId xmlns:a16="http://schemas.microsoft.com/office/drawing/2014/main" id="{F66CD7A5-BFA9-1190-B5E3-B871C9D5F0E7}"/>
+                </a:ext>
+              </a:extLst>
+            </p:cNvPr>
+            <p:cNvSpPr/>
+            <p:nvPr/>
+          </p:nvSpPr>
+          <p:spPr>
+            <a:xfrm>
+              <a:off x="7438503" y="3019510"/>
+              <a:ext cx="655320" cy="655320"/>
+            </a:xfrm>
+            <a:prstGeom prst="rect">
+              <a:avLst/>
+            </a:prstGeom>
+            <a:noFill/>
+            <a:ln>
+              <a:solidFill>
+                <a:schemeClr val="tx1"/>
+              </a:solidFill>
+            </a:ln>
+          </p:spPr>
+          <p:style>
+            <a:lnRef idx="2">
+              <a:schemeClr val="accent1">
+                <a:shade val="50000"/>
+              </a:schemeClr>
+            </a:lnRef>
+            <a:fillRef idx="1">
+              <a:schemeClr val="accent1"/>
+            </a:fillRef>
+            <a:effectRef idx="0">
+              <a:schemeClr val="accent1"/>
+            </a:effectRef>
+            <a:fontRef idx="minor">
+              <a:schemeClr val="lt1"/>
+            </a:fontRef>
+          </p:style>
+          <p:txBody>
+            <a:bodyPr rtlCol="0" anchor="ctr"/>
+            <a:lstStyle/>
+            <a:p>
+              <a:pPr algn="ctr"/>
+              <a:endParaRPr lang="en-US"/>
+            </a:p>
+          </p:txBody>
+        </p:sp>
+        <p:sp>
+          <p:nvSpPr>
+            <p:cNvPr id="40" name="Rectangle 39">
+              <a:extLst>
+                <a:ext uri="{FF2B5EF4-FFF2-40B4-BE49-F238E27FC236}">
+                  <a16:creationId xmlns:a16="http://schemas.microsoft.com/office/drawing/2014/main" id="{5A25F0A0-F53C-9AA7-074C-6C9B1DA73FD3}"/>
+                </a:ext>
+              </a:extLst>
+            </p:cNvPr>
+            <p:cNvSpPr/>
+            <p:nvPr/>
+          </p:nvSpPr>
+          <p:spPr>
+            <a:xfrm>
+              <a:off x="8092440" y="3019510"/>
+              <a:ext cx="655320" cy="655320"/>
+            </a:xfrm>
+            <a:prstGeom prst="rect">
+              <a:avLst/>
+            </a:prstGeom>
+            <a:noFill/>
+            <a:ln>
+              <a:solidFill>
+                <a:schemeClr val="tx1"/>
+              </a:solidFill>
+            </a:ln>
+          </p:spPr>
+          <p:style>
+            <a:lnRef idx="2">
+              <a:schemeClr val="accent1">
+                <a:shade val="50000"/>
+              </a:schemeClr>
+            </a:lnRef>
+            <a:fillRef idx="1">
+              <a:schemeClr val="accent1"/>
+            </a:fillRef>
+            <a:effectRef idx="0">
+              <a:schemeClr val="accent1"/>
+            </a:effectRef>
+            <a:fontRef idx="minor">
+              <a:schemeClr val="lt1"/>
+            </a:fontRef>
+          </p:style>
+          <p:txBody>
+            <a:bodyPr rtlCol="0" anchor="ctr"/>
+            <a:lstStyle/>
+            <a:p>
+              <a:pPr algn="ctr"/>
+              <a:endParaRPr lang="en-US"/>
+            </a:p>
+          </p:txBody>
+        </p:sp>
+        <p:sp>
+          <p:nvSpPr>
+            <p:cNvPr id="41" name="Rectangle 40">
+              <a:extLst>
+                <a:ext uri="{FF2B5EF4-FFF2-40B4-BE49-F238E27FC236}">
+                  <a16:creationId xmlns:a16="http://schemas.microsoft.com/office/drawing/2014/main" id="{29FB8E5E-D979-806F-6C5D-8823552E50EA}"/>
+                </a:ext>
+              </a:extLst>
+            </p:cNvPr>
+            <p:cNvSpPr/>
+            <p:nvPr/>
+          </p:nvSpPr>
+          <p:spPr>
+            <a:xfrm>
+              <a:off x="6126480" y="3674830"/>
+              <a:ext cx="655320" cy="655320"/>
+            </a:xfrm>
+            <a:prstGeom prst="rect">
+              <a:avLst/>
+            </a:prstGeom>
+            <a:noFill/>
+            <a:ln>
+              <a:solidFill>
+                <a:schemeClr val="tx1"/>
+              </a:solidFill>
+            </a:ln>
+          </p:spPr>
+          <p:style>
+            <a:lnRef idx="2">
+              <a:schemeClr val="accent1">
+                <a:shade val="50000"/>
+              </a:schemeClr>
+            </a:lnRef>
+            <a:fillRef idx="1">
+              <a:schemeClr val="accent1"/>
+            </a:fillRef>
+            <a:effectRef idx="0">
+              <a:schemeClr val="accent1"/>
+            </a:effectRef>
+            <a:fontRef idx="minor">
+              <a:schemeClr val="lt1"/>
+            </a:fontRef>
+          </p:style>
+          <p:txBody>
+            <a:bodyPr rtlCol="0" anchor="ctr"/>
+            <a:lstStyle/>
+            <a:p>
+              <a:pPr algn="ctr"/>
+              <a:endParaRPr lang="en-US"/>
+            </a:p>
+          </p:txBody>
+        </p:sp>
+        <p:sp>
+          <p:nvSpPr>
+            <p:cNvPr id="42" name="Rectangle 41">
+              <a:extLst>
+                <a:ext uri="{FF2B5EF4-FFF2-40B4-BE49-F238E27FC236}">
+                  <a16:creationId xmlns:a16="http://schemas.microsoft.com/office/drawing/2014/main" id="{B09B7A86-FD7E-4AB4-D1AF-656C15CD483F}"/>
+                </a:ext>
+              </a:extLst>
+            </p:cNvPr>
+            <p:cNvSpPr/>
+            <p:nvPr/>
+          </p:nvSpPr>
+          <p:spPr>
+            <a:xfrm>
+              <a:off x="6781800" y="3674830"/>
+              <a:ext cx="655320" cy="655320"/>
+            </a:xfrm>
+            <a:prstGeom prst="rect">
+              <a:avLst/>
+            </a:prstGeom>
+            <a:noFill/>
+            <a:ln>
+              <a:solidFill>
+                <a:schemeClr val="tx1"/>
+              </a:solidFill>
+            </a:ln>
+          </p:spPr>
+          <p:style>
+            <a:lnRef idx="2">
+              <a:schemeClr val="accent1">
+                <a:shade val="50000"/>
+              </a:schemeClr>
+            </a:lnRef>
+            <a:fillRef idx="1">
+              <a:schemeClr val="accent1"/>
+            </a:fillRef>
+            <a:effectRef idx="0">
+              <a:schemeClr val="accent1"/>
+            </a:effectRef>
+            <a:fontRef idx="minor">
+              <a:schemeClr val="lt1"/>
+            </a:fontRef>
+          </p:style>
+          <p:txBody>
+            <a:bodyPr rtlCol="0" anchor="ctr"/>
+            <a:lstStyle/>
+            <a:p>
+              <a:pPr algn="ctr"/>
+              <a:endParaRPr lang="en-US"/>
+            </a:p>
+          </p:txBody>
+        </p:sp>
+        <p:sp>
+          <p:nvSpPr>
+            <p:cNvPr id="43" name="Rectangle 42">
+              <a:extLst>
+                <a:ext uri="{FF2B5EF4-FFF2-40B4-BE49-F238E27FC236}">
+                  <a16:creationId xmlns:a16="http://schemas.microsoft.com/office/drawing/2014/main" id="{6BC047C0-309E-E758-0D37-6C6233B602AE}"/>
+                </a:ext>
+              </a:extLst>
+            </p:cNvPr>
+            <p:cNvSpPr/>
+            <p:nvPr/>
+          </p:nvSpPr>
+          <p:spPr>
+            <a:xfrm>
+              <a:off x="7438503" y="3674830"/>
+              <a:ext cx="655320" cy="655320"/>
+            </a:xfrm>
+            <a:prstGeom prst="rect">
+              <a:avLst/>
+            </a:prstGeom>
+            <a:noFill/>
+            <a:ln>
+              <a:solidFill>
+                <a:schemeClr val="tx1"/>
+              </a:solidFill>
+            </a:ln>
+          </p:spPr>
+          <p:style>
+            <a:lnRef idx="2">
+              <a:schemeClr val="accent1">
+                <a:shade val="50000"/>
+              </a:schemeClr>
+            </a:lnRef>
+            <a:fillRef idx="1">
+              <a:schemeClr val="accent1"/>
+            </a:fillRef>
+            <a:effectRef idx="0">
+              <a:schemeClr val="accent1"/>
+            </a:effectRef>
+            <a:fontRef idx="minor">
+              <a:schemeClr val="lt1"/>
+            </a:fontRef>
+          </p:style>
+          <p:txBody>
+            <a:bodyPr rtlCol="0" anchor="ctr"/>
+            <a:lstStyle/>
+            <a:p>
+              <a:pPr algn="ctr"/>
+              <a:endParaRPr lang="en-US"/>
+            </a:p>
+          </p:txBody>
+        </p:sp>
+        <p:sp>
+          <p:nvSpPr>
+            <p:cNvPr id="44" name="Rectangle 43">
+              <a:extLst>
+                <a:ext uri="{FF2B5EF4-FFF2-40B4-BE49-F238E27FC236}">
+                  <a16:creationId xmlns:a16="http://schemas.microsoft.com/office/drawing/2014/main" id="{BF0FFF30-62FF-16AF-40F7-92A913A10D1C}"/>
+                </a:ext>
+              </a:extLst>
+            </p:cNvPr>
+            <p:cNvSpPr/>
+            <p:nvPr/>
+          </p:nvSpPr>
+          <p:spPr>
+            <a:xfrm>
+              <a:off x="8092440" y="3674830"/>
+              <a:ext cx="655320" cy="655320"/>
+            </a:xfrm>
+            <a:prstGeom prst="rect">
+              <a:avLst/>
+            </a:prstGeom>
+            <a:noFill/>
+            <a:ln>
+              <a:solidFill>
+                <a:schemeClr val="tx1"/>
+              </a:solidFill>
+            </a:ln>
+          </p:spPr>
+          <p:style>
+            <a:lnRef idx="2">
+              <a:schemeClr val="accent1">
+                <a:shade val="50000"/>
+              </a:schemeClr>
+            </a:lnRef>
+            <a:fillRef idx="1">
+              <a:schemeClr val="accent1"/>
+            </a:fillRef>
+            <a:effectRef idx="0">
+              <a:schemeClr val="accent1"/>
+            </a:effectRef>
+            <a:fontRef idx="minor">
+              <a:schemeClr val="lt1"/>
+            </a:fontRef>
+          </p:style>
+          <p:txBody>
+            <a:bodyPr rtlCol="0" anchor="ctr"/>
+            <a:lstStyle/>
+            <a:p>
+              <a:pPr algn="ctr"/>
+              <a:endParaRPr lang="en-US"/>
+            </a:p>
+          </p:txBody>
+        </p:sp>
+        <p:sp>
+          <p:nvSpPr>
+            <p:cNvPr id="45" name="Rectangle 44">
+              <a:extLst>
+                <a:ext uri="{FF2B5EF4-FFF2-40B4-BE49-F238E27FC236}">
+                  <a16:creationId xmlns:a16="http://schemas.microsoft.com/office/drawing/2014/main" id="{4C5321E0-957E-8732-0C55-CDE01FADA4AE}"/>
+                </a:ext>
+              </a:extLst>
+            </p:cNvPr>
+            <p:cNvSpPr/>
+            <p:nvPr/>
+          </p:nvSpPr>
+          <p:spPr>
+            <a:xfrm>
+              <a:off x="6126479" y="1708870"/>
+              <a:ext cx="1965961" cy="1965960"/>
+            </a:xfrm>
+            <a:prstGeom prst="rect">
+              <a:avLst/>
+            </a:prstGeom>
+            <a:noFill/>
+            <a:ln w="28575">
+              <a:solidFill>
+                <a:srgbClr val="00B050"/>
+              </a:solidFill>
+            </a:ln>
+          </p:spPr>
+          <p:style>
+            <a:lnRef idx="2">
+              <a:schemeClr val="accent1">
+                <a:shade val="50000"/>
+              </a:schemeClr>
+            </a:lnRef>
+            <a:fillRef idx="1">
+              <a:schemeClr val="accent1"/>
+            </a:fillRef>
+            <a:effectRef idx="0">
+              <a:schemeClr val="accent1"/>
+            </a:effectRef>
+            <a:fontRef idx="minor">
+              <a:schemeClr val="lt1"/>
+            </a:fontRef>
+          </p:style>
+          <p:txBody>
+            <a:bodyPr rtlCol="0" anchor="ctr"/>
+            <a:lstStyle/>
+            <a:p>
+              <a:pPr algn="ctr"/>
+              <a:endParaRPr lang="en-US"/>
+            </a:p>
+          </p:txBody>
+        </p:sp>
+        <p:sp>
+          <p:nvSpPr>
+            <p:cNvPr id="46" name="Rectangle 45">
+              <a:extLst>
+                <a:ext uri="{FF2B5EF4-FFF2-40B4-BE49-F238E27FC236}">
+                  <a16:creationId xmlns:a16="http://schemas.microsoft.com/office/drawing/2014/main" id="{FA599B80-F75B-6A6D-08B6-E37A17E27EBC}"/>
+                </a:ext>
+              </a:extLst>
+            </p:cNvPr>
+            <p:cNvSpPr/>
+            <p:nvPr/>
+          </p:nvSpPr>
+          <p:spPr>
+            <a:xfrm>
+              <a:off x="6783182" y="2364190"/>
+              <a:ext cx="1307875" cy="1310640"/>
+            </a:xfrm>
+            <a:prstGeom prst="rect">
+              <a:avLst/>
+            </a:prstGeom>
+            <a:noFill/>
+            <a:ln w="28575">
+              <a:solidFill>
+                <a:schemeClr val="accent4"/>
+              </a:solidFill>
+            </a:ln>
+          </p:spPr>
+          <p:style>
+            <a:lnRef idx="2">
+              <a:schemeClr val="accent1">
+                <a:shade val="50000"/>
+              </a:schemeClr>
+            </a:lnRef>
+            <a:fillRef idx="1">
+              <a:schemeClr val="accent1"/>
+            </a:fillRef>
+            <a:effectRef idx="0">
+              <a:schemeClr val="accent1"/>
+            </a:effectRef>
+            <a:fontRef idx="minor">
+              <a:schemeClr val="lt1"/>
+            </a:fontRef>
+          </p:style>
+          <p:txBody>
+            <a:bodyPr rtlCol="0" anchor="ctr"/>
+            <a:lstStyle/>
+            <a:p>
+              <a:pPr algn="ctr"/>
+              <a:endParaRPr lang="en-US"/>
+            </a:p>
+          </p:txBody>
+        </p:sp>
+        <mc:AlternateContent xmlns:mc="http://schemas.openxmlformats.org/markup-compatibility/2006">
+          <mc:Choice xmlns:a14="http://schemas.microsoft.com/office/drawing/2010/main" Requires="a14">
+            <p:sp>
+              <p:nvSpPr>
+                <p:cNvPr id="47" name="TextBox 46">
+                  <a:extLst>
+                    <a:ext uri="{FF2B5EF4-FFF2-40B4-BE49-F238E27FC236}">
+                      <a16:creationId xmlns:a16="http://schemas.microsoft.com/office/drawing/2014/main" id="{E663ACA6-318B-6FD5-1C2B-9DCF372649BB}"/>
+                    </a:ext>
+                  </a:extLst>
+                </p:cNvPr>
+                <p:cNvSpPr txBox="1"/>
+                <p:nvPr/>
+              </p:nvSpPr>
+              <p:spPr>
+                <a:xfrm>
+                  <a:off x="7518343" y="3201050"/>
+                  <a:ext cx="491490" cy="276999"/>
+                </a:xfrm>
+                <a:prstGeom prst="rect">
+                  <a:avLst/>
+                </a:prstGeom>
+                <a:noFill/>
+              </p:spPr>
+              <p:txBody>
+                <a:bodyPr wrap="square" rtlCol="0">
+                  <a:spAutoFit/>
+                </a:bodyPr>
+                <a:lstStyle/>
+                <a:p>
+                  <a:pPr/>
+                  <a14:m>
+                    <m:oMathPara xmlns:m="http://schemas.openxmlformats.org/officeDocument/2006/math">
+                      <m:oMathParaPr>
+                        <m:jc m:val="left"/>
+                      </m:oMathParaPr>
+                      <m:oMath xmlns:m="http://schemas.openxmlformats.org/officeDocument/2006/math">
+                        <m:r>
+                          <a:rPr lang="en-US" sz="1200" b="0" i="1" smtClean="0">
+                            <a:latin typeface="Cambria Math" panose="02040503050406030204" pitchFamily="18" charset="0"/>
+                          </a:rPr>
+                          <m:t>(3,3)</m:t>
+                        </m:r>
+                      </m:oMath>
+                    </m:oMathPara>
+                  </a14:m>
+                  <a:endParaRPr lang="en-US" sz="1200" dirty="0"/>
+                </a:p>
+              </p:txBody>
+            </p:sp>
+          </mc:Choice>
+          <mc:Fallback>
+            <p:sp>
+              <p:nvSpPr>
+                <p:cNvPr id="47" name="TextBox 46">
+                  <a:extLst>
+                    <a:ext uri="{FF2B5EF4-FFF2-40B4-BE49-F238E27FC236}">
+                      <a16:creationId xmlns:a16="http://schemas.microsoft.com/office/drawing/2014/main" id="{E663ACA6-318B-6FD5-1C2B-9DCF372649BB}"/>
+                    </a:ext>
+                  </a:extLst>
+                </p:cNvPr>
+                <p:cNvSpPr txBox="1">
+                  <a:spLocks noRot="1" noChangeAspect="1" noMove="1" noResize="1" noEditPoints="1" noAdjustHandles="1" noChangeArrowheads="1" noChangeShapeType="1" noTextEdit="1"/>
+                </p:cNvSpPr>
+                <p:nvPr/>
+              </p:nvSpPr>
+              <p:spPr>
+                <a:xfrm>
+                  <a:off x="7518343" y="3201050"/>
+                  <a:ext cx="491490" cy="276999"/>
+                </a:xfrm>
+                <a:prstGeom prst="rect">
+                  <a:avLst/>
+                </a:prstGeom>
+                <a:blipFill>
+                  <a:blip r:embed="rId9"/>
+                  <a:stretch>
+                    <a:fillRect b="-6522"/>
+                  </a:stretch>
+                </a:blipFill>
+              </p:spPr>
+              <p:txBody>
+                <a:bodyPr/>
+                <a:lstStyle/>
+                <a:p>
+                  <a:r>
+                    <a:rPr lang="en-US">
+                      <a:noFill/>
+                    </a:rPr>
+                    <a:t> </a:t>
+                  </a:r>
+                </a:p>
+              </p:txBody>
+            </p:sp>
+          </mc:Fallback>
+        </mc:AlternateContent>
+        <mc:AlternateContent xmlns:mc="http://schemas.openxmlformats.org/markup-compatibility/2006">
+          <mc:Choice xmlns:a14="http://schemas.microsoft.com/office/drawing/2010/main" Requires="a14">
+            <p:sp>
+              <p:nvSpPr>
+                <p:cNvPr id="75" name="TextBox 74">
+                  <a:extLst>
+                    <a:ext uri="{FF2B5EF4-FFF2-40B4-BE49-F238E27FC236}">
+                      <a16:creationId xmlns:a16="http://schemas.microsoft.com/office/drawing/2014/main" id="{081C9232-CE36-5B3A-92D8-3E980C78C024}"/>
+                    </a:ext>
+                  </a:extLst>
+                </p:cNvPr>
+                <p:cNvSpPr txBox="1"/>
+                <p:nvPr/>
+              </p:nvSpPr>
+              <p:spPr>
+                <a:xfrm>
+                  <a:off x="6208395" y="1898031"/>
+                  <a:ext cx="491490" cy="276999"/>
+                </a:xfrm>
+                <a:prstGeom prst="rect">
+                  <a:avLst/>
+                </a:prstGeom>
+                <a:noFill/>
+              </p:spPr>
+              <p:txBody>
+                <a:bodyPr wrap="square" rtlCol="0">
+                  <a:spAutoFit/>
+                </a:bodyPr>
+                <a:lstStyle/>
+                <a:p>
+                  <a:pPr/>
+                  <a14:m>
+                    <m:oMathPara xmlns:m="http://schemas.openxmlformats.org/officeDocument/2006/math">
+                      <m:oMathParaPr>
+                        <m:jc m:val="center"/>
+                      </m:oMathParaPr>
+                      <m:oMath xmlns:m="http://schemas.openxmlformats.org/officeDocument/2006/math">
+                        <m:r>
+                          <a:rPr lang="en-US" sz="1200" b="0" i="1" smtClean="0">
+                            <a:latin typeface="Cambria Math" panose="02040503050406030204" pitchFamily="18" charset="0"/>
+                          </a:rPr>
+                          <m:t>(1,1)</m:t>
+                        </m:r>
+                      </m:oMath>
+                    </m:oMathPara>
+                  </a14:m>
+                  <a:endParaRPr lang="en-US" sz="1200" dirty="0"/>
+                </a:p>
+              </p:txBody>
+            </p:sp>
+          </mc:Choice>
+          <mc:Fallback>
+            <p:sp>
+              <p:nvSpPr>
+                <p:cNvPr id="75" name="TextBox 74">
+                  <a:extLst>
+                    <a:ext uri="{FF2B5EF4-FFF2-40B4-BE49-F238E27FC236}">
+                      <a16:creationId xmlns:a16="http://schemas.microsoft.com/office/drawing/2014/main" id="{081C9232-CE36-5B3A-92D8-3E980C78C024}"/>
+                    </a:ext>
+                  </a:extLst>
+                </p:cNvPr>
+                <p:cNvSpPr txBox="1">
+                  <a:spLocks noRot="1" noChangeAspect="1" noMove="1" noResize="1" noEditPoints="1" noAdjustHandles="1" noChangeArrowheads="1" noChangeShapeType="1" noTextEdit="1"/>
+                </p:cNvSpPr>
+                <p:nvPr/>
+              </p:nvSpPr>
+              <p:spPr>
+                <a:xfrm>
+                  <a:off x="6208395" y="1898031"/>
+                  <a:ext cx="491490" cy="276999"/>
+                </a:xfrm>
+                <a:prstGeom prst="rect">
+                  <a:avLst/>
+                </a:prstGeom>
+                <a:blipFill>
+                  <a:blip r:embed="rId10"/>
+                  <a:stretch>
+                    <a:fillRect b="-6522"/>
+                  </a:stretch>
+                </a:blipFill>
+              </p:spPr>
+              <p:txBody>
+                <a:bodyPr/>
+                <a:lstStyle/>
+                <a:p>
+                  <a:r>
+                    <a:rPr lang="en-US">
+                      <a:noFill/>
+                    </a:rPr>
+                    <a:t> </a:t>
+                  </a:r>
+                </a:p>
+              </p:txBody>
+            </p:sp>
+          </mc:Fallback>
+        </mc:AlternateContent>
+        <mc:AlternateContent xmlns:mc="http://schemas.openxmlformats.org/markup-compatibility/2006">
+          <mc:Choice xmlns:a14="http://schemas.microsoft.com/office/drawing/2010/main" Requires="a14">
+            <p:sp>
+              <p:nvSpPr>
+                <p:cNvPr id="76" name="TextBox 75">
+                  <a:extLst>
+                    <a:ext uri="{FF2B5EF4-FFF2-40B4-BE49-F238E27FC236}">
+                      <a16:creationId xmlns:a16="http://schemas.microsoft.com/office/drawing/2014/main" id="{A227F898-1171-1D6C-7029-932E40855FE8}"/>
+                    </a:ext>
+                  </a:extLst>
+                </p:cNvPr>
+                <p:cNvSpPr txBox="1"/>
+                <p:nvPr/>
+              </p:nvSpPr>
+              <p:spPr>
+                <a:xfrm>
+                  <a:off x="6863714" y="2553350"/>
+                  <a:ext cx="491490" cy="276999"/>
+                </a:xfrm>
+                <a:prstGeom prst="rect">
+                  <a:avLst/>
+                </a:prstGeom>
+                <a:noFill/>
+              </p:spPr>
+              <p:txBody>
+                <a:bodyPr wrap="square" rtlCol="0">
+                  <a:spAutoFit/>
+                </a:bodyPr>
+                <a:lstStyle/>
+                <a:p>
+                  <a:pPr/>
+                  <a14:m>
+                    <m:oMathPara xmlns:m="http://schemas.openxmlformats.org/officeDocument/2006/math">
+                      <m:oMathParaPr>
+                        <m:jc m:val="center"/>
+                      </m:oMathParaPr>
+                      <m:oMath xmlns:m="http://schemas.openxmlformats.org/officeDocument/2006/math">
+                        <m:r>
+                          <a:rPr lang="en-US" sz="1200" b="0" i="1" smtClean="0">
+                            <a:latin typeface="Cambria Math" panose="02040503050406030204" pitchFamily="18" charset="0"/>
+                          </a:rPr>
+                          <m:t>(2,2)</m:t>
+                        </m:r>
+                      </m:oMath>
+                    </m:oMathPara>
+                  </a14:m>
+                  <a:endParaRPr lang="en-US" sz="1200" dirty="0"/>
+                </a:p>
+              </p:txBody>
+            </p:sp>
+          </mc:Choice>
+          <mc:Fallback>
+            <p:sp>
+              <p:nvSpPr>
+                <p:cNvPr id="76" name="TextBox 75">
+                  <a:extLst>
+                    <a:ext uri="{FF2B5EF4-FFF2-40B4-BE49-F238E27FC236}">
+                      <a16:creationId xmlns:a16="http://schemas.microsoft.com/office/drawing/2014/main" id="{A227F898-1171-1D6C-7029-932E40855FE8}"/>
+                    </a:ext>
+                  </a:extLst>
+                </p:cNvPr>
+                <p:cNvSpPr txBox="1">
+                  <a:spLocks noRot="1" noChangeAspect="1" noMove="1" noResize="1" noEditPoints="1" noAdjustHandles="1" noChangeArrowheads="1" noChangeShapeType="1" noTextEdit="1"/>
+                </p:cNvSpPr>
+                <p:nvPr/>
+              </p:nvSpPr>
+              <p:spPr>
+                <a:xfrm>
+                  <a:off x="6863714" y="2553350"/>
+                  <a:ext cx="491490" cy="276999"/>
+                </a:xfrm>
+                <a:prstGeom prst="rect">
+                  <a:avLst/>
+                </a:prstGeom>
+                <a:blipFill>
+                  <a:blip r:embed="rId11"/>
+                  <a:stretch>
+                    <a:fillRect b="-8889"/>
+                  </a:stretch>
+                </a:blipFill>
+              </p:spPr>
+              <p:txBody>
+                <a:bodyPr/>
+                <a:lstStyle/>
+                <a:p>
+                  <a:r>
+                    <a:rPr lang="en-US">
+                      <a:noFill/>
+                    </a:rPr>
+                    <a:t> </a:t>
+                  </a:r>
+                </a:p>
+              </p:txBody>
+            </p:sp>
+          </mc:Fallback>
+        </mc:AlternateContent>
+        <mc:AlternateContent xmlns:mc="http://schemas.openxmlformats.org/markup-compatibility/2006">
+          <mc:Choice xmlns:a14="http://schemas.microsoft.com/office/drawing/2010/main" Requires="a14">
+            <p:sp>
+              <p:nvSpPr>
+                <p:cNvPr id="79" name="TextBox 78">
+                  <a:extLst>
+                    <a:ext uri="{FF2B5EF4-FFF2-40B4-BE49-F238E27FC236}">
+                      <a16:creationId xmlns:a16="http://schemas.microsoft.com/office/drawing/2014/main" id="{4889A60A-913A-8D6A-1DEB-E4C44DD1A41C}"/>
+                    </a:ext>
+                  </a:extLst>
+                </p:cNvPr>
+                <p:cNvSpPr txBox="1"/>
+                <p:nvPr/>
+              </p:nvSpPr>
+              <p:spPr>
+                <a:xfrm>
+                  <a:off x="5633606" y="2560910"/>
+                  <a:ext cx="491490" cy="285206"/>
+                </a:xfrm>
+                <a:prstGeom prst="rect">
+                  <a:avLst/>
+                </a:prstGeom>
+                <a:noFill/>
+              </p:spPr>
+              <p:txBody>
+                <a:bodyPr wrap="square" rtlCol="0">
+                  <a:spAutoFit/>
+                </a:bodyPr>
+                <a:lstStyle/>
+                <a:p>
+                  <a:pPr/>
+                  <a14:m>
+                    <m:oMathPara xmlns:m="http://schemas.openxmlformats.org/officeDocument/2006/math">
+                      <m:oMathParaPr>
+                        <m:jc m:val="center"/>
+                      </m:oMathParaPr>
+                      <m:oMath xmlns:m="http://schemas.openxmlformats.org/officeDocument/2006/math">
+                        <m:sSub>
+                          <m:sSubPr>
+                            <m:ctrlPr>
+                              <a:rPr lang="en-US" sz="1200" b="0" i="1" smtClean="0">
+                                <a:latin typeface="Cambria Math" panose="02040503050406030204" pitchFamily="18" charset="0"/>
+                              </a:rPr>
+                            </m:ctrlPr>
+                          </m:sSubPr>
+                          <m:e>
+                            <m:r>
+                              <a:rPr lang="en-US" sz="1200" b="0" i="1" smtClean="0">
+                                <a:latin typeface="Cambria Math" panose="02040503050406030204" pitchFamily="18" charset="0"/>
+                              </a:rPr>
+                              <m:t>𝑆</m:t>
+                            </m:r>
+                          </m:e>
+                          <m:sub>
+                            <m:r>
+                              <a:rPr lang="en-US" sz="1200" b="0" i="1" smtClean="0">
+                                <a:latin typeface="Cambria Math" panose="02040503050406030204" pitchFamily="18" charset="0"/>
+                              </a:rPr>
+                              <m:t>3,1</m:t>
+                            </m:r>
+                          </m:sub>
+                        </m:sSub>
+                      </m:oMath>
+                    </m:oMathPara>
+                  </a14:m>
+                  <a:endParaRPr lang="en-US" sz="1200" dirty="0"/>
+                </a:p>
+              </p:txBody>
+            </p:sp>
+          </mc:Choice>
+          <mc:Fallback>
+            <p:sp>
+              <p:nvSpPr>
+                <p:cNvPr id="79" name="TextBox 78">
+                  <a:extLst>
+                    <a:ext uri="{FF2B5EF4-FFF2-40B4-BE49-F238E27FC236}">
+                      <a16:creationId xmlns:a16="http://schemas.microsoft.com/office/drawing/2014/main" id="{4889A60A-913A-8D6A-1DEB-E4C44DD1A41C}"/>
+                    </a:ext>
+                  </a:extLst>
+                </p:cNvPr>
+                <p:cNvSpPr txBox="1">
+                  <a:spLocks noRot="1" noChangeAspect="1" noMove="1" noResize="1" noEditPoints="1" noAdjustHandles="1" noChangeArrowheads="1" noChangeShapeType="1" noTextEdit="1"/>
+                </p:cNvSpPr>
+                <p:nvPr/>
+              </p:nvSpPr>
+              <p:spPr>
+                <a:xfrm>
+                  <a:off x="5633606" y="2560910"/>
+                  <a:ext cx="491490" cy="285206"/>
+                </a:xfrm>
+                <a:prstGeom prst="rect">
+                  <a:avLst/>
+                </a:prstGeom>
+                <a:blipFill>
+                  <a:blip r:embed="rId12"/>
+                  <a:stretch>
+                    <a:fillRect/>
+                  </a:stretch>
+                </a:blipFill>
+              </p:spPr>
+              <p:txBody>
+                <a:bodyPr/>
+                <a:lstStyle/>
+                <a:p>
+                  <a:r>
+                    <a:rPr lang="en-US">
+                      <a:noFill/>
+                    </a:rPr>
+                    <a:t> </a:t>
+                  </a:r>
+                </a:p>
+              </p:txBody>
+            </p:sp>
+          </mc:Fallback>
+        </mc:AlternateContent>
+        <mc:AlternateContent xmlns:mc="http://schemas.openxmlformats.org/markup-compatibility/2006">
+          <mc:Choice xmlns:a14="http://schemas.microsoft.com/office/drawing/2010/main" Requires="a14">
+            <p:sp>
+              <p:nvSpPr>
+                <p:cNvPr id="80" name="TextBox 79">
+                  <a:extLst>
+                    <a:ext uri="{FF2B5EF4-FFF2-40B4-BE49-F238E27FC236}">
+                      <a16:creationId xmlns:a16="http://schemas.microsoft.com/office/drawing/2014/main" id="{123134EB-EEF5-5EDB-8B71-FC9D04E78BAB}"/>
+                    </a:ext>
+                  </a:extLst>
+                </p:cNvPr>
+                <p:cNvSpPr txBox="1"/>
+                <p:nvPr/>
+              </p:nvSpPr>
+              <p:spPr>
+                <a:xfrm>
+                  <a:off x="6850380" y="1336644"/>
+                  <a:ext cx="491490" cy="285206"/>
+                </a:xfrm>
+                <a:prstGeom prst="rect">
+                  <a:avLst/>
+                </a:prstGeom>
+                <a:noFill/>
+              </p:spPr>
+              <p:txBody>
+                <a:bodyPr wrap="square" rtlCol="0">
+                  <a:spAutoFit/>
+                </a:bodyPr>
+                <a:lstStyle/>
+                <a:p>
+                  <a:pPr/>
+                  <a14:m>
+                    <m:oMathPara xmlns:m="http://schemas.openxmlformats.org/officeDocument/2006/math">
+                      <m:oMathParaPr>
+                        <m:jc m:val="center"/>
+                      </m:oMathParaPr>
+                      <m:oMath xmlns:m="http://schemas.openxmlformats.org/officeDocument/2006/math">
+                        <m:sSub>
+                          <m:sSubPr>
+                            <m:ctrlPr>
+                              <a:rPr lang="en-US" sz="1200" b="0" i="1" smtClean="0">
+                                <a:latin typeface="Cambria Math" panose="02040503050406030204" pitchFamily="18" charset="0"/>
+                              </a:rPr>
+                            </m:ctrlPr>
+                          </m:sSubPr>
+                          <m:e>
+                            <m:r>
+                              <a:rPr lang="en-US" sz="1200" b="0" i="1" smtClean="0">
+                                <a:latin typeface="Cambria Math" panose="02040503050406030204" pitchFamily="18" charset="0"/>
+                              </a:rPr>
+                              <m:t>𝑆</m:t>
+                            </m:r>
+                          </m:e>
+                          <m:sub>
+                            <m:r>
+                              <a:rPr lang="en-US" sz="1200" b="0" i="1" smtClean="0">
+                                <a:latin typeface="Cambria Math" panose="02040503050406030204" pitchFamily="18" charset="0"/>
+                              </a:rPr>
+                              <m:t>1,3</m:t>
+                            </m:r>
+                          </m:sub>
+                        </m:sSub>
+                      </m:oMath>
+                    </m:oMathPara>
+                  </a14:m>
+                  <a:endParaRPr lang="en-US" sz="1200" dirty="0"/>
+                </a:p>
+              </p:txBody>
+            </p:sp>
+          </mc:Choice>
+          <mc:Fallback>
+            <p:sp>
+              <p:nvSpPr>
+                <p:cNvPr id="80" name="TextBox 79">
+                  <a:extLst>
+                    <a:ext uri="{FF2B5EF4-FFF2-40B4-BE49-F238E27FC236}">
+                      <a16:creationId xmlns:a16="http://schemas.microsoft.com/office/drawing/2014/main" id="{123134EB-EEF5-5EDB-8B71-FC9D04E78BAB}"/>
+                    </a:ext>
+                  </a:extLst>
+                </p:cNvPr>
+                <p:cNvSpPr txBox="1">
+                  <a:spLocks noRot="1" noChangeAspect="1" noMove="1" noResize="1" noEditPoints="1" noAdjustHandles="1" noChangeArrowheads="1" noChangeShapeType="1" noTextEdit="1"/>
+                </p:cNvSpPr>
+                <p:nvPr/>
+              </p:nvSpPr>
+              <p:spPr>
+                <a:xfrm>
+                  <a:off x="6850380" y="1336644"/>
+                  <a:ext cx="491490" cy="285206"/>
+                </a:xfrm>
+                <a:prstGeom prst="rect">
+                  <a:avLst/>
+                </a:prstGeom>
+                <a:blipFill>
+                  <a:blip r:embed="rId13"/>
+                  <a:stretch>
+                    <a:fillRect/>
+                  </a:stretch>
+                </a:blipFill>
+              </p:spPr>
+              <p:txBody>
+                <a:bodyPr/>
+                <a:lstStyle/>
+                <a:p>
+                  <a:r>
+                    <a:rPr lang="en-US">
+                      <a:noFill/>
+                    </a:rPr>
+                    <a:t> </a:t>
+                  </a:r>
+                </a:p>
+              </p:txBody>
+            </p:sp>
+          </mc:Fallback>
+        </mc:AlternateContent>
+        <mc:AlternateContent xmlns:mc="http://schemas.openxmlformats.org/markup-compatibility/2006">
+          <mc:Choice xmlns:a14="http://schemas.microsoft.com/office/drawing/2010/main" Requires="a14">
+            <p:sp>
+              <p:nvSpPr>
+                <p:cNvPr id="81" name="TextBox 80">
+                  <a:extLst>
+                    <a:ext uri="{FF2B5EF4-FFF2-40B4-BE49-F238E27FC236}">
+                      <a16:creationId xmlns:a16="http://schemas.microsoft.com/office/drawing/2014/main" id="{3ACEEC86-6493-FA7B-91B1-DC983FB476BB}"/>
+                    </a:ext>
+                  </a:extLst>
+                </p:cNvPr>
+                <p:cNvSpPr txBox="1"/>
+                <p:nvPr/>
+              </p:nvSpPr>
+              <p:spPr>
+                <a:xfrm>
+                  <a:off x="5966805" y="4338212"/>
+                  <a:ext cx="2940628" cy="560410"/>
+                </a:xfrm>
+                <a:prstGeom prst="rect">
+                  <a:avLst/>
+                </a:prstGeom>
+                <a:noFill/>
+              </p:spPr>
+              <p:txBody>
+                <a:bodyPr wrap="square" rtlCol="0">
+                  <a:spAutoFit/>
+                </a:bodyPr>
+                <a:lstStyle/>
+                <a:p>
+                  <a:pPr/>
+                  <a14:m>
+                    <m:oMathPara xmlns:m="http://schemas.openxmlformats.org/officeDocument/2006/math">
+                      <m:oMathParaPr>
+                        <m:jc m:val="center"/>
+                      </m:oMathParaPr>
+                      <m:oMath xmlns:m="http://schemas.openxmlformats.org/officeDocument/2006/math">
+                        <m:nary>
+                          <m:naryPr>
+                            <m:chr m:val="∑"/>
+                            <m:supHide m:val="on"/>
+                            <m:ctrlPr>
+                              <a:rPr lang="en-US" sz="1200" b="0" i="1" smtClean="0">
+                                <a:latin typeface="Cambria Math" panose="02040503050406030204" pitchFamily="18" charset="0"/>
+                              </a:rPr>
+                            </m:ctrlPr>
+                          </m:naryPr>
+                          <m:sub>
+                            <m:d>
+                              <m:dPr>
+                                <m:ctrlPr>
+                                  <a:rPr lang="en-US" sz="1200" b="0" i="1" smtClean="0">
+                                    <a:latin typeface="Cambria Math" panose="02040503050406030204" pitchFamily="18" charset="0"/>
+                                  </a:rPr>
+                                </m:ctrlPr>
+                              </m:dPr>
+                              <m:e>
+                                <m:r>
+                                  <a:rPr lang="en-US" sz="1200" b="0" i="1" smtClean="0">
+                                    <a:latin typeface="Cambria Math" panose="02040503050406030204" pitchFamily="18" charset="0"/>
+                                  </a:rPr>
+                                  <m:t>2,2</m:t>
+                                </m:r>
+                              </m:e>
+                            </m:d>
+                            <m:r>
+                              <a:rPr lang="en-US" sz="1200" b="0" i="1" smtClean="0">
+                                <a:latin typeface="Cambria Math" panose="02040503050406030204" pitchFamily="18" charset="0"/>
+                              </a:rPr>
+                              <m:t>→</m:t>
+                            </m:r>
+                            <m:d>
+                              <m:dPr>
+                                <m:ctrlPr>
+                                  <a:rPr lang="en-US" sz="1200" b="0" i="1" smtClean="0">
+                                    <a:latin typeface="Cambria Math" panose="02040503050406030204" pitchFamily="18" charset="0"/>
+                                  </a:rPr>
+                                </m:ctrlPr>
+                              </m:dPr>
+                              <m:e>
+                                <m:r>
+                                  <a:rPr lang="en-US" sz="1200" b="0" i="1" smtClean="0">
+                                    <a:latin typeface="Cambria Math" panose="02040503050406030204" pitchFamily="18" charset="0"/>
+                                  </a:rPr>
+                                  <m:t>3,3</m:t>
+                                </m:r>
+                              </m:e>
+                            </m:d>
+                          </m:sub>
+                          <m:sup/>
+                          <m:e>
+                            <m:sSub>
+                              <m:sSubPr>
+                                <m:ctrlPr>
+                                  <a:rPr lang="en-US" sz="1200" b="0" i="1" smtClean="0">
+                                    <a:latin typeface="Cambria Math" panose="02040503050406030204" pitchFamily="18" charset="0"/>
+                                  </a:rPr>
+                                </m:ctrlPr>
+                              </m:sSubPr>
+                              <m:e>
+                                <m:r>
+                                  <a:rPr lang="en-US" sz="1200" b="0" i="1" smtClean="0">
+                                    <a:latin typeface="Cambria Math" panose="02040503050406030204" pitchFamily="18" charset="0"/>
+                                  </a:rPr>
+                                  <m:t>𝑆</m:t>
+                                </m:r>
+                              </m:e>
+                              <m:sub>
+                                <m:d>
+                                  <m:dPr>
+                                    <m:ctrlPr>
+                                      <a:rPr lang="en-US" sz="1200" b="0" i="1" smtClean="0">
+                                        <a:latin typeface="Cambria Math" panose="02040503050406030204" pitchFamily="18" charset="0"/>
+                                      </a:rPr>
+                                    </m:ctrlPr>
+                                  </m:dPr>
+                                  <m:e>
+                                    <m:r>
+                                      <a:rPr lang="en-US" sz="1200" b="0" i="1" smtClean="0">
+                                        <a:latin typeface="Cambria Math" panose="02040503050406030204" pitchFamily="18" charset="0"/>
+                                      </a:rPr>
+                                      <m:t>3,3</m:t>
+                                    </m:r>
+                                  </m:e>
+                                </m:d>
+                              </m:sub>
+                            </m:sSub>
+                            <m:r>
+                              <a:rPr lang="en-US" sz="1200" b="0" i="1" smtClean="0">
+                                <a:latin typeface="Cambria Math" panose="02040503050406030204" pitchFamily="18" charset="0"/>
+                              </a:rPr>
+                              <m:t>−</m:t>
+                            </m:r>
+                            <m:sSub>
+                              <m:sSubPr>
+                                <m:ctrlPr>
+                                  <a:rPr lang="en-US" sz="1200" b="0" i="1" smtClean="0">
+                                    <a:latin typeface="Cambria Math" panose="02040503050406030204" pitchFamily="18" charset="0"/>
+                                  </a:rPr>
+                                </m:ctrlPr>
+                              </m:sSubPr>
+                              <m:e>
+                                <m:r>
+                                  <a:rPr lang="en-US" sz="1200" b="0" i="1" smtClean="0">
+                                    <a:latin typeface="Cambria Math" panose="02040503050406030204" pitchFamily="18" charset="0"/>
+                                  </a:rPr>
+                                  <m:t>𝑆</m:t>
+                                </m:r>
+                              </m:e>
+                              <m:sub>
+                                <m:d>
+                                  <m:dPr>
+                                    <m:ctrlPr>
+                                      <a:rPr lang="en-US" sz="1200" b="0" i="1" smtClean="0">
+                                        <a:latin typeface="Cambria Math" panose="02040503050406030204" pitchFamily="18" charset="0"/>
+                                      </a:rPr>
+                                    </m:ctrlPr>
+                                  </m:dPr>
+                                  <m:e>
+                                    <m:r>
+                                      <a:rPr lang="en-US" sz="1200" b="0" i="1" smtClean="0">
+                                        <a:latin typeface="Cambria Math" panose="02040503050406030204" pitchFamily="18" charset="0"/>
+                                      </a:rPr>
+                                      <m:t>3,1</m:t>
+                                    </m:r>
+                                  </m:e>
+                                </m:d>
+                              </m:sub>
+                            </m:sSub>
+                            <m:r>
+                              <a:rPr lang="en-US" sz="1200" b="0" i="1" smtClean="0">
+                                <a:latin typeface="Cambria Math" panose="02040503050406030204" pitchFamily="18" charset="0"/>
+                              </a:rPr>
+                              <m:t>−</m:t>
+                            </m:r>
+                            <m:sSub>
+                              <m:sSubPr>
+                                <m:ctrlPr>
+                                  <a:rPr lang="en-US" sz="1200" b="0" i="1" smtClean="0">
+                                    <a:latin typeface="Cambria Math" panose="02040503050406030204" pitchFamily="18" charset="0"/>
+                                  </a:rPr>
+                                </m:ctrlPr>
+                              </m:sSubPr>
+                              <m:e>
+                                <m:r>
+                                  <a:rPr lang="en-US" sz="1200" b="0" i="1" smtClean="0">
+                                    <a:latin typeface="Cambria Math" panose="02040503050406030204" pitchFamily="18" charset="0"/>
+                                  </a:rPr>
+                                  <m:t>𝑆</m:t>
+                                </m:r>
+                              </m:e>
+                              <m:sub>
+                                <m:d>
+                                  <m:dPr>
+                                    <m:ctrlPr>
+                                      <a:rPr lang="en-US" sz="1200" b="0" i="1" smtClean="0">
+                                        <a:latin typeface="Cambria Math" panose="02040503050406030204" pitchFamily="18" charset="0"/>
+                                      </a:rPr>
+                                    </m:ctrlPr>
+                                  </m:dPr>
+                                  <m:e>
+                                    <m:r>
+                                      <a:rPr lang="en-US" sz="1200" b="0" i="1" smtClean="0">
+                                        <a:latin typeface="Cambria Math" panose="02040503050406030204" pitchFamily="18" charset="0"/>
+                                      </a:rPr>
+                                      <m:t>1,3</m:t>
+                                    </m:r>
+                                  </m:e>
+                                </m:d>
+                              </m:sub>
+                            </m:sSub>
+                            <m:r>
+                              <a:rPr lang="en-US" sz="1200" b="0" i="1" smtClean="0">
+                                <a:latin typeface="Cambria Math" panose="02040503050406030204" pitchFamily="18" charset="0"/>
+                              </a:rPr>
+                              <m:t>+</m:t>
+                            </m:r>
+                            <m:sSub>
+                              <m:sSubPr>
+                                <m:ctrlPr>
+                                  <a:rPr lang="en-US" sz="1200" b="0" i="1" smtClean="0">
+                                    <a:latin typeface="Cambria Math" panose="02040503050406030204" pitchFamily="18" charset="0"/>
+                                  </a:rPr>
+                                </m:ctrlPr>
+                              </m:sSubPr>
+                              <m:e>
+                                <m:r>
+                                  <a:rPr lang="en-US" sz="1200" b="0" i="1" smtClean="0">
+                                    <a:latin typeface="Cambria Math" panose="02040503050406030204" pitchFamily="18" charset="0"/>
+                                  </a:rPr>
+                                  <m:t>𝑆</m:t>
+                                </m:r>
+                              </m:e>
+                              <m:sub>
+                                <m:d>
+                                  <m:dPr>
+                                    <m:ctrlPr>
+                                      <a:rPr lang="en-US" sz="1200" b="0" i="1" smtClean="0">
+                                        <a:latin typeface="Cambria Math" panose="02040503050406030204" pitchFamily="18" charset="0"/>
+                                      </a:rPr>
+                                    </m:ctrlPr>
+                                  </m:dPr>
+                                  <m:e>
+                                    <m:r>
+                                      <a:rPr lang="en-US" sz="1200" b="0" i="1" smtClean="0">
+                                        <a:latin typeface="Cambria Math" panose="02040503050406030204" pitchFamily="18" charset="0"/>
+                                      </a:rPr>
+                                      <m:t>1,1</m:t>
+                                    </m:r>
+                                  </m:e>
+                                </m:d>
+                              </m:sub>
+                            </m:sSub>
+                          </m:e>
+                        </m:nary>
+                      </m:oMath>
+                    </m:oMathPara>
+                  </a14:m>
+                  <a:endParaRPr lang="en-US" sz="1200" dirty="0"/>
+                </a:p>
+              </p:txBody>
+            </p:sp>
+          </mc:Choice>
+          <mc:Fallback>
+            <p:sp>
+              <p:nvSpPr>
+                <p:cNvPr id="81" name="TextBox 80">
+                  <a:extLst>
+                    <a:ext uri="{FF2B5EF4-FFF2-40B4-BE49-F238E27FC236}">
+                      <a16:creationId xmlns:a16="http://schemas.microsoft.com/office/drawing/2014/main" id="{3ACEEC86-6493-FA7B-91B1-DC983FB476BB}"/>
+                    </a:ext>
+                  </a:extLst>
+                </p:cNvPr>
+                <p:cNvSpPr txBox="1">
+                  <a:spLocks noRot="1" noChangeAspect="1" noMove="1" noResize="1" noEditPoints="1" noAdjustHandles="1" noChangeArrowheads="1" noChangeShapeType="1" noTextEdit="1"/>
+                </p:cNvSpPr>
+                <p:nvPr/>
+              </p:nvSpPr>
+              <p:spPr>
+                <a:xfrm>
+                  <a:off x="5966805" y="4338212"/>
+                  <a:ext cx="2940628" cy="560410"/>
+                </a:xfrm>
+                <a:prstGeom prst="rect">
+                  <a:avLst/>
+                </a:prstGeom>
+                <a:blipFill>
+                  <a:blip r:embed="rId14"/>
+                  <a:stretch>
+                    <a:fillRect l="-5809" t="-111957" b="-154348"/>
+                  </a:stretch>
+                </a:blipFill>
+              </p:spPr>
+              <p:txBody>
+                <a:bodyPr/>
+                <a:lstStyle/>
+                <a:p>
+                  <a:r>
+                    <a:rPr lang="en-US">
+                      <a:noFill/>
+                    </a:rPr>
+                    <a:t> </a:t>
+                  </a:r>
+                </a:p>
+              </p:txBody>
+            </p:sp>
+          </mc:Fallback>
+        </mc:AlternateContent>
+      </p:grpSp>
+      <p:grpSp>
+        <p:nvGrpSpPr>
+          <p:cNvPr id="114" name="Group 113">
+            <a:extLst>
+              <a:ext uri="{FF2B5EF4-FFF2-40B4-BE49-F238E27FC236}">
+                <a16:creationId xmlns:a16="http://schemas.microsoft.com/office/drawing/2014/main" id="{5C8E8095-235C-DAFE-F9BB-59DC9DA575C0}"/>
+              </a:ext>
+            </a:extLst>
+          </p:cNvPr>
+          <p:cNvGrpSpPr/>
+          <p:nvPr/>
+        </p:nvGrpSpPr>
+        <p:grpSpPr>
+          <a:xfrm>
+            <a:off x="6410034" y="3537947"/>
+            <a:ext cx="3938161" cy="2970283"/>
+            <a:chOff x="6410034" y="3537947"/>
+            <a:chExt cx="3938161" cy="2970283"/>
+          </a:xfrm>
+        </p:grpSpPr>
+        <p:sp>
+          <p:nvSpPr>
+            <p:cNvPr id="85" name="Rectangle 84">
+              <a:extLst>
+                <a:ext uri="{FF2B5EF4-FFF2-40B4-BE49-F238E27FC236}">
+                  <a16:creationId xmlns:a16="http://schemas.microsoft.com/office/drawing/2014/main" id="{A0D77003-F3AF-3238-257A-A0DAC1A5CD78}"/>
+                </a:ext>
+              </a:extLst>
+            </p:cNvPr>
+            <p:cNvSpPr/>
+            <p:nvPr/>
+          </p:nvSpPr>
+          <p:spPr>
+            <a:xfrm>
+              <a:off x="6588874" y="4848587"/>
+              <a:ext cx="655320" cy="655320"/>
+            </a:xfrm>
+            <a:prstGeom prst="rect">
+              <a:avLst/>
+            </a:prstGeom>
+            <a:noFill/>
+            <a:ln>
+              <a:solidFill>
+                <a:schemeClr val="tx1"/>
+              </a:solidFill>
+            </a:ln>
+          </p:spPr>
+          <p:style>
+            <a:lnRef idx="2">
+              <a:schemeClr val="accent1">
+                <a:shade val="50000"/>
+              </a:schemeClr>
+            </a:lnRef>
+            <a:fillRef idx="1">
+              <a:schemeClr val="accent1"/>
+            </a:fillRef>
+            <a:effectRef idx="0">
+              <a:schemeClr val="accent1"/>
+            </a:effectRef>
+            <a:fontRef idx="minor">
+              <a:schemeClr val="lt1"/>
+            </a:fontRef>
+          </p:style>
+          <p:txBody>
+            <a:bodyPr rtlCol="0" anchor="ctr"/>
+            <a:lstStyle/>
+            <a:p>
+              <a:pPr algn="ctr"/>
+              <a:endParaRPr lang="en-US"/>
+            </a:p>
+          </p:txBody>
+        </p:sp>
+        <p:sp>
+          <p:nvSpPr>
+            <p:cNvPr id="86" name="Rectangle 85">
+              <a:extLst>
+                <a:ext uri="{FF2B5EF4-FFF2-40B4-BE49-F238E27FC236}">
+                  <a16:creationId xmlns:a16="http://schemas.microsoft.com/office/drawing/2014/main" id="{E3257406-2CC6-4AEB-FA76-3E28F521F888}"/>
+                </a:ext>
+              </a:extLst>
+            </p:cNvPr>
+            <p:cNvSpPr/>
+            <p:nvPr/>
+          </p:nvSpPr>
+          <p:spPr>
+            <a:xfrm>
+              <a:off x="6588874" y="3537947"/>
+              <a:ext cx="655320" cy="655320"/>
+            </a:xfrm>
+            <a:prstGeom prst="rect">
+              <a:avLst/>
+            </a:prstGeom>
+            <a:noFill/>
+            <a:ln>
+              <a:solidFill>
+                <a:schemeClr val="tx1"/>
+              </a:solidFill>
+            </a:ln>
+          </p:spPr>
+          <p:style>
+            <a:lnRef idx="2">
+              <a:schemeClr val="accent1">
+                <a:shade val="50000"/>
+              </a:schemeClr>
+            </a:lnRef>
+            <a:fillRef idx="1">
+              <a:schemeClr val="accent1"/>
+            </a:fillRef>
+            <a:effectRef idx="0">
+              <a:schemeClr val="accent1"/>
+            </a:effectRef>
+            <a:fontRef idx="minor">
+              <a:schemeClr val="lt1"/>
+            </a:fontRef>
+          </p:style>
+          <p:txBody>
+            <a:bodyPr rtlCol="0" anchor="ctr"/>
+            <a:lstStyle/>
+            <a:p>
+              <a:pPr algn="ctr"/>
+              <a:endParaRPr lang="en-US"/>
+            </a:p>
+          </p:txBody>
+        </p:sp>
+        <p:sp>
+          <p:nvSpPr>
+            <p:cNvPr id="87" name="Rectangle 86">
+              <a:extLst>
+                <a:ext uri="{FF2B5EF4-FFF2-40B4-BE49-F238E27FC236}">
+                  <a16:creationId xmlns:a16="http://schemas.microsoft.com/office/drawing/2014/main" id="{E27CE085-C95A-F6CA-E72C-40F090E4C1E6}"/>
+                </a:ext>
+              </a:extLst>
+            </p:cNvPr>
+            <p:cNvSpPr/>
+            <p:nvPr/>
+          </p:nvSpPr>
+          <p:spPr>
+            <a:xfrm>
+              <a:off x="7244194" y="3537947"/>
+              <a:ext cx="655320" cy="655320"/>
+            </a:xfrm>
+            <a:prstGeom prst="rect">
+              <a:avLst/>
+            </a:prstGeom>
+            <a:noFill/>
+            <a:ln>
+              <a:solidFill>
+                <a:schemeClr val="tx1"/>
+              </a:solidFill>
+            </a:ln>
+          </p:spPr>
+          <p:style>
+            <a:lnRef idx="2">
+              <a:schemeClr val="accent1">
+                <a:shade val="50000"/>
+              </a:schemeClr>
+            </a:lnRef>
+            <a:fillRef idx="1">
+              <a:schemeClr val="accent1"/>
+            </a:fillRef>
+            <a:effectRef idx="0">
+              <a:schemeClr val="accent1"/>
+            </a:effectRef>
+            <a:fontRef idx="minor">
+              <a:schemeClr val="lt1"/>
+            </a:fontRef>
+          </p:style>
+          <p:txBody>
+            <a:bodyPr rtlCol="0" anchor="ctr"/>
+            <a:lstStyle/>
+            <a:p>
+              <a:pPr algn="ctr"/>
+              <a:endParaRPr lang="en-US"/>
+            </a:p>
+          </p:txBody>
+        </p:sp>
+        <p:sp>
+          <p:nvSpPr>
+            <p:cNvPr id="88" name="Rectangle 87">
+              <a:extLst>
+                <a:ext uri="{FF2B5EF4-FFF2-40B4-BE49-F238E27FC236}">
+                  <a16:creationId xmlns:a16="http://schemas.microsoft.com/office/drawing/2014/main" id="{8B246CFA-DFB7-FCE9-7A54-C3169F8BD5F8}"/>
+                </a:ext>
+              </a:extLst>
+            </p:cNvPr>
+            <p:cNvSpPr/>
+            <p:nvPr/>
+          </p:nvSpPr>
+          <p:spPr>
+            <a:xfrm>
+              <a:off x="7900897" y="3537947"/>
+              <a:ext cx="655320" cy="655320"/>
+            </a:xfrm>
+            <a:prstGeom prst="rect">
+              <a:avLst/>
+            </a:prstGeom>
+            <a:noFill/>
+            <a:ln>
+              <a:solidFill>
+                <a:schemeClr val="tx1"/>
+              </a:solidFill>
+            </a:ln>
+          </p:spPr>
+          <p:style>
+            <a:lnRef idx="2">
+              <a:schemeClr val="accent1">
+                <a:shade val="50000"/>
+              </a:schemeClr>
+            </a:lnRef>
+            <a:fillRef idx="1">
+              <a:schemeClr val="accent1"/>
+            </a:fillRef>
+            <a:effectRef idx="0">
+              <a:schemeClr val="accent1"/>
+            </a:effectRef>
+            <a:fontRef idx="minor">
+              <a:schemeClr val="lt1"/>
+            </a:fontRef>
+          </p:style>
+          <p:txBody>
+            <a:bodyPr rtlCol="0" anchor="ctr"/>
+            <a:lstStyle/>
+            <a:p>
+              <a:pPr algn="ctr"/>
+              <a:endParaRPr lang="en-US"/>
+            </a:p>
+          </p:txBody>
+        </p:sp>
+        <p:sp>
+          <p:nvSpPr>
+            <p:cNvPr id="89" name="Rectangle 88">
+              <a:extLst>
+                <a:ext uri="{FF2B5EF4-FFF2-40B4-BE49-F238E27FC236}">
+                  <a16:creationId xmlns:a16="http://schemas.microsoft.com/office/drawing/2014/main" id="{694F2FF8-FFD4-6DC1-6272-5E00B0364381}"/>
+                </a:ext>
+              </a:extLst>
+            </p:cNvPr>
+            <p:cNvSpPr/>
+            <p:nvPr/>
+          </p:nvSpPr>
+          <p:spPr>
+            <a:xfrm>
+              <a:off x="8554834" y="3537947"/>
+              <a:ext cx="655320" cy="655320"/>
+            </a:xfrm>
+            <a:prstGeom prst="rect">
+              <a:avLst/>
+            </a:prstGeom>
+            <a:noFill/>
+            <a:ln>
+              <a:solidFill>
+                <a:schemeClr val="tx1"/>
+              </a:solidFill>
+            </a:ln>
+          </p:spPr>
+          <p:style>
+            <a:lnRef idx="2">
+              <a:schemeClr val="accent1">
+                <a:shade val="50000"/>
+              </a:schemeClr>
+            </a:lnRef>
+            <a:fillRef idx="1">
+              <a:schemeClr val="accent1"/>
+            </a:fillRef>
+            <a:effectRef idx="0">
+              <a:schemeClr val="accent1"/>
+            </a:effectRef>
+            <a:fontRef idx="minor">
+              <a:schemeClr val="lt1"/>
+            </a:fontRef>
+          </p:style>
+          <p:txBody>
+            <a:bodyPr rtlCol="0" anchor="ctr"/>
+            <a:lstStyle/>
+            <a:p>
+              <a:pPr algn="ctr"/>
+              <a:endParaRPr lang="en-US"/>
+            </a:p>
+          </p:txBody>
+        </p:sp>
+        <p:sp>
+          <p:nvSpPr>
+            <p:cNvPr id="90" name="Rectangle 89">
+              <a:extLst>
+                <a:ext uri="{FF2B5EF4-FFF2-40B4-BE49-F238E27FC236}">
+                  <a16:creationId xmlns:a16="http://schemas.microsoft.com/office/drawing/2014/main" id="{1A93DF2D-08DB-D062-668E-EA52DF62866E}"/>
+                </a:ext>
+              </a:extLst>
+            </p:cNvPr>
+            <p:cNvSpPr/>
+            <p:nvPr/>
+          </p:nvSpPr>
+          <p:spPr>
+            <a:xfrm>
+              <a:off x="8553451" y="4180294"/>
+              <a:ext cx="651227" cy="1961678"/>
+            </a:xfrm>
+            <a:prstGeom prst="rect">
+              <a:avLst/>
+            </a:prstGeom>
+            <a:solidFill>
+              <a:schemeClr val="accent4">
+                <a:lumMod val="20000"/>
+                <a:lumOff val="80000"/>
+                <a:alpha val="79000"/>
+              </a:schemeClr>
+            </a:solidFill>
+            <a:ln>
+              <a:noFill/>
+            </a:ln>
+          </p:spPr>
+          <p:style>
+            <a:lnRef idx="2">
+              <a:schemeClr val="accent1">
+                <a:shade val="50000"/>
+              </a:schemeClr>
+            </a:lnRef>
+            <a:fillRef idx="1">
+              <a:schemeClr val="accent1"/>
+            </a:fillRef>
+            <a:effectRef idx="0">
+              <a:schemeClr val="accent1"/>
+            </a:effectRef>
+            <a:fontRef idx="minor">
+              <a:schemeClr val="lt1"/>
+            </a:fontRef>
+          </p:style>
+          <p:txBody>
+            <a:bodyPr rtlCol="0" anchor="ctr"/>
+            <a:lstStyle/>
+            <a:p>
+              <a:pPr algn="ctr"/>
+              <a:endParaRPr lang="en-US"/>
+            </a:p>
+          </p:txBody>
+        </p:sp>
+        <p:sp>
+          <p:nvSpPr>
+            <p:cNvPr id="91" name="Rectangle 90">
+              <a:extLst>
+                <a:ext uri="{FF2B5EF4-FFF2-40B4-BE49-F238E27FC236}">
+                  <a16:creationId xmlns:a16="http://schemas.microsoft.com/office/drawing/2014/main" id="{5C33938F-73E9-9736-D00F-66FB93D69C40}"/>
+                </a:ext>
+              </a:extLst>
+            </p:cNvPr>
+            <p:cNvSpPr/>
+            <p:nvPr/>
+          </p:nvSpPr>
+          <p:spPr>
+            <a:xfrm>
+              <a:off x="6588874" y="4193267"/>
+              <a:ext cx="655320" cy="655320"/>
+            </a:xfrm>
+            <a:prstGeom prst="rect">
+              <a:avLst/>
+            </a:prstGeom>
+            <a:noFill/>
+            <a:ln>
+              <a:solidFill>
+                <a:schemeClr val="tx1"/>
+              </a:solidFill>
+            </a:ln>
+          </p:spPr>
+          <p:style>
+            <a:lnRef idx="2">
+              <a:schemeClr val="accent1">
+                <a:shade val="50000"/>
+              </a:schemeClr>
+            </a:lnRef>
+            <a:fillRef idx="1">
+              <a:schemeClr val="accent1"/>
+            </a:fillRef>
+            <a:effectRef idx="0">
+              <a:schemeClr val="accent1"/>
+            </a:effectRef>
+            <a:fontRef idx="minor">
+              <a:schemeClr val="lt1"/>
+            </a:fontRef>
+          </p:style>
+          <p:txBody>
+            <a:bodyPr rtlCol="0" anchor="ctr"/>
+            <a:lstStyle/>
+            <a:p>
+              <a:pPr algn="ctr"/>
+              <a:endParaRPr lang="en-US"/>
+            </a:p>
+          </p:txBody>
+        </p:sp>
+        <p:sp>
+          <p:nvSpPr>
+            <p:cNvPr id="92" name="Rectangle 91">
+              <a:extLst>
+                <a:ext uri="{FF2B5EF4-FFF2-40B4-BE49-F238E27FC236}">
+                  <a16:creationId xmlns:a16="http://schemas.microsoft.com/office/drawing/2014/main" id="{8A6C974C-6E6D-A737-AAE3-B814319EC1EA}"/>
+                </a:ext>
+              </a:extLst>
+            </p:cNvPr>
+            <p:cNvSpPr/>
+            <p:nvPr/>
+          </p:nvSpPr>
+          <p:spPr>
+            <a:xfrm>
+              <a:off x="7244194" y="4193267"/>
+              <a:ext cx="655320" cy="655320"/>
+            </a:xfrm>
+            <a:prstGeom prst="rect">
+              <a:avLst/>
+            </a:prstGeom>
+            <a:noFill/>
+            <a:ln>
+              <a:solidFill>
+                <a:schemeClr val="tx1"/>
+              </a:solidFill>
+            </a:ln>
+          </p:spPr>
+          <p:style>
+            <a:lnRef idx="2">
+              <a:schemeClr val="accent1">
+                <a:shade val="50000"/>
+              </a:schemeClr>
+            </a:lnRef>
+            <a:fillRef idx="1">
+              <a:schemeClr val="accent1"/>
+            </a:fillRef>
+            <a:effectRef idx="0">
+              <a:schemeClr val="accent1"/>
+            </a:effectRef>
+            <a:fontRef idx="minor">
+              <a:schemeClr val="lt1"/>
+            </a:fontRef>
+          </p:style>
+          <p:txBody>
+            <a:bodyPr rtlCol="0" anchor="ctr"/>
+            <a:lstStyle/>
+            <a:p>
+              <a:pPr algn="ctr"/>
+              <a:endParaRPr lang="en-US"/>
+            </a:p>
+          </p:txBody>
+        </p:sp>
+        <p:sp>
+          <p:nvSpPr>
+            <p:cNvPr id="93" name="Rectangle 92">
+              <a:extLst>
+                <a:ext uri="{FF2B5EF4-FFF2-40B4-BE49-F238E27FC236}">
+                  <a16:creationId xmlns:a16="http://schemas.microsoft.com/office/drawing/2014/main" id="{440B04E0-DE9E-B213-CD3F-482402C36FE6}"/>
+                </a:ext>
+              </a:extLst>
+            </p:cNvPr>
+            <p:cNvSpPr/>
+            <p:nvPr/>
+          </p:nvSpPr>
+          <p:spPr>
+            <a:xfrm>
+              <a:off x="7900897" y="4193267"/>
+              <a:ext cx="655320" cy="655320"/>
+            </a:xfrm>
+            <a:prstGeom prst="rect">
+              <a:avLst/>
+            </a:prstGeom>
+            <a:noFill/>
+            <a:ln>
+              <a:solidFill>
+                <a:schemeClr val="tx1"/>
+              </a:solidFill>
+            </a:ln>
+          </p:spPr>
+          <p:style>
+            <a:lnRef idx="2">
+              <a:schemeClr val="accent1">
+                <a:shade val="50000"/>
+              </a:schemeClr>
+            </a:lnRef>
+            <a:fillRef idx="1">
+              <a:schemeClr val="accent1"/>
+            </a:fillRef>
+            <a:effectRef idx="0">
+              <a:schemeClr val="accent1"/>
+            </a:effectRef>
+            <a:fontRef idx="minor">
+              <a:schemeClr val="lt1"/>
+            </a:fontRef>
+          </p:style>
+          <p:txBody>
+            <a:bodyPr rtlCol="0" anchor="ctr"/>
+            <a:lstStyle/>
+            <a:p>
+              <a:pPr algn="ctr"/>
+              <a:endParaRPr lang="en-US"/>
+            </a:p>
+          </p:txBody>
+        </p:sp>
+        <p:sp>
+          <p:nvSpPr>
+            <p:cNvPr id="94" name="Rectangle 93">
+              <a:extLst>
+                <a:ext uri="{FF2B5EF4-FFF2-40B4-BE49-F238E27FC236}">
+                  <a16:creationId xmlns:a16="http://schemas.microsoft.com/office/drawing/2014/main" id="{9F2420C6-E38B-80FF-1BAF-F8126A8AE13C}"/>
+                </a:ext>
+              </a:extLst>
+            </p:cNvPr>
+            <p:cNvSpPr/>
+            <p:nvPr/>
+          </p:nvSpPr>
+          <p:spPr>
+            <a:xfrm>
+              <a:off x="8554834" y="4193267"/>
+              <a:ext cx="655320" cy="655320"/>
+            </a:xfrm>
+            <a:prstGeom prst="rect">
+              <a:avLst/>
+            </a:prstGeom>
+            <a:noFill/>
+            <a:ln>
+              <a:solidFill>
+                <a:schemeClr val="tx1"/>
+              </a:solidFill>
+            </a:ln>
+          </p:spPr>
+          <p:style>
+            <a:lnRef idx="2">
+              <a:schemeClr val="accent1">
+                <a:shade val="50000"/>
+              </a:schemeClr>
+            </a:lnRef>
+            <a:fillRef idx="1">
+              <a:schemeClr val="accent1"/>
+            </a:fillRef>
+            <a:effectRef idx="0">
+              <a:schemeClr val="accent1"/>
+            </a:effectRef>
+            <a:fontRef idx="minor">
+              <a:schemeClr val="lt1"/>
+            </a:fontRef>
+          </p:style>
+          <p:txBody>
+            <a:bodyPr rtlCol="0" anchor="ctr"/>
+            <a:lstStyle/>
+            <a:p>
+              <a:pPr algn="ctr"/>
+              <a:endParaRPr lang="en-US"/>
+            </a:p>
+          </p:txBody>
+        </p:sp>
+        <p:sp>
+          <p:nvSpPr>
+            <p:cNvPr id="95" name="Rectangle 94">
+              <a:extLst>
+                <a:ext uri="{FF2B5EF4-FFF2-40B4-BE49-F238E27FC236}">
+                  <a16:creationId xmlns:a16="http://schemas.microsoft.com/office/drawing/2014/main" id="{E63A0DCB-BBF5-951A-33F9-91421B77570E}"/>
+                </a:ext>
+              </a:extLst>
+            </p:cNvPr>
+            <p:cNvSpPr/>
+            <p:nvPr/>
+          </p:nvSpPr>
+          <p:spPr>
+            <a:xfrm>
+              <a:off x="7244884" y="5503907"/>
+              <a:ext cx="1965270" cy="655320"/>
+            </a:xfrm>
+            <a:prstGeom prst="rect">
+              <a:avLst/>
+            </a:prstGeom>
+            <a:solidFill>
+              <a:schemeClr val="accent5">
+                <a:lumMod val="20000"/>
+                <a:lumOff val="80000"/>
+                <a:alpha val="65000"/>
+              </a:schemeClr>
+            </a:solidFill>
+            <a:ln>
+              <a:noFill/>
+            </a:ln>
+          </p:spPr>
+          <p:style>
+            <a:lnRef idx="2">
+              <a:schemeClr val="accent1">
+                <a:shade val="50000"/>
+              </a:schemeClr>
+            </a:lnRef>
+            <a:fillRef idx="1">
+              <a:schemeClr val="accent1"/>
+            </a:fillRef>
+            <a:effectRef idx="0">
+              <a:schemeClr val="accent1"/>
+            </a:effectRef>
+            <a:fontRef idx="minor">
+              <a:schemeClr val="lt1"/>
+            </a:fontRef>
+          </p:style>
+          <p:txBody>
+            <a:bodyPr rtlCol="0" anchor="ctr"/>
+            <a:lstStyle/>
+            <a:p>
+              <a:pPr algn="ctr"/>
+              <a:endParaRPr lang="en-US"/>
+            </a:p>
+          </p:txBody>
+        </p:sp>
+        <p:sp>
+          <p:nvSpPr>
+            <p:cNvPr id="96" name="Rectangle 95">
+              <a:extLst>
+                <a:ext uri="{FF2B5EF4-FFF2-40B4-BE49-F238E27FC236}">
+                  <a16:creationId xmlns:a16="http://schemas.microsoft.com/office/drawing/2014/main" id="{ABDC111E-17D3-B18D-DC62-DE8DB6A4AB84}"/>
+                </a:ext>
+              </a:extLst>
+            </p:cNvPr>
+            <p:cNvSpPr/>
+            <p:nvPr/>
+          </p:nvSpPr>
+          <p:spPr>
+            <a:xfrm>
+              <a:off x="7244194" y="4848587"/>
+              <a:ext cx="655320" cy="655320"/>
+            </a:xfrm>
+            <a:prstGeom prst="rect">
+              <a:avLst/>
+            </a:prstGeom>
+            <a:noFill/>
+            <a:ln>
+              <a:solidFill>
+                <a:schemeClr val="tx1"/>
+              </a:solidFill>
+            </a:ln>
+          </p:spPr>
+          <p:style>
+            <a:lnRef idx="2">
+              <a:schemeClr val="accent1">
+                <a:shade val="50000"/>
+              </a:schemeClr>
+            </a:lnRef>
+            <a:fillRef idx="1">
+              <a:schemeClr val="accent1"/>
+            </a:fillRef>
+            <a:effectRef idx="0">
+              <a:schemeClr val="accent1"/>
+            </a:effectRef>
+            <a:fontRef idx="minor">
+              <a:schemeClr val="lt1"/>
+            </a:fontRef>
+          </p:style>
+          <p:txBody>
+            <a:bodyPr rtlCol="0" anchor="ctr"/>
+            <a:lstStyle/>
+            <a:p>
+              <a:pPr algn="ctr"/>
+              <a:endParaRPr lang="en-US"/>
+            </a:p>
+          </p:txBody>
+        </p:sp>
+        <p:sp>
+          <p:nvSpPr>
+            <p:cNvPr id="97" name="Rectangle 96">
+              <a:extLst>
+                <a:ext uri="{FF2B5EF4-FFF2-40B4-BE49-F238E27FC236}">
+                  <a16:creationId xmlns:a16="http://schemas.microsoft.com/office/drawing/2014/main" id="{72449DE1-8124-4A63-D038-FDEE08199044}"/>
+                </a:ext>
+              </a:extLst>
+            </p:cNvPr>
+            <p:cNvSpPr/>
+            <p:nvPr/>
+          </p:nvSpPr>
+          <p:spPr>
+            <a:xfrm>
+              <a:off x="7900897" y="4848587"/>
+              <a:ext cx="655320" cy="655320"/>
+            </a:xfrm>
+            <a:prstGeom prst="rect">
+              <a:avLst/>
+            </a:prstGeom>
+            <a:noFill/>
+            <a:ln>
+              <a:solidFill>
+                <a:schemeClr val="tx1"/>
+              </a:solidFill>
+            </a:ln>
+          </p:spPr>
+          <p:style>
+            <a:lnRef idx="2">
+              <a:schemeClr val="accent1">
+                <a:shade val="50000"/>
+              </a:schemeClr>
+            </a:lnRef>
+            <a:fillRef idx="1">
+              <a:schemeClr val="accent1"/>
+            </a:fillRef>
+            <a:effectRef idx="0">
+              <a:schemeClr val="accent1"/>
+            </a:effectRef>
+            <a:fontRef idx="minor">
+              <a:schemeClr val="lt1"/>
+            </a:fontRef>
+          </p:style>
+          <p:txBody>
+            <a:bodyPr rtlCol="0" anchor="ctr"/>
+            <a:lstStyle/>
+            <a:p>
+              <a:pPr algn="ctr"/>
+              <a:endParaRPr lang="en-US"/>
+            </a:p>
+          </p:txBody>
+        </p:sp>
+        <p:sp>
+          <p:nvSpPr>
+            <p:cNvPr id="98" name="Rectangle 97">
+              <a:extLst>
+                <a:ext uri="{FF2B5EF4-FFF2-40B4-BE49-F238E27FC236}">
+                  <a16:creationId xmlns:a16="http://schemas.microsoft.com/office/drawing/2014/main" id="{DD2DFB48-151F-9051-1DAF-7C2E5362FC9D}"/>
+                </a:ext>
+              </a:extLst>
+            </p:cNvPr>
+            <p:cNvSpPr/>
+            <p:nvPr/>
+          </p:nvSpPr>
+          <p:spPr>
+            <a:xfrm>
+              <a:off x="8554834" y="4848587"/>
+              <a:ext cx="655320" cy="655320"/>
+            </a:xfrm>
+            <a:prstGeom prst="rect">
+              <a:avLst/>
+            </a:prstGeom>
+            <a:noFill/>
+            <a:ln>
+              <a:solidFill>
+                <a:schemeClr val="tx1"/>
+              </a:solidFill>
+            </a:ln>
+          </p:spPr>
+          <p:style>
+            <a:lnRef idx="2">
+              <a:schemeClr val="accent1">
+                <a:shade val="50000"/>
+              </a:schemeClr>
+            </a:lnRef>
+            <a:fillRef idx="1">
+              <a:schemeClr val="accent1"/>
+            </a:fillRef>
+            <a:effectRef idx="0">
+              <a:schemeClr val="accent1"/>
+            </a:effectRef>
+            <a:fontRef idx="minor">
+              <a:schemeClr val="lt1"/>
+            </a:fontRef>
+          </p:style>
+          <p:txBody>
+            <a:bodyPr rtlCol="0" anchor="ctr"/>
+            <a:lstStyle/>
+            <a:p>
+              <a:pPr algn="ctr"/>
+              <a:endParaRPr lang="en-US"/>
+            </a:p>
+          </p:txBody>
+        </p:sp>
+        <p:sp>
+          <p:nvSpPr>
+            <p:cNvPr id="99" name="Rectangle 98">
+              <a:extLst>
+                <a:ext uri="{FF2B5EF4-FFF2-40B4-BE49-F238E27FC236}">
+                  <a16:creationId xmlns:a16="http://schemas.microsoft.com/office/drawing/2014/main" id="{BAC3481E-0F35-20DA-ACFC-908F8E2F0186}"/>
+                </a:ext>
+              </a:extLst>
+            </p:cNvPr>
+            <p:cNvSpPr/>
+            <p:nvPr/>
+          </p:nvSpPr>
+          <p:spPr>
+            <a:xfrm>
+              <a:off x="6588874" y="5503907"/>
+              <a:ext cx="655320" cy="655320"/>
+            </a:xfrm>
+            <a:prstGeom prst="rect">
+              <a:avLst/>
+            </a:prstGeom>
+            <a:noFill/>
+            <a:ln>
+              <a:solidFill>
+                <a:schemeClr val="tx1"/>
+              </a:solidFill>
+            </a:ln>
+          </p:spPr>
+          <p:style>
+            <a:lnRef idx="2">
+              <a:schemeClr val="accent1">
+                <a:shade val="50000"/>
+              </a:schemeClr>
+            </a:lnRef>
+            <a:fillRef idx="1">
+              <a:schemeClr val="accent1"/>
+            </a:fillRef>
+            <a:effectRef idx="0">
+              <a:schemeClr val="accent1"/>
+            </a:effectRef>
+            <a:fontRef idx="minor">
+              <a:schemeClr val="lt1"/>
+            </a:fontRef>
+          </p:style>
+          <p:txBody>
+            <a:bodyPr rtlCol="0" anchor="ctr"/>
+            <a:lstStyle/>
+            <a:p>
+              <a:pPr algn="ctr"/>
+              <a:endParaRPr lang="en-US"/>
+            </a:p>
+          </p:txBody>
+        </p:sp>
+        <p:sp>
+          <p:nvSpPr>
+            <p:cNvPr id="100" name="Rectangle 99">
+              <a:extLst>
+                <a:ext uri="{FF2B5EF4-FFF2-40B4-BE49-F238E27FC236}">
+                  <a16:creationId xmlns:a16="http://schemas.microsoft.com/office/drawing/2014/main" id="{C489EE54-D2EB-DC19-A7CB-E50AFA8D8CB7}"/>
+                </a:ext>
+              </a:extLst>
+            </p:cNvPr>
+            <p:cNvSpPr/>
+            <p:nvPr/>
+          </p:nvSpPr>
+          <p:spPr>
+            <a:xfrm>
+              <a:off x="7244194" y="5503907"/>
+              <a:ext cx="655320" cy="655320"/>
+            </a:xfrm>
+            <a:prstGeom prst="rect">
+              <a:avLst/>
+            </a:prstGeom>
+            <a:noFill/>
+            <a:ln>
+              <a:solidFill>
+                <a:schemeClr val="tx1"/>
+              </a:solidFill>
+            </a:ln>
+          </p:spPr>
+          <p:style>
+            <a:lnRef idx="2">
+              <a:schemeClr val="accent1">
+                <a:shade val="50000"/>
+              </a:schemeClr>
+            </a:lnRef>
+            <a:fillRef idx="1">
+              <a:schemeClr val="accent1"/>
+            </a:fillRef>
+            <a:effectRef idx="0">
+              <a:schemeClr val="accent1"/>
+            </a:effectRef>
+            <a:fontRef idx="minor">
+              <a:schemeClr val="lt1"/>
+            </a:fontRef>
+          </p:style>
+          <p:txBody>
+            <a:bodyPr rtlCol="0" anchor="ctr"/>
+            <a:lstStyle/>
+            <a:p>
+              <a:pPr algn="ctr"/>
+              <a:endParaRPr lang="en-US"/>
+            </a:p>
+          </p:txBody>
+        </p:sp>
+        <p:sp>
+          <p:nvSpPr>
+            <p:cNvPr id="101" name="Rectangle 100">
+              <a:extLst>
+                <a:ext uri="{FF2B5EF4-FFF2-40B4-BE49-F238E27FC236}">
+                  <a16:creationId xmlns:a16="http://schemas.microsoft.com/office/drawing/2014/main" id="{FBC404FE-A829-24B0-D74B-547790E17B30}"/>
+                </a:ext>
+              </a:extLst>
+            </p:cNvPr>
+            <p:cNvSpPr/>
+            <p:nvPr/>
+          </p:nvSpPr>
+          <p:spPr>
+            <a:xfrm>
+              <a:off x="7900897" y="5503907"/>
+              <a:ext cx="655320" cy="655320"/>
+            </a:xfrm>
+            <a:prstGeom prst="rect">
+              <a:avLst/>
+            </a:prstGeom>
+            <a:noFill/>
+            <a:ln>
+              <a:solidFill>
+                <a:schemeClr val="tx1"/>
+              </a:solidFill>
+            </a:ln>
+          </p:spPr>
+          <p:style>
+            <a:lnRef idx="2">
+              <a:schemeClr val="accent1">
+                <a:shade val="50000"/>
+              </a:schemeClr>
+            </a:lnRef>
+            <a:fillRef idx="1">
+              <a:schemeClr val="accent1"/>
+            </a:fillRef>
+            <a:effectRef idx="0">
+              <a:schemeClr val="accent1"/>
+            </a:effectRef>
+            <a:fontRef idx="minor">
+              <a:schemeClr val="lt1"/>
+            </a:fontRef>
+          </p:style>
+          <p:txBody>
+            <a:bodyPr rtlCol="0" anchor="ctr"/>
+            <a:lstStyle/>
+            <a:p>
+              <a:pPr algn="ctr"/>
+              <a:endParaRPr lang="en-US"/>
+            </a:p>
+          </p:txBody>
+        </p:sp>
+        <p:sp>
+          <p:nvSpPr>
+            <p:cNvPr id="102" name="Rectangle 101">
+              <a:extLst>
+                <a:ext uri="{FF2B5EF4-FFF2-40B4-BE49-F238E27FC236}">
+                  <a16:creationId xmlns:a16="http://schemas.microsoft.com/office/drawing/2014/main" id="{1794C6CF-7D0B-066C-0680-3F35A38B4FD9}"/>
+                </a:ext>
+              </a:extLst>
+            </p:cNvPr>
+            <p:cNvSpPr/>
+            <p:nvPr/>
+          </p:nvSpPr>
+          <p:spPr>
+            <a:xfrm>
+              <a:off x="8554834" y="5503907"/>
+              <a:ext cx="655320" cy="655320"/>
+            </a:xfrm>
+            <a:prstGeom prst="rect">
+              <a:avLst/>
+            </a:prstGeom>
+            <a:noFill/>
+            <a:ln>
+              <a:solidFill>
+                <a:schemeClr val="tx1"/>
+              </a:solidFill>
+            </a:ln>
+          </p:spPr>
+          <p:style>
+            <a:lnRef idx="2">
+              <a:schemeClr val="accent1">
+                <a:shade val="50000"/>
+              </a:schemeClr>
+            </a:lnRef>
+            <a:fillRef idx="1">
+              <a:schemeClr val="accent1"/>
+            </a:fillRef>
+            <a:effectRef idx="0">
+              <a:schemeClr val="accent1"/>
+            </a:effectRef>
+            <a:fontRef idx="minor">
+              <a:schemeClr val="lt1"/>
+            </a:fontRef>
+          </p:style>
+          <p:txBody>
+            <a:bodyPr rtlCol="0" anchor="ctr"/>
+            <a:lstStyle/>
+            <a:p>
+              <a:pPr algn="ctr"/>
+              <a:endParaRPr lang="en-US"/>
+            </a:p>
+          </p:txBody>
+        </p:sp>
+        <p:sp>
+          <p:nvSpPr>
+            <p:cNvPr id="103" name="Rectangle 102">
+              <a:extLst>
+                <a:ext uri="{FF2B5EF4-FFF2-40B4-BE49-F238E27FC236}">
+                  <a16:creationId xmlns:a16="http://schemas.microsoft.com/office/drawing/2014/main" id="{64D112C8-041C-2E5E-24C2-A1267225A536}"/>
+                </a:ext>
+              </a:extLst>
+            </p:cNvPr>
+            <p:cNvSpPr/>
+            <p:nvPr/>
+          </p:nvSpPr>
+          <p:spPr>
+            <a:xfrm>
+              <a:off x="7244193" y="4188356"/>
+              <a:ext cx="1965961" cy="1965960"/>
+            </a:xfrm>
+            <a:prstGeom prst="rect">
+              <a:avLst/>
+            </a:prstGeom>
+            <a:noFill/>
+            <a:ln w="28575">
+              <a:solidFill>
+                <a:srgbClr val="00B050"/>
+              </a:solidFill>
+            </a:ln>
+          </p:spPr>
+          <p:style>
+            <a:lnRef idx="2">
+              <a:schemeClr val="accent1">
+                <a:shade val="50000"/>
+              </a:schemeClr>
+            </a:lnRef>
+            <a:fillRef idx="1">
+              <a:schemeClr val="accent1"/>
+            </a:fillRef>
+            <a:effectRef idx="0">
+              <a:schemeClr val="accent1"/>
+            </a:effectRef>
+            <a:fontRef idx="minor">
+              <a:schemeClr val="lt1"/>
+            </a:fontRef>
+          </p:style>
+          <p:txBody>
+            <a:bodyPr rtlCol="0" anchor="ctr"/>
+            <a:lstStyle/>
+            <a:p>
+              <a:pPr algn="ctr"/>
+              <a:endParaRPr lang="en-US"/>
+            </a:p>
+          </p:txBody>
+        </p:sp>
+        <p:sp>
+          <p:nvSpPr>
+            <p:cNvPr id="104" name="Rectangle 103">
+              <a:extLst>
+                <a:ext uri="{FF2B5EF4-FFF2-40B4-BE49-F238E27FC236}">
+                  <a16:creationId xmlns:a16="http://schemas.microsoft.com/office/drawing/2014/main" id="{1A120256-ABE2-15EE-0802-8B87A001FDB7}"/>
+                </a:ext>
+              </a:extLst>
+            </p:cNvPr>
+            <p:cNvSpPr/>
+            <p:nvPr/>
+          </p:nvSpPr>
+          <p:spPr>
+            <a:xfrm>
+              <a:off x="7245576" y="4193267"/>
+              <a:ext cx="1307875" cy="1310640"/>
+            </a:xfrm>
+            <a:prstGeom prst="rect">
+              <a:avLst/>
+            </a:prstGeom>
+            <a:noFill/>
+            <a:ln w="28575">
+              <a:solidFill>
+                <a:schemeClr val="accent4"/>
+              </a:solidFill>
+            </a:ln>
+          </p:spPr>
+          <p:style>
+            <a:lnRef idx="2">
+              <a:schemeClr val="accent1">
+                <a:shade val="50000"/>
+              </a:schemeClr>
+            </a:lnRef>
+            <a:fillRef idx="1">
+              <a:schemeClr val="accent1"/>
+            </a:fillRef>
+            <a:effectRef idx="0">
+              <a:schemeClr val="accent1"/>
+            </a:effectRef>
+            <a:fontRef idx="minor">
+              <a:schemeClr val="lt1"/>
+            </a:fontRef>
+          </p:style>
+          <p:txBody>
+            <a:bodyPr rtlCol="0" anchor="ctr"/>
+            <a:lstStyle/>
+            <a:p>
+              <a:pPr algn="ctr"/>
+              <a:endParaRPr lang="en-US"/>
+            </a:p>
+          </p:txBody>
+        </p:sp>
+        <mc:AlternateContent xmlns:mc="http://schemas.openxmlformats.org/markup-compatibility/2006">
+          <mc:Choice xmlns:a14="http://schemas.microsoft.com/office/drawing/2010/main" Requires="a14">
+            <p:sp>
+              <p:nvSpPr>
+                <p:cNvPr id="105" name="TextBox 104">
+                  <a:extLst>
+                    <a:ext uri="{FF2B5EF4-FFF2-40B4-BE49-F238E27FC236}">
+                      <a16:creationId xmlns:a16="http://schemas.microsoft.com/office/drawing/2014/main" id="{47E9B1C5-EEB0-AAC3-FA39-A2A4636BE723}"/>
+                    </a:ext>
+                  </a:extLst>
+                </p:cNvPr>
+                <p:cNvSpPr txBox="1"/>
+                <p:nvPr/>
+              </p:nvSpPr>
+              <p:spPr>
+                <a:xfrm>
+                  <a:off x="7899513" y="5032836"/>
+                  <a:ext cx="491490" cy="276999"/>
+                </a:xfrm>
+                <a:prstGeom prst="rect">
+                  <a:avLst/>
+                </a:prstGeom>
+                <a:noFill/>
+              </p:spPr>
+              <p:txBody>
+                <a:bodyPr wrap="square" rtlCol="0">
+                  <a:spAutoFit/>
+                </a:bodyPr>
+                <a:lstStyle/>
+                <a:p>
+                  <a:pPr/>
+                  <a14:m>
+                    <m:oMathPara xmlns:m="http://schemas.openxmlformats.org/officeDocument/2006/math">
+                      <m:oMathParaPr>
+                        <m:jc m:val="left"/>
+                      </m:oMathParaPr>
+                      <m:oMath xmlns:m="http://schemas.openxmlformats.org/officeDocument/2006/math">
+                        <m:r>
+                          <a:rPr lang="en-US" sz="1200" b="0" i="1" smtClean="0">
+                            <a:latin typeface="Cambria Math" panose="02040503050406030204" pitchFamily="18" charset="0"/>
+                          </a:rPr>
+                          <m:t>(</m:t>
+                        </m:r>
+                        <m:sSub>
+                          <m:sSubPr>
+                            <m:ctrlPr>
+                              <a:rPr lang="en-US" sz="1200" b="0" i="1" smtClean="0">
+                                <a:latin typeface="Cambria Math" panose="02040503050406030204" pitchFamily="18" charset="0"/>
+                              </a:rPr>
+                            </m:ctrlPr>
+                          </m:sSubPr>
+                          <m:e>
+                            <m:r>
+                              <a:rPr lang="en-US" sz="1200" b="0" i="1" smtClean="0">
+                                <a:latin typeface="Cambria Math" panose="02040503050406030204" pitchFamily="18" charset="0"/>
+                              </a:rPr>
+                              <m:t>𝑥</m:t>
+                            </m:r>
+                          </m:e>
+                          <m:sub>
+                            <m:r>
+                              <a:rPr lang="en-US" sz="1200" b="0" i="1" smtClean="0">
+                                <a:latin typeface="Cambria Math" panose="02040503050406030204" pitchFamily="18" charset="0"/>
+                              </a:rPr>
+                              <m:t>2</m:t>
+                            </m:r>
+                          </m:sub>
+                        </m:sSub>
+                        <m:r>
+                          <a:rPr lang="en-US" sz="1200" b="0" i="1" smtClean="0">
+                            <a:latin typeface="Cambria Math" panose="02040503050406030204" pitchFamily="18" charset="0"/>
+                          </a:rPr>
+                          <m:t>,</m:t>
+                        </m:r>
+                        <m:sSub>
+                          <m:sSubPr>
+                            <m:ctrlPr>
+                              <a:rPr lang="en-US" sz="1200" b="0" i="1" smtClean="0">
+                                <a:latin typeface="Cambria Math" panose="02040503050406030204" pitchFamily="18" charset="0"/>
+                              </a:rPr>
+                            </m:ctrlPr>
+                          </m:sSubPr>
+                          <m:e>
+                            <m:r>
+                              <a:rPr lang="en-US" sz="1200" b="0" i="1" smtClean="0">
+                                <a:latin typeface="Cambria Math" panose="02040503050406030204" pitchFamily="18" charset="0"/>
+                              </a:rPr>
+                              <m:t>𝑦</m:t>
+                            </m:r>
+                          </m:e>
+                          <m:sub>
+                            <m:r>
+                              <a:rPr lang="en-US" sz="1200" b="0" i="1" smtClean="0">
+                                <a:latin typeface="Cambria Math" panose="02040503050406030204" pitchFamily="18" charset="0"/>
+                              </a:rPr>
+                              <m:t>2</m:t>
+                            </m:r>
+                          </m:sub>
+                        </m:sSub>
+                        <m:r>
+                          <a:rPr lang="en-US" sz="1200" b="0" i="1" smtClean="0">
+                            <a:latin typeface="Cambria Math" panose="02040503050406030204" pitchFamily="18" charset="0"/>
+                          </a:rPr>
+                          <m:t>)</m:t>
+                        </m:r>
+                      </m:oMath>
+                    </m:oMathPara>
+                  </a14:m>
+                  <a:endParaRPr lang="en-US" sz="1200" dirty="0"/>
+                </a:p>
+              </p:txBody>
+            </p:sp>
+          </mc:Choice>
+          <mc:Fallback>
+            <p:sp>
+              <p:nvSpPr>
+                <p:cNvPr id="105" name="TextBox 104">
+                  <a:extLst>
+                    <a:ext uri="{FF2B5EF4-FFF2-40B4-BE49-F238E27FC236}">
+                      <a16:creationId xmlns:a16="http://schemas.microsoft.com/office/drawing/2014/main" id="{47E9B1C5-EEB0-AAC3-FA39-A2A4636BE723}"/>
+                    </a:ext>
+                  </a:extLst>
+                </p:cNvPr>
+                <p:cNvSpPr txBox="1">
+                  <a:spLocks noRot="1" noChangeAspect="1" noMove="1" noResize="1" noEditPoints="1" noAdjustHandles="1" noChangeArrowheads="1" noChangeShapeType="1" noTextEdit="1"/>
+                </p:cNvSpPr>
+                <p:nvPr/>
+              </p:nvSpPr>
+              <p:spPr>
+                <a:xfrm>
+                  <a:off x="7899513" y="5032836"/>
+                  <a:ext cx="491490" cy="276999"/>
+                </a:xfrm>
+                <a:prstGeom prst="rect">
+                  <a:avLst/>
+                </a:prstGeom>
+                <a:blipFill>
+                  <a:blip r:embed="rId15"/>
+                  <a:stretch>
+                    <a:fillRect r="-33750" b="-8889"/>
+                  </a:stretch>
+                </a:blipFill>
+              </p:spPr>
+              <p:txBody>
+                <a:bodyPr/>
+                <a:lstStyle/>
+                <a:p>
+                  <a:r>
+                    <a:rPr lang="en-US">
+                      <a:noFill/>
+                    </a:rPr>
+                    <a:t> </a:t>
+                  </a:r>
+                </a:p>
+              </p:txBody>
+            </p:sp>
+          </mc:Fallback>
+        </mc:AlternateContent>
+        <mc:AlternateContent xmlns:mc="http://schemas.openxmlformats.org/markup-compatibility/2006">
+          <mc:Choice xmlns:a14="http://schemas.microsoft.com/office/drawing/2010/main" Requires="a14">
+            <p:sp>
+              <p:nvSpPr>
+                <p:cNvPr id="107" name="TextBox 106">
+                  <a:extLst>
+                    <a:ext uri="{FF2B5EF4-FFF2-40B4-BE49-F238E27FC236}">
+                      <a16:creationId xmlns:a16="http://schemas.microsoft.com/office/drawing/2014/main" id="{2F7ED840-1FEF-CC56-4B4A-CEBB117A9EA5}"/>
+                    </a:ext>
+                  </a:extLst>
+                </p:cNvPr>
+                <p:cNvSpPr txBox="1"/>
+                <p:nvPr/>
+              </p:nvSpPr>
+              <p:spPr>
+                <a:xfrm>
+                  <a:off x="7242811" y="4366661"/>
+                  <a:ext cx="491490" cy="276999"/>
+                </a:xfrm>
+                <a:prstGeom prst="rect">
+                  <a:avLst/>
+                </a:prstGeom>
+                <a:noFill/>
+              </p:spPr>
+              <p:txBody>
+                <a:bodyPr wrap="square" rtlCol="0">
+                  <a:spAutoFit/>
+                </a:bodyPr>
+                <a:lstStyle/>
+                <a:p>
+                  <a:pPr/>
+                  <a14:m>
+                    <m:oMathPara xmlns:m="http://schemas.openxmlformats.org/officeDocument/2006/math">
+                      <m:oMathParaPr>
+                        <m:jc m:val="center"/>
+                      </m:oMathParaPr>
+                      <m:oMath xmlns:m="http://schemas.openxmlformats.org/officeDocument/2006/math">
+                        <m:r>
+                          <a:rPr lang="en-US" sz="1200" b="0" i="1" smtClean="0">
+                            <a:latin typeface="Cambria Math" panose="02040503050406030204" pitchFamily="18" charset="0"/>
+                          </a:rPr>
+                          <m:t>(</m:t>
+                        </m:r>
+                        <m:sSub>
+                          <m:sSubPr>
+                            <m:ctrlPr>
+                              <a:rPr lang="en-US" sz="1200" b="0" i="1" smtClean="0">
+                                <a:latin typeface="Cambria Math" panose="02040503050406030204" pitchFamily="18" charset="0"/>
+                              </a:rPr>
+                            </m:ctrlPr>
+                          </m:sSubPr>
+                          <m:e>
+                            <m:r>
+                              <a:rPr lang="en-US" sz="1200" b="0" i="1" smtClean="0">
+                                <a:latin typeface="Cambria Math" panose="02040503050406030204" pitchFamily="18" charset="0"/>
+                              </a:rPr>
+                              <m:t>𝑥</m:t>
+                            </m:r>
+                          </m:e>
+                          <m:sub>
+                            <m:r>
+                              <a:rPr lang="en-US" sz="1200" b="0" i="1" smtClean="0">
+                                <a:latin typeface="Cambria Math" panose="02040503050406030204" pitchFamily="18" charset="0"/>
+                              </a:rPr>
+                              <m:t>1</m:t>
+                            </m:r>
+                          </m:sub>
+                        </m:sSub>
+                        <m:r>
+                          <a:rPr lang="en-US" sz="1200" b="0" i="1" smtClean="0">
+                            <a:latin typeface="Cambria Math" panose="02040503050406030204" pitchFamily="18" charset="0"/>
+                          </a:rPr>
+                          <m:t>,</m:t>
+                        </m:r>
+                        <m:sSub>
+                          <m:sSubPr>
+                            <m:ctrlPr>
+                              <a:rPr lang="en-US" sz="1200" b="0" i="1" smtClean="0">
+                                <a:latin typeface="Cambria Math" panose="02040503050406030204" pitchFamily="18" charset="0"/>
+                              </a:rPr>
+                            </m:ctrlPr>
+                          </m:sSubPr>
+                          <m:e>
+                            <m:r>
+                              <a:rPr lang="en-US" sz="1200" b="0" i="1" smtClean="0">
+                                <a:latin typeface="Cambria Math" panose="02040503050406030204" pitchFamily="18" charset="0"/>
+                              </a:rPr>
+                              <m:t>𝑦</m:t>
+                            </m:r>
+                          </m:e>
+                          <m:sub>
+                            <m:r>
+                              <a:rPr lang="en-US" sz="1200" b="0" i="1" smtClean="0">
+                                <a:latin typeface="Cambria Math" panose="02040503050406030204" pitchFamily="18" charset="0"/>
+                              </a:rPr>
+                              <m:t>1</m:t>
+                            </m:r>
+                          </m:sub>
+                        </m:sSub>
+                        <m:r>
+                          <a:rPr lang="en-US" sz="1200" b="0" i="1" smtClean="0">
+                            <a:latin typeface="Cambria Math" panose="02040503050406030204" pitchFamily="18" charset="0"/>
+                          </a:rPr>
+                          <m:t>)</m:t>
+                        </m:r>
+                      </m:oMath>
+                    </m:oMathPara>
+                  </a14:m>
+                  <a:endParaRPr lang="en-US" sz="1200" dirty="0"/>
+                </a:p>
+              </p:txBody>
+            </p:sp>
+          </mc:Choice>
+          <mc:Fallback>
+            <p:sp>
+              <p:nvSpPr>
+                <p:cNvPr id="107" name="TextBox 106">
+                  <a:extLst>
+                    <a:ext uri="{FF2B5EF4-FFF2-40B4-BE49-F238E27FC236}">
+                      <a16:creationId xmlns:a16="http://schemas.microsoft.com/office/drawing/2014/main" id="{2F7ED840-1FEF-CC56-4B4A-CEBB117A9EA5}"/>
+                    </a:ext>
+                  </a:extLst>
+                </p:cNvPr>
+                <p:cNvSpPr txBox="1">
+                  <a:spLocks noRot="1" noChangeAspect="1" noMove="1" noResize="1" noEditPoints="1" noAdjustHandles="1" noChangeArrowheads="1" noChangeShapeType="1" noTextEdit="1"/>
+                </p:cNvSpPr>
+                <p:nvPr/>
+              </p:nvSpPr>
+              <p:spPr>
+                <a:xfrm>
+                  <a:off x="7242811" y="4366661"/>
+                  <a:ext cx="491490" cy="276999"/>
+                </a:xfrm>
+                <a:prstGeom prst="rect">
+                  <a:avLst/>
+                </a:prstGeom>
+                <a:blipFill>
+                  <a:blip r:embed="rId16"/>
+                  <a:stretch>
+                    <a:fillRect r="-30864" b="-6522"/>
+                  </a:stretch>
+                </a:blipFill>
+              </p:spPr>
+              <p:txBody>
+                <a:bodyPr/>
+                <a:lstStyle/>
+                <a:p>
+                  <a:r>
+                    <a:rPr lang="en-US">
+                      <a:noFill/>
+                    </a:rPr>
+                    <a:t> </a:t>
+                  </a:r>
+                </a:p>
+              </p:txBody>
+            </p:sp>
+          </mc:Fallback>
+        </mc:AlternateContent>
+        <mc:AlternateContent xmlns:mc="http://schemas.openxmlformats.org/markup-compatibility/2006">
+          <mc:Choice xmlns:a14="http://schemas.microsoft.com/office/drawing/2010/main" Requires="a14">
+            <p:sp>
+              <p:nvSpPr>
+                <p:cNvPr id="110" name="TextBox 109">
+                  <a:extLst>
+                    <a:ext uri="{FF2B5EF4-FFF2-40B4-BE49-F238E27FC236}">
+                      <a16:creationId xmlns:a16="http://schemas.microsoft.com/office/drawing/2014/main" id="{62FE0CB0-5EAC-CB04-DE21-04361F42062A}"/>
+                    </a:ext>
+                  </a:extLst>
+                </p:cNvPr>
+                <p:cNvSpPr txBox="1"/>
+                <p:nvPr/>
+              </p:nvSpPr>
+              <p:spPr>
+                <a:xfrm>
+                  <a:off x="6410034" y="3870116"/>
+                  <a:ext cx="1013001" cy="291618"/>
+                </a:xfrm>
+                <a:prstGeom prst="rect">
+                  <a:avLst/>
+                </a:prstGeom>
+                <a:noFill/>
+              </p:spPr>
+              <p:txBody>
+                <a:bodyPr wrap="square" rtlCol="0">
+                  <a:spAutoFit/>
+                </a:bodyPr>
+                <a:lstStyle/>
+                <a:p>
+                  <a:pPr/>
+                  <a14:m>
+                    <m:oMathPara xmlns:m="http://schemas.openxmlformats.org/officeDocument/2006/math">
+                      <m:oMathParaPr>
+                        <m:jc m:val="center"/>
+                      </m:oMathParaPr>
+                      <m:oMath xmlns:m="http://schemas.openxmlformats.org/officeDocument/2006/math">
+                        <m:sSub>
+                          <m:sSubPr>
+                            <m:ctrlPr>
+                              <a:rPr lang="en-US" sz="1200" b="0" i="1" smtClean="0">
+                                <a:latin typeface="Cambria Math" panose="02040503050406030204" pitchFamily="18" charset="0"/>
+                              </a:rPr>
+                            </m:ctrlPr>
+                          </m:sSubPr>
+                          <m:e>
+                            <m:r>
+                              <a:rPr lang="en-US" sz="1200" b="0" i="1" smtClean="0">
+                                <a:latin typeface="Cambria Math" panose="02040503050406030204" pitchFamily="18" charset="0"/>
+                              </a:rPr>
+                              <m:t>𝑏</m:t>
+                            </m:r>
+                          </m:e>
+                          <m:sub>
+                            <m:sSub>
+                              <m:sSubPr>
+                                <m:ctrlPr>
+                                  <a:rPr lang="en-US" sz="1200" b="0" i="1" smtClean="0">
+                                    <a:latin typeface="Cambria Math" panose="02040503050406030204" pitchFamily="18" charset="0"/>
+                                  </a:rPr>
+                                </m:ctrlPr>
+                              </m:sSubPr>
+                              <m:e>
+                                <m:r>
+                                  <a:rPr lang="en-US" sz="1200" b="0" i="1" smtClean="0">
+                                    <a:latin typeface="Cambria Math" panose="02040503050406030204" pitchFamily="18" charset="0"/>
+                                  </a:rPr>
+                                  <m:t>𝑥</m:t>
+                                </m:r>
+                              </m:e>
+                              <m:sub>
+                                <m:r>
+                                  <a:rPr lang="en-US" sz="1200" b="0" i="1" smtClean="0">
+                                    <a:latin typeface="Cambria Math" panose="02040503050406030204" pitchFamily="18" charset="0"/>
+                                  </a:rPr>
+                                  <m:t>1</m:t>
+                                </m:r>
+                              </m:sub>
+                            </m:sSub>
+                            <m:r>
+                              <a:rPr lang="en-US" sz="1200" b="0" i="1" smtClean="0">
+                                <a:latin typeface="Cambria Math" panose="02040503050406030204" pitchFamily="18" charset="0"/>
+                              </a:rPr>
+                              <m:t>,</m:t>
+                            </m:r>
+                            <m:sSub>
+                              <m:sSubPr>
+                                <m:ctrlPr>
+                                  <a:rPr lang="en-US" sz="1200" b="0" i="1" smtClean="0">
+                                    <a:latin typeface="Cambria Math" panose="02040503050406030204" pitchFamily="18" charset="0"/>
+                                  </a:rPr>
+                                </m:ctrlPr>
+                              </m:sSubPr>
+                              <m:e>
+                                <m:r>
+                                  <a:rPr lang="en-US" sz="1200" b="0" i="1" smtClean="0">
+                                    <a:latin typeface="Cambria Math" panose="02040503050406030204" pitchFamily="18" charset="0"/>
+                                  </a:rPr>
+                                  <m:t>𝑦</m:t>
+                                </m:r>
+                              </m:e>
+                              <m:sub>
+                                <m:r>
+                                  <a:rPr lang="en-US" sz="1200" b="0" i="1" smtClean="0">
+                                    <a:latin typeface="Cambria Math" panose="02040503050406030204" pitchFamily="18" charset="0"/>
+                                  </a:rPr>
+                                  <m:t>1</m:t>
+                                </m:r>
+                              </m:sub>
+                            </m:sSub>
+                          </m:sub>
+                        </m:sSub>
+                        <m:r>
+                          <a:rPr lang="en-US" sz="1200" b="0" i="1" smtClean="0">
+                            <a:latin typeface="Cambria Math" panose="02040503050406030204" pitchFamily="18" charset="0"/>
+                          </a:rPr>
+                          <m:t>+</m:t>
+                        </m:r>
+                        <m:r>
+                          <a:rPr lang="en-US" sz="1200" b="0" i="1" smtClean="0">
+                            <a:latin typeface="Cambria Math" panose="02040503050406030204" pitchFamily="18" charset="0"/>
+                          </a:rPr>
+                          <m:t>𝑐</m:t>
+                        </m:r>
+                      </m:oMath>
+                    </m:oMathPara>
+                  </a14:m>
+                  <a:endParaRPr lang="en-US" sz="1200" dirty="0"/>
+                </a:p>
+              </p:txBody>
+            </p:sp>
+          </mc:Choice>
+          <mc:Fallback>
+            <p:sp>
+              <p:nvSpPr>
+                <p:cNvPr id="110" name="TextBox 109">
+                  <a:extLst>
+                    <a:ext uri="{FF2B5EF4-FFF2-40B4-BE49-F238E27FC236}">
+                      <a16:creationId xmlns:a16="http://schemas.microsoft.com/office/drawing/2014/main" id="{62FE0CB0-5EAC-CB04-DE21-04361F42062A}"/>
+                    </a:ext>
+                  </a:extLst>
+                </p:cNvPr>
+                <p:cNvSpPr txBox="1">
+                  <a:spLocks noRot="1" noChangeAspect="1" noMove="1" noResize="1" noEditPoints="1" noAdjustHandles="1" noChangeArrowheads="1" noChangeShapeType="1" noTextEdit="1"/>
+                </p:cNvSpPr>
+                <p:nvPr/>
+              </p:nvSpPr>
+              <p:spPr>
+                <a:xfrm>
+                  <a:off x="6410034" y="3870116"/>
+                  <a:ext cx="1013001" cy="291618"/>
+                </a:xfrm>
+                <a:prstGeom prst="rect">
+                  <a:avLst/>
+                </a:prstGeom>
+                <a:blipFill>
+                  <a:blip r:embed="rId17"/>
+                  <a:stretch>
+                    <a:fillRect/>
+                  </a:stretch>
+                </a:blipFill>
+              </p:spPr>
+              <p:txBody>
+                <a:bodyPr/>
+                <a:lstStyle/>
+                <a:p>
+                  <a:r>
+                    <a:rPr lang="en-US">
+                      <a:noFill/>
+                    </a:rPr>
+                    <a:t> </a:t>
+                  </a:r>
+                </a:p>
+              </p:txBody>
+            </p:sp>
+          </mc:Fallback>
+        </mc:AlternateContent>
+        <mc:AlternateContent xmlns:mc="http://schemas.openxmlformats.org/markup-compatibility/2006">
+          <mc:Choice xmlns:a14="http://schemas.microsoft.com/office/drawing/2010/main" Requires="a14">
+            <p:sp>
+              <p:nvSpPr>
+                <p:cNvPr id="111" name="TextBox 110">
+                  <a:extLst>
+                    <a:ext uri="{FF2B5EF4-FFF2-40B4-BE49-F238E27FC236}">
+                      <a16:creationId xmlns:a16="http://schemas.microsoft.com/office/drawing/2014/main" id="{3FF61826-40C9-E777-ABBE-FDC62A565219}"/>
+                    </a:ext>
+                  </a:extLst>
+                </p:cNvPr>
+                <p:cNvSpPr txBox="1"/>
+                <p:nvPr/>
+              </p:nvSpPr>
+              <p:spPr>
+                <a:xfrm>
+                  <a:off x="9211536" y="4995247"/>
+                  <a:ext cx="1013001" cy="292901"/>
+                </a:xfrm>
+                <a:prstGeom prst="rect">
+                  <a:avLst/>
+                </a:prstGeom>
+                <a:noFill/>
+              </p:spPr>
+              <p:txBody>
+                <a:bodyPr wrap="square" rtlCol="0">
+                  <a:spAutoFit/>
+                </a:bodyPr>
+                <a:lstStyle/>
+                <a:p>
+                  <a:pPr/>
+                  <a14:m>
+                    <m:oMathPara xmlns:m="http://schemas.openxmlformats.org/officeDocument/2006/math">
+                      <m:oMathParaPr>
+                        <m:jc m:val="center"/>
+                      </m:oMathParaPr>
+                      <m:oMath xmlns:m="http://schemas.openxmlformats.org/officeDocument/2006/math">
+                        <m:sSub>
+                          <m:sSubPr>
+                            <m:ctrlPr>
+                              <a:rPr lang="en-US" sz="1200" b="0" i="1" smtClean="0">
+                                <a:latin typeface="Cambria Math" panose="02040503050406030204" pitchFamily="18" charset="0"/>
+                              </a:rPr>
+                            </m:ctrlPr>
+                          </m:sSubPr>
+                          <m:e>
+                            <m:r>
+                              <a:rPr lang="en-US" sz="1200" b="0" i="1" smtClean="0">
+                                <a:latin typeface="Cambria Math" panose="02040503050406030204" pitchFamily="18" charset="0"/>
+                              </a:rPr>
+                              <m:t>𝑏</m:t>
+                            </m:r>
+                          </m:e>
+                          <m:sub>
+                            <m:sSub>
+                              <m:sSubPr>
+                                <m:ctrlPr>
+                                  <a:rPr lang="en-US" sz="1200" b="0" i="1" smtClean="0">
+                                    <a:latin typeface="Cambria Math" panose="02040503050406030204" pitchFamily="18" charset="0"/>
+                                  </a:rPr>
+                                </m:ctrlPr>
+                              </m:sSubPr>
+                              <m:e>
+                                <m:r>
+                                  <a:rPr lang="en-US" sz="1200" b="0" i="1" smtClean="0">
+                                    <a:latin typeface="Cambria Math" panose="02040503050406030204" pitchFamily="18" charset="0"/>
+                                  </a:rPr>
+                                  <m:t>𝑥</m:t>
+                                </m:r>
+                              </m:e>
+                              <m:sub>
+                                <m:r>
+                                  <a:rPr lang="en-US" sz="1200" b="0" i="1" smtClean="0">
+                                    <a:latin typeface="Cambria Math" panose="02040503050406030204" pitchFamily="18" charset="0"/>
+                                  </a:rPr>
+                                  <m:t>2</m:t>
+                                </m:r>
+                              </m:sub>
+                            </m:sSub>
+                            <m:r>
+                              <a:rPr lang="en-US" sz="1200" b="0" i="1" smtClean="0">
+                                <a:latin typeface="Cambria Math" panose="02040503050406030204" pitchFamily="18" charset="0"/>
+                              </a:rPr>
+                              <m:t>+1,</m:t>
+                            </m:r>
+                            <m:sSub>
+                              <m:sSubPr>
+                                <m:ctrlPr>
+                                  <a:rPr lang="en-US" sz="1200" b="0" i="1" smtClean="0">
+                                    <a:latin typeface="Cambria Math" panose="02040503050406030204" pitchFamily="18" charset="0"/>
+                                  </a:rPr>
+                                </m:ctrlPr>
+                              </m:sSubPr>
+                              <m:e>
+                                <m:r>
+                                  <a:rPr lang="en-US" sz="1200" b="0" i="1" smtClean="0">
+                                    <a:latin typeface="Cambria Math" panose="02040503050406030204" pitchFamily="18" charset="0"/>
+                                  </a:rPr>
+                                  <m:t>𝑦</m:t>
+                                </m:r>
+                              </m:e>
+                              <m:sub>
+                                <m:r>
+                                  <a:rPr lang="en-US" sz="1200" b="0" i="1" smtClean="0">
+                                    <a:latin typeface="Cambria Math" panose="02040503050406030204" pitchFamily="18" charset="0"/>
+                                  </a:rPr>
+                                  <m:t>1</m:t>
+                                </m:r>
+                              </m:sub>
+                            </m:sSub>
+                          </m:sub>
+                        </m:sSub>
+                        <m:r>
+                          <a:rPr lang="en-US" sz="1200" b="0" i="1" smtClean="0">
+                            <a:latin typeface="Cambria Math" panose="02040503050406030204" pitchFamily="18" charset="0"/>
+                          </a:rPr>
+                          <m:t>−</m:t>
+                        </m:r>
+                        <m:r>
+                          <a:rPr lang="en-US" sz="1200" b="0" i="1" smtClean="0">
+                            <a:latin typeface="Cambria Math" panose="02040503050406030204" pitchFamily="18" charset="0"/>
+                          </a:rPr>
+                          <m:t>𝑐</m:t>
+                        </m:r>
+                      </m:oMath>
+                    </m:oMathPara>
+                  </a14:m>
+                  <a:endParaRPr lang="en-US" sz="1200" dirty="0"/>
+                </a:p>
+              </p:txBody>
+            </p:sp>
+          </mc:Choice>
+          <mc:Fallback>
+            <p:sp>
+              <p:nvSpPr>
+                <p:cNvPr id="111" name="TextBox 110">
+                  <a:extLst>
+                    <a:ext uri="{FF2B5EF4-FFF2-40B4-BE49-F238E27FC236}">
+                      <a16:creationId xmlns:a16="http://schemas.microsoft.com/office/drawing/2014/main" id="{3FF61826-40C9-E777-ABBE-FDC62A565219}"/>
+                    </a:ext>
+                  </a:extLst>
+                </p:cNvPr>
+                <p:cNvSpPr txBox="1">
+                  <a:spLocks noRot="1" noChangeAspect="1" noMove="1" noResize="1" noEditPoints="1" noAdjustHandles="1" noChangeArrowheads="1" noChangeShapeType="1" noTextEdit="1"/>
+                </p:cNvSpPr>
+                <p:nvPr/>
+              </p:nvSpPr>
+              <p:spPr>
+                <a:xfrm>
+                  <a:off x="9211536" y="4995247"/>
+                  <a:ext cx="1013001" cy="292901"/>
+                </a:xfrm>
+                <a:prstGeom prst="rect">
+                  <a:avLst/>
+                </a:prstGeom>
+                <a:blipFill>
+                  <a:blip r:embed="rId18"/>
+                  <a:stretch>
+                    <a:fillRect/>
+                  </a:stretch>
+                </a:blipFill>
+              </p:spPr>
+              <p:txBody>
+                <a:bodyPr/>
+                <a:lstStyle/>
+                <a:p>
+                  <a:r>
+                    <a:rPr lang="en-US">
+                      <a:noFill/>
+                    </a:rPr>
+                    <a:t> </a:t>
+                  </a:r>
+                </a:p>
+              </p:txBody>
+            </p:sp>
+          </mc:Fallback>
+        </mc:AlternateContent>
+        <mc:AlternateContent xmlns:mc="http://schemas.openxmlformats.org/markup-compatibility/2006">
+          <mc:Choice xmlns:a14="http://schemas.microsoft.com/office/drawing/2010/main" Requires="a14">
+            <p:sp>
+              <p:nvSpPr>
+                <p:cNvPr id="112" name="TextBox 111">
+                  <a:extLst>
+                    <a:ext uri="{FF2B5EF4-FFF2-40B4-BE49-F238E27FC236}">
+                      <a16:creationId xmlns:a16="http://schemas.microsoft.com/office/drawing/2014/main" id="{023F3A64-05F3-ED85-F752-5A6A4A87F8A8}"/>
+                    </a:ext>
+                  </a:extLst>
+                </p:cNvPr>
+                <p:cNvSpPr txBox="1"/>
+                <p:nvPr/>
+              </p:nvSpPr>
+              <p:spPr>
+                <a:xfrm>
+                  <a:off x="7720672" y="6215329"/>
+                  <a:ext cx="1013001" cy="292901"/>
+                </a:xfrm>
+                <a:prstGeom prst="rect">
+                  <a:avLst/>
+                </a:prstGeom>
+                <a:noFill/>
+              </p:spPr>
+              <p:txBody>
+                <a:bodyPr wrap="square" rtlCol="0">
+                  <a:spAutoFit/>
+                </a:bodyPr>
+                <a:lstStyle/>
+                <a:p>
+                  <a:pPr/>
+                  <a14:m>
+                    <m:oMathPara xmlns:m="http://schemas.openxmlformats.org/officeDocument/2006/math">
+                      <m:oMathParaPr>
+                        <m:jc m:val="center"/>
+                      </m:oMathParaPr>
+                      <m:oMath xmlns:m="http://schemas.openxmlformats.org/officeDocument/2006/math">
+                        <m:sSub>
+                          <m:sSubPr>
+                            <m:ctrlPr>
+                              <a:rPr lang="en-US" sz="1200" b="0" i="1" smtClean="0">
+                                <a:latin typeface="Cambria Math" panose="02040503050406030204" pitchFamily="18" charset="0"/>
+                              </a:rPr>
+                            </m:ctrlPr>
+                          </m:sSubPr>
+                          <m:e>
+                            <m:r>
+                              <a:rPr lang="en-US" sz="1200" b="0" i="1" smtClean="0">
+                                <a:latin typeface="Cambria Math" panose="02040503050406030204" pitchFamily="18" charset="0"/>
+                              </a:rPr>
+                              <m:t>𝑏</m:t>
+                            </m:r>
+                          </m:e>
+                          <m:sub>
+                            <m:sSub>
+                              <m:sSubPr>
+                                <m:ctrlPr>
+                                  <a:rPr lang="en-US" sz="1200" b="0" i="1" smtClean="0">
+                                    <a:latin typeface="Cambria Math" panose="02040503050406030204" pitchFamily="18" charset="0"/>
+                                  </a:rPr>
+                                </m:ctrlPr>
+                              </m:sSubPr>
+                              <m:e>
+                                <m:r>
+                                  <a:rPr lang="en-US" sz="1200" b="0" i="1" smtClean="0">
+                                    <a:latin typeface="Cambria Math" panose="02040503050406030204" pitchFamily="18" charset="0"/>
+                                  </a:rPr>
+                                  <m:t>𝑥</m:t>
+                                </m:r>
+                              </m:e>
+                              <m:sub>
+                                <m:r>
+                                  <a:rPr lang="en-US" sz="1200" b="0" i="1" smtClean="0">
+                                    <a:latin typeface="Cambria Math" panose="02040503050406030204" pitchFamily="18" charset="0"/>
+                                  </a:rPr>
+                                  <m:t>1</m:t>
+                                </m:r>
+                              </m:sub>
+                            </m:sSub>
+                            <m:r>
+                              <a:rPr lang="en-US" sz="1200" b="0" i="1" smtClean="0">
+                                <a:latin typeface="Cambria Math" panose="02040503050406030204" pitchFamily="18" charset="0"/>
+                              </a:rPr>
+                              <m:t>,</m:t>
+                            </m:r>
+                            <m:sSub>
+                              <m:sSubPr>
+                                <m:ctrlPr>
+                                  <a:rPr lang="en-US" sz="1200" b="0" i="1" smtClean="0">
+                                    <a:latin typeface="Cambria Math" panose="02040503050406030204" pitchFamily="18" charset="0"/>
+                                  </a:rPr>
+                                </m:ctrlPr>
+                              </m:sSubPr>
+                              <m:e>
+                                <m:r>
+                                  <a:rPr lang="en-US" sz="1200" b="0" i="1" smtClean="0">
+                                    <a:latin typeface="Cambria Math" panose="02040503050406030204" pitchFamily="18" charset="0"/>
+                                  </a:rPr>
+                                  <m:t>𝑦</m:t>
+                                </m:r>
+                              </m:e>
+                              <m:sub>
+                                <m:r>
+                                  <a:rPr lang="en-US" sz="1200" b="0" i="1" smtClean="0">
+                                    <a:latin typeface="Cambria Math" panose="02040503050406030204" pitchFamily="18" charset="0"/>
+                                  </a:rPr>
+                                  <m:t>2</m:t>
+                                </m:r>
+                              </m:sub>
+                            </m:sSub>
+                            <m:r>
+                              <a:rPr lang="en-US" sz="1200" b="0" i="1" smtClean="0">
+                                <a:latin typeface="Cambria Math" panose="02040503050406030204" pitchFamily="18" charset="0"/>
+                              </a:rPr>
+                              <m:t>+1 </m:t>
+                            </m:r>
+                          </m:sub>
+                        </m:sSub>
+                        <m:r>
+                          <a:rPr lang="en-US" sz="1200" b="0" i="1" smtClean="0">
+                            <a:latin typeface="Cambria Math" panose="02040503050406030204" pitchFamily="18" charset="0"/>
+                          </a:rPr>
+                          <m:t>−</m:t>
+                        </m:r>
+                        <m:r>
+                          <a:rPr lang="en-US" sz="1200" b="0" i="1" smtClean="0">
+                            <a:latin typeface="Cambria Math" panose="02040503050406030204" pitchFamily="18" charset="0"/>
+                          </a:rPr>
+                          <m:t>𝑐</m:t>
+                        </m:r>
+                      </m:oMath>
+                    </m:oMathPara>
+                  </a14:m>
+                  <a:endParaRPr lang="en-US" sz="1200" dirty="0"/>
+                </a:p>
+              </p:txBody>
+            </p:sp>
+          </mc:Choice>
+          <mc:Fallback>
+            <p:sp>
+              <p:nvSpPr>
+                <p:cNvPr id="112" name="TextBox 111">
+                  <a:extLst>
+                    <a:ext uri="{FF2B5EF4-FFF2-40B4-BE49-F238E27FC236}">
+                      <a16:creationId xmlns:a16="http://schemas.microsoft.com/office/drawing/2014/main" id="{023F3A64-05F3-ED85-F752-5A6A4A87F8A8}"/>
+                    </a:ext>
+                  </a:extLst>
+                </p:cNvPr>
+                <p:cNvSpPr txBox="1">
+                  <a:spLocks noRot="1" noChangeAspect="1" noMove="1" noResize="1" noEditPoints="1" noAdjustHandles="1" noChangeArrowheads="1" noChangeShapeType="1" noTextEdit="1"/>
+                </p:cNvSpPr>
+                <p:nvPr/>
+              </p:nvSpPr>
+              <p:spPr>
+                <a:xfrm>
+                  <a:off x="7720672" y="6215329"/>
+                  <a:ext cx="1013001" cy="292901"/>
+                </a:xfrm>
+                <a:prstGeom prst="rect">
+                  <a:avLst/>
+                </a:prstGeom>
+                <a:blipFill>
+                  <a:blip r:embed="rId19"/>
+                  <a:stretch>
+                    <a:fillRect/>
+                  </a:stretch>
+                </a:blipFill>
+              </p:spPr>
+              <p:txBody>
+                <a:bodyPr/>
+                <a:lstStyle/>
+                <a:p>
+                  <a:r>
+                    <a:rPr lang="en-US">
+                      <a:noFill/>
+                    </a:rPr>
+                    <a:t> </a:t>
+                  </a:r>
+                </a:p>
+              </p:txBody>
+            </p:sp>
+          </mc:Fallback>
+        </mc:AlternateContent>
+        <mc:AlternateContent xmlns:mc="http://schemas.openxmlformats.org/markup-compatibility/2006">
+          <mc:Choice xmlns:a14="http://schemas.microsoft.com/office/drawing/2010/main" Requires="a14">
+            <p:sp>
+              <p:nvSpPr>
+                <p:cNvPr id="113" name="TextBox 112">
+                  <a:extLst>
+                    <a:ext uri="{FF2B5EF4-FFF2-40B4-BE49-F238E27FC236}">
+                      <a16:creationId xmlns:a16="http://schemas.microsoft.com/office/drawing/2014/main" id="{D5480997-CAFD-C8EB-5973-04E7B2E901EF}"/>
+                    </a:ext>
+                  </a:extLst>
+                </p:cNvPr>
+                <p:cNvSpPr txBox="1"/>
+                <p:nvPr/>
+              </p:nvSpPr>
+              <p:spPr>
+                <a:xfrm>
+                  <a:off x="9087877" y="6167606"/>
+                  <a:ext cx="1260318" cy="292901"/>
+                </a:xfrm>
+                <a:prstGeom prst="rect">
+                  <a:avLst/>
+                </a:prstGeom>
+                <a:noFill/>
+              </p:spPr>
+              <p:txBody>
+                <a:bodyPr wrap="square" rtlCol="0">
+                  <a:spAutoFit/>
+                </a:bodyPr>
+                <a:lstStyle/>
+                <a:p>
+                  <a:pPr/>
+                  <a14:m>
+                    <m:oMathPara xmlns:m="http://schemas.openxmlformats.org/officeDocument/2006/math">
+                      <m:oMathParaPr>
+                        <m:jc m:val="center"/>
+                      </m:oMathParaPr>
+                      <m:oMath xmlns:m="http://schemas.openxmlformats.org/officeDocument/2006/math">
+                        <m:sSub>
+                          <m:sSubPr>
+                            <m:ctrlPr>
+                              <a:rPr lang="en-US" sz="1200" b="0" i="1" smtClean="0">
+                                <a:latin typeface="Cambria Math" panose="02040503050406030204" pitchFamily="18" charset="0"/>
+                              </a:rPr>
+                            </m:ctrlPr>
+                          </m:sSubPr>
+                          <m:e>
+                            <m:r>
+                              <a:rPr lang="en-US" sz="1200" b="0" i="1" smtClean="0">
+                                <a:latin typeface="Cambria Math" panose="02040503050406030204" pitchFamily="18" charset="0"/>
+                              </a:rPr>
+                              <m:t>𝑏</m:t>
+                            </m:r>
+                          </m:e>
+                          <m:sub>
+                            <m:sSub>
+                              <m:sSubPr>
+                                <m:ctrlPr>
+                                  <a:rPr lang="en-US" sz="1200" b="0" i="1" smtClean="0">
+                                    <a:latin typeface="Cambria Math" panose="02040503050406030204" pitchFamily="18" charset="0"/>
+                                  </a:rPr>
+                                </m:ctrlPr>
+                              </m:sSubPr>
+                              <m:e>
+                                <m:r>
+                                  <a:rPr lang="en-US" sz="1200" b="0" i="1" smtClean="0">
+                                    <a:latin typeface="Cambria Math" panose="02040503050406030204" pitchFamily="18" charset="0"/>
+                                  </a:rPr>
+                                  <m:t>𝑥</m:t>
+                                </m:r>
+                              </m:e>
+                              <m:sub>
+                                <m:r>
+                                  <a:rPr lang="en-US" sz="1200" b="0" i="1" smtClean="0">
+                                    <a:latin typeface="Cambria Math" panose="02040503050406030204" pitchFamily="18" charset="0"/>
+                                  </a:rPr>
+                                  <m:t>2</m:t>
+                                </m:r>
+                              </m:sub>
+                            </m:sSub>
+                            <m:r>
+                              <a:rPr lang="en-US" sz="1200" b="0" i="1" smtClean="0">
+                                <a:latin typeface="Cambria Math" panose="02040503050406030204" pitchFamily="18" charset="0"/>
+                              </a:rPr>
+                              <m:t>+1,</m:t>
+                            </m:r>
+                            <m:sSub>
+                              <m:sSubPr>
+                                <m:ctrlPr>
+                                  <a:rPr lang="en-US" sz="1200" b="0" i="1" smtClean="0">
+                                    <a:latin typeface="Cambria Math" panose="02040503050406030204" pitchFamily="18" charset="0"/>
+                                  </a:rPr>
+                                </m:ctrlPr>
+                              </m:sSubPr>
+                              <m:e>
+                                <m:r>
+                                  <a:rPr lang="en-US" sz="1200" b="0" i="1" smtClean="0">
+                                    <a:latin typeface="Cambria Math" panose="02040503050406030204" pitchFamily="18" charset="0"/>
+                                  </a:rPr>
+                                  <m:t>𝑦</m:t>
+                                </m:r>
+                              </m:e>
+                              <m:sub>
+                                <m:r>
+                                  <a:rPr lang="en-US" sz="1200" b="0" i="1" smtClean="0">
+                                    <a:latin typeface="Cambria Math" panose="02040503050406030204" pitchFamily="18" charset="0"/>
+                                  </a:rPr>
+                                  <m:t>2</m:t>
+                                </m:r>
+                              </m:sub>
+                            </m:sSub>
+                            <m:r>
+                              <a:rPr lang="en-US" sz="1200" b="0" i="1" smtClean="0">
+                                <a:latin typeface="Cambria Math" panose="02040503050406030204" pitchFamily="18" charset="0"/>
+                              </a:rPr>
+                              <m:t>+1</m:t>
+                            </m:r>
+                          </m:sub>
+                        </m:sSub>
+                        <m:r>
+                          <a:rPr lang="en-US" sz="1200" b="0" i="1" smtClean="0">
+                            <a:latin typeface="Cambria Math" panose="02040503050406030204" pitchFamily="18" charset="0"/>
+                          </a:rPr>
+                          <m:t>+</m:t>
+                        </m:r>
+                        <m:r>
+                          <a:rPr lang="en-US" sz="1200" b="0" i="1" smtClean="0">
+                            <a:latin typeface="Cambria Math" panose="02040503050406030204" pitchFamily="18" charset="0"/>
+                          </a:rPr>
+                          <m:t>𝑐</m:t>
+                        </m:r>
+                      </m:oMath>
+                    </m:oMathPara>
+                  </a14:m>
+                  <a:endParaRPr lang="en-US" sz="1200" dirty="0"/>
+                </a:p>
+              </p:txBody>
+            </p:sp>
+          </mc:Choice>
+          <mc:Fallback>
+            <p:sp>
+              <p:nvSpPr>
+                <p:cNvPr id="113" name="TextBox 112">
+                  <a:extLst>
+                    <a:ext uri="{FF2B5EF4-FFF2-40B4-BE49-F238E27FC236}">
+                      <a16:creationId xmlns:a16="http://schemas.microsoft.com/office/drawing/2014/main" id="{D5480997-CAFD-C8EB-5973-04E7B2E901EF}"/>
+                    </a:ext>
+                  </a:extLst>
+                </p:cNvPr>
+                <p:cNvSpPr txBox="1">
+                  <a:spLocks noRot="1" noChangeAspect="1" noMove="1" noResize="1" noEditPoints="1" noAdjustHandles="1" noChangeArrowheads="1" noChangeShapeType="1" noTextEdit="1"/>
+                </p:cNvSpPr>
+                <p:nvPr/>
+              </p:nvSpPr>
+              <p:spPr>
+                <a:xfrm>
+                  <a:off x="9087877" y="6167606"/>
+                  <a:ext cx="1260318" cy="292901"/>
+                </a:xfrm>
+                <a:prstGeom prst="rect">
+                  <a:avLst/>
+                </a:prstGeom>
+                <a:blipFill>
+                  <a:blip r:embed="rId20"/>
+                  <a:stretch>
+                    <a:fillRect/>
                   </a:stretch>
                 </a:blipFill>
               </p:spPr>

</xml_diff>

<commit_message>
feat: add two-pointer and bit-manipulation problems
</commit_message>
<xml_diff>
--- a/basic/figures.pptx
+++ b/basic/figures.pptx
@@ -6,6 +6,7 @@
   </p:sldMasterIdLst>
   <p:sldIdLst>
     <p:sldId id="256" r:id="rId2"/>
+    <p:sldId id="257" r:id="rId3"/>
   </p:sldIdLst>
   <p:sldSz cx="12192000" cy="6858000"/>
   <p:notesSz cx="6858000" cy="9144000"/>
@@ -270,7 +271,7 @@
           <a:p>
             <a:fld id="{30F86D06-0C92-45D8-8D91-1C18C237B213}" type="datetimeFigureOut">
               <a:rPr lang="en-US" smtClean="0"/>
-              <a:t>11/22/2022</a:t>
+              <a:t>11/23/2022</a:t>
             </a:fld>
             <a:endParaRPr lang="en-US"/>
           </a:p>
@@ -468,7 +469,7 @@
           <a:p>
             <a:fld id="{30F86D06-0C92-45D8-8D91-1C18C237B213}" type="datetimeFigureOut">
               <a:rPr lang="en-US" smtClean="0"/>
-              <a:t>11/22/2022</a:t>
+              <a:t>11/23/2022</a:t>
             </a:fld>
             <a:endParaRPr lang="en-US"/>
           </a:p>
@@ -676,7 +677,7 @@
           <a:p>
             <a:fld id="{30F86D06-0C92-45D8-8D91-1C18C237B213}" type="datetimeFigureOut">
               <a:rPr lang="en-US" smtClean="0"/>
-              <a:t>11/22/2022</a:t>
+              <a:t>11/23/2022</a:t>
             </a:fld>
             <a:endParaRPr lang="en-US"/>
           </a:p>
@@ -874,7 +875,7 @@
           <a:p>
             <a:fld id="{30F86D06-0C92-45D8-8D91-1C18C237B213}" type="datetimeFigureOut">
               <a:rPr lang="en-US" smtClean="0"/>
-              <a:t>11/22/2022</a:t>
+              <a:t>11/23/2022</a:t>
             </a:fld>
             <a:endParaRPr lang="en-US"/>
           </a:p>
@@ -1149,7 +1150,7 @@
           <a:p>
             <a:fld id="{30F86D06-0C92-45D8-8D91-1C18C237B213}" type="datetimeFigureOut">
               <a:rPr lang="en-US" smtClean="0"/>
-              <a:t>11/22/2022</a:t>
+              <a:t>11/23/2022</a:t>
             </a:fld>
             <a:endParaRPr lang="en-US"/>
           </a:p>
@@ -1414,7 +1415,7 @@
           <a:p>
             <a:fld id="{30F86D06-0C92-45D8-8D91-1C18C237B213}" type="datetimeFigureOut">
               <a:rPr lang="en-US" smtClean="0"/>
-              <a:t>11/22/2022</a:t>
+              <a:t>11/23/2022</a:t>
             </a:fld>
             <a:endParaRPr lang="en-US"/>
           </a:p>
@@ -1826,7 +1827,7 @@
           <a:p>
             <a:fld id="{30F86D06-0C92-45D8-8D91-1C18C237B213}" type="datetimeFigureOut">
               <a:rPr lang="en-US" smtClean="0"/>
-              <a:t>11/22/2022</a:t>
+              <a:t>11/23/2022</a:t>
             </a:fld>
             <a:endParaRPr lang="en-US"/>
           </a:p>
@@ -1967,7 +1968,7 @@
           <a:p>
             <a:fld id="{30F86D06-0C92-45D8-8D91-1C18C237B213}" type="datetimeFigureOut">
               <a:rPr lang="en-US" smtClean="0"/>
-              <a:t>11/22/2022</a:t>
+              <a:t>11/23/2022</a:t>
             </a:fld>
             <a:endParaRPr lang="en-US"/>
           </a:p>
@@ -2080,7 +2081,7 @@
           <a:p>
             <a:fld id="{30F86D06-0C92-45D8-8D91-1C18C237B213}" type="datetimeFigureOut">
               <a:rPr lang="en-US" smtClean="0"/>
-              <a:t>11/22/2022</a:t>
+              <a:t>11/23/2022</a:t>
             </a:fld>
             <a:endParaRPr lang="en-US"/>
           </a:p>
@@ -2391,7 +2392,7 @@
           <a:p>
             <a:fld id="{30F86D06-0C92-45D8-8D91-1C18C237B213}" type="datetimeFigureOut">
               <a:rPr lang="en-US" smtClean="0"/>
-              <a:t>11/22/2022</a:t>
+              <a:t>11/23/2022</a:t>
             </a:fld>
             <a:endParaRPr lang="en-US"/>
           </a:p>
@@ -2679,7 +2680,7 @@
           <a:p>
             <a:fld id="{30F86D06-0C92-45D8-8D91-1C18C237B213}" type="datetimeFigureOut">
               <a:rPr lang="en-US" smtClean="0"/>
-              <a:t>11/22/2022</a:t>
+              <a:t>11/23/2022</a:t>
             </a:fld>
             <a:endParaRPr lang="en-US"/>
           </a:p>
@@ -2920,7 +2921,7 @@
           <a:p>
             <a:fld id="{30F86D06-0C92-45D8-8D91-1C18C237B213}" type="datetimeFigureOut">
               <a:rPr lang="en-US" smtClean="0"/>
-              <a:t>11/22/2022</a:t>
+              <a:t>11/23/2022</a:t>
             </a:fld>
             <a:endParaRPr lang="en-US"/>
           </a:p>
@@ -5686,8 +5687,8 @@
             </a:p>
           </p:txBody>
         </p:sp>
-        <mc:AlternateContent xmlns:mc="http://schemas.openxmlformats.org/markup-compatibility/2006">
-          <mc:Choice xmlns:a14="http://schemas.microsoft.com/office/drawing/2010/main" Requires="a14">
+        <mc:AlternateContent xmlns:mc="http://schemas.openxmlformats.org/markup-compatibility/2006" xmlns:a14="http://schemas.microsoft.com/office/drawing/2010/main">
+          <mc:Choice Requires="a14">
             <p:sp>
               <p:nvSpPr>
                 <p:cNvPr id="47" name="TextBox 46">
@@ -5737,7 +5738,7 @@
               </p:txBody>
             </p:sp>
           </mc:Choice>
-          <mc:Fallback>
+          <mc:Fallback xmlns="">
             <p:sp>
               <p:nvSpPr>
                 <p:cNvPr id="47" name="TextBox 46">
@@ -5782,8 +5783,8 @@
             </p:sp>
           </mc:Fallback>
         </mc:AlternateContent>
-        <mc:AlternateContent xmlns:mc="http://schemas.openxmlformats.org/markup-compatibility/2006">
-          <mc:Choice xmlns:a14="http://schemas.microsoft.com/office/drawing/2010/main" Requires="a14">
+        <mc:AlternateContent xmlns:mc="http://schemas.openxmlformats.org/markup-compatibility/2006" xmlns:a14="http://schemas.microsoft.com/office/drawing/2010/main">
+          <mc:Choice Requires="a14">
             <p:sp>
               <p:nvSpPr>
                 <p:cNvPr id="75" name="TextBox 74">
@@ -5833,7 +5834,7 @@
               </p:txBody>
             </p:sp>
           </mc:Choice>
-          <mc:Fallback>
+          <mc:Fallback xmlns="">
             <p:sp>
               <p:nvSpPr>
                 <p:cNvPr id="75" name="TextBox 74">
@@ -5878,8 +5879,8 @@
             </p:sp>
           </mc:Fallback>
         </mc:AlternateContent>
-        <mc:AlternateContent xmlns:mc="http://schemas.openxmlformats.org/markup-compatibility/2006">
-          <mc:Choice xmlns:a14="http://schemas.microsoft.com/office/drawing/2010/main" Requires="a14">
+        <mc:AlternateContent xmlns:mc="http://schemas.openxmlformats.org/markup-compatibility/2006" xmlns:a14="http://schemas.microsoft.com/office/drawing/2010/main">
+          <mc:Choice Requires="a14">
             <p:sp>
               <p:nvSpPr>
                 <p:cNvPr id="76" name="TextBox 75">
@@ -5929,7 +5930,7 @@
               </p:txBody>
             </p:sp>
           </mc:Choice>
-          <mc:Fallback>
+          <mc:Fallback xmlns="">
             <p:sp>
               <p:nvSpPr>
                 <p:cNvPr id="76" name="TextBox 75">
@@ -5974,8 +5975,8 @@
             </p:sp>
           </mc:Fallback>
         </mc:AlternateContent>
-        <mc:AlternateContent xmlns:mc="http://schemas.openxmlformats.org/markup-compatibility/2006">
-          <mc:Choice xmlns:a14="http://schemas.microsoft.com/office/drawing/2010/main" Requires="a14">
+        <mc:AlternateContent xmlns:mc="http://schemas.openxmlformats.org/markup-compatibility/2006" xmlns:a14="http://schemas.microsoft.com/office/drawing/2010/main">
+          <mc:Choice Requires="a14">
             <p:sp>
               <p:nvSpPr>
                 <p:cNvPr id="79" name="TextBox 78">
@@ -6044,7 +6045,7 @@
               </p:txBody>
             </p:sp>
           </mc:Choice>
-          <mc:Fallback>
+          <mc:Fallback xmlns="">
             <p:sp>
               <p:nvSpPr>
                 <p:cNvPr id="79" name="TextBox 78">
@@ -6089,8 +6090,8 @@
             </p:sp>
           </mc:Fallback>
         </mc:AlternateContent>
-        <mc:AlternateContent xmlns:mc="http://schemas.openxmlformats.org/markup-compatibility/2006">
-          <mc:Choice xmlns:a14="http://schemas.microsoft.com/office/drawing/2010/main" Requires="a14">
+        <mc:AlternateContent xmlns:mc="http://schemas.openxmlformats.org/markup-compatibility/2006" xmlns:a14="http://schemas.microsoft.com/office/drawing/2010/main">
+          <mc:Choice Requires="a14">
             <p:sp>
               <p:nvSpPr>
                 <p:cNvPr id="80" name="TextBox 79">
@@ -6159,7 +6160,7 @@
               </p:txBody>
             </p:sp>
           </mc:Choice>
-          <mc:Fallback>
+          <mc:Fallback xmlns="">
             <p:sp>
               <p:nvSpPr>
                 <p:cNvPr id="80" name="TextBox 79">
@@ -6204,8 +6205,8 @@
             </p:sp>
           </mc:Fallback>
         </mc:AlternateContent>
-        <mc:AlternateContent xmlns:mc="http://schemas.openxmlformats.org/markup-compatibility/2006">
-          <mc:Choice xmlns:a14="http://schemas.microsoft.com/office/drawing/2010/main" Requires="a14">
+        <mc:AlternateContent xmlns:mc="http://schemas.openxmlformats.org/markup-compatibility/2006" xmlns:a14="http://schemas.microsoft.com/office/drawing/2010/main">
+          <mc:Choice Requires="a14">
             <p:sp>
               <p:nvSpPr>
                 <p:cNvPr id="81" name="TextBox 80">
@@ -6467,7 +6468,7 @@
               </p:txBody>
             </p:sp>
           </mc:Choice>
-          <mc:Fallback>
+          <mc:Fallback xmlns="">
             <p:sp>
               <p:nvSpPr>
                 <p:cNvPr id="81" name="TextBox 80">
@@ -7581,8 +7582,8 @@
             </a:p>
           </p:txBody>
         </p:sp>
-        <mc:AlternateContent xmlns:mc="http://schemas.openxmlformats.org/markup-compatibility/2006">
-          <mc:Choice xmlns:a14="http://schemas.microsoft.com/office/drawing/2010/main" Requires="a14">
+        <mc:AlternateContent xmlns:mc="http://schemas.openxmlformats.org/markup-compatibility/2006" xmlns:a14="http://schemas.microsoft.com/office/drawing/2010/main">
+          <mc:Choice Requires="a14">
             <p:sp>
               <p:nvSpPr>
                 <p:cNvPr id="105" name="TextBox 104">
@@ -7694,7 +7695,7 @@
               </p:txBody>
             </p:sp>
           </mc:Choice>
-          <mc:Fallback>
+          <mc:Fallback xmlns="">
             <p:sp>
               <p:nvSpPr>
                 <p:cNvPr id="105" name="TextBox 104">
@@ -7739,8 +7740,8 @@
             </p:sp>
           </mc:Fallback>
         </mc:AlternateContent>
-        <mc:AlternateContent xmlns:mc="http://schemas.openxmlformats.org/markup-compatibility/2006">
-          <mc:Choice xmlns:a14="http://schemas.microsoft.com/office/drawing/2010/main" Requires="a14">
+        <mc:AlternateContent xmlns:mc="http://schemas.openxmlformats.org/markup-compatibility/2006" xmlns:a14="http://schemas.microsoft.com/office/drawing/2010/main">
+          <mc:Choice Requires="a14">
             <p:sp>
               <p:nvSpPr>
                 <p:cNvPr id="107" name="TextBox 106">
@@ -7852,7 +7853,7 @@
               </p:txBody>
             </p:sp>
           </mc:Choice>
-          <mc:Fallback>
+          <mc:Fallback xmlns="">
             <p:sp>
               <p:nvSpPr>
                 <p:cNvPr id="107" name="TextBox 106">
@@ -7897,8 +7898,8 @@
             </p:sp>
           </mc:Fallback>
         </mc:AlternateContent>
-        <mc:AlternateContent xmlns:mc="http://schemas.openxmlformats.org/markup-compatibility/2006">
-          <mc:Choice xmlns:a14="http://schemas.microsoft.com/office/drawing/2010/main" Requires="a14">
+        <mc:AlternateContent xmlns:mc="http://schemas.openxmlformats.org/markup-compatibility/2006" xmlns:a14="http://schemas.microsoft.com/office/drawing/2010/main">
+          <mc:Choice Requires="a14">
             <p:sp>
               <p:nvSpPr>
                 <p:cNvPr id="110" name="TextBox 109">
@@ -8029,7 +8030,7 @@
               </p:txBody>
             </p:sp>
           </mc:Choice>
-          <mc:Fallback>
+          <mc:Fallback xmlns="">
             <p:sp>
               <p:nvSpPr>
                 <p:cNvPr id="110" name="TextBox 109">
@@ -8074,8 +8075,8 @@
             </p:sp>
           </mc:Fallback>
         </mc:AlternateContent>
-        <mc:AlternateContent xmlns:mc="http://schemas.openxmlformats.org/markup-compatibility/2006">
-          <mc:Choice xmlns:a14="http://schemas.microsoft.com/office/drawing/2010/main" Requires="a14">
+        <mc:AlternateContent xmlns:mc="http://schemas.openxmlformats.org/markup-compatibility/2006" xmlns:a14="http://schemas.microsoft.com/office/drawing/2010/main">
+          <mc:Choice Requires="a14">
             <p:sp>
               <p:nvSpPr>
                 <p:cNvPr id="111" name="TextBox 110">
@@ -8206,7 +8207,7 @@
               </p:txBody>
             </p:sp>
           </mc:Choice>
-          <mc:Fallback>
+          <mc:Fallback xmlns="">
             <p:sp>
               <p:nvSpPr>
                 <p:cNvPr id="111" name="TextBox 110">
@@ -8251,8 +8252,8 @@
             </p:sp>
           </mc:Fallback>
         </mc:AlternateContent>
-        <mc:AlternateContent xmlns:mc="http://schemas.openxmlformats.org/markup-compatibility/2006">
-          <mc:Choice xmlns:a14="http://schemas.microsoft.com/office/drawing/2010/main" Requires="a14">
+        <mc:AlternateContent xmlns:mc="http://schemas.openxmlformats.org/markup-compatibility/2006" xmlns:a14="http://schemas.microsoft.com/office/drawing/2010/main">
+          <mc:Choice Requires="a14">
             <p:sp>
               <p:nvSpPr>
                 <p:cNvPr id="112" name="TextBox 111">
@@ -8389,7 +8390,7 @@
               </p:txBody>
             </p:sp>
           </mc:Choice>
-          <mc:Fallback>
+          <mc:Fallback xmlns="">
             <p:sp>
               <p:nvSpPr>
                 <p:cNvPr id="112" name="TextBox 111">
@@ -8434,8 +8435,8 @@
             </p:sp>
           </mc:Fallback>
         </mc:AlternateContent>
-        <mc:AlternateContent xmlns:mc="http://schemas.openxmlformats.org/markup-compatibility/2006">
-          <mc:Choice xmlns:a14="http://schemas.microsoft.com/office/drawing/2010/main" Requires="a14">
+        <mc:AlternateContent xmlns:mc="http://schemas.openxmlformats.org/markup-compatibility/2006" xmlns:a14="http://schemas.microsoft.com/office/drawing/2010/main">
+          <mc:Choice Requires="a14">
             <p:sp>
               <p:nvSpPr>
                 <p:cNvPr id="113" name="TextBox 112">
@@ -8572,7 +8573,7 @@
               </p:txBody>
             </p:sp>
           </mc:Choice>
-          <mc:Fallback>
+          <mc:Fallback xmlns="">
             <p:sp>
               <p:nvSpPr>
                 <p:cNvPr id="113" name="TextBox 112">
@@ -8618,10 +8619,499 @@
           </mc:Fallback>
         </mc:AlternateContent>
       </p:grpSp>
+      <mc:AlternateContent xmlns:mc="http://schemas.openxmlformats.org/markup-compatibility/2006">
+        <mc:Choice xmlns:a14="http://schemas.microsoft.com/office/drawing/2010/main" Requires="a14">
+          <p:sp>
+            <p:nvSpPr>
+              <p:cNvPr id="7" name="TextBox 6">
+                <a:extLst>
+                  <a:ext uri="{FF2B5EF4-FFF2-40B4-BE49-F238E27FC236}">
+                    <a16:creationId xmlns:a16="http://schemas.microsoft.com/office/drawing/2014/main" id="{CDC3E803-988D-F629-2607-74BC674DF728}"/>
+                  </a:ext>
+                </a:extLst>
+              </p:cNvPr>
+              <p:cNvSpPr txBox="1"/>
+              <p:nvPr/>
+            </p:nvSpPr>
+            <p:spPr>
+              <a:xfrm>
+                <a:off x="6916534" y="2066119"/>
+                <a:ext cx="2862466" cy="983474"/>
+              </a:xfrm>
+              <a:prstGeom prst="rect">
+                <a:avLst/>
+              </a:prstGeom>
+              <a:noFill/>
+            </p:spPr>
+            <p:txBody>
+              <a:bodyPr wrap="square" rtlCol="0">
+                <a:spAutoFit/>
+              </a:bodyPr>
+              <a:lstStyle/>
+              <a:p>
+                <a:pPr/>
+                <a14:m>
+                  <m:oMathPara xmlns:m="http://schemas.openxmlformats.org/officeDocument/2006/math">
+                    <m:oMathParaPr>
+                      <m:jc m:val="right"/>
+                    </m:oMathParaPr>
+                    <m:oMath xmlns:m="http://schemas.openxmlformats.org/officeDocument/2006/math">
+                      <m:m>
+                        <m:mPr>
+                          <m:mcs>
+                            <m:mc>
+                              <m:mcPr>
+                                <m:count m:val="5"/>
+                                <m:mcJc m:val="center"/>
+                              </m:mcPr>
+                            </m:mc>
+                          </m:mcs>
+                          <m:ctrlPr>
+                            <a:rPr lang="en-US" sz="1200" b="0" i="1" smtClean="0">
+                              <a:latin typeface="Cambria Math" panose="02040503050406030204" pitchFamily="18" charset="0"/>
+                            </a:rPr>
+                          </m:ctrlPr>
+                        </m:mPr>
+                        <m:mr>
+                          <m:e>
+                            <m:r>
+                              <m:rPr>
+                                <m:brk m:alnAt="7"/>
+                              </m:rPr>
+                              <a:rPr lang="en-US" sz="1200" b="0" i="1" smtClean="0">
+                                <a:latin typeface="Cambria Math" panose="02040503050406030204" pitchFamily="18" charset="0"/>
+                              </a:rPr>
+                              <m:t>𝑖</m:t>
+                            </m:r>
+                          </m:e>
+                          <m:e>
+                            <m:r>
+                              <a:rPr lang="en-US" sz="1200" b="0" i="1" smtClean="0">
+                                <a:latin typeface="Cambria Math" panose="02040503050406030204" pitchFamily="18" charset="0"/>
+                              </a:rPr>
+                              <m:t>=</m:t>
+                            </m:r>
+                          </m:e>
+                          <m:e>
+                            <m:limLow>
+                              <m:limLowPr>
+                                <m:ctrlPr>
+                                  <a:rPr lang="en-US" sz="1200" i="1">
+                                    <a:latin typeface="Cambria Math" panose="02040503050406030204" pitchFamily="18" charset="0"/>
+                                  </a:rPr>
+                                </m:ctrlPr>
+                              </m:limLowPr>
+                              <m:e>
+                                <m:groupChr>
+                                  <m:groupChrPr>
+                                    <m:chr m:val="⏟"/>
+                                    <m:ctrlPr>
+                                      <a:rPr lang="en-US" sz="1200" i="1">
+                                        <a:latin typeface="Cambria Math" panose="02040503050406030204" pitchFamily="18" charset="0"/>
+                                      </a:rPr>
+                                    </m:ctrlPr>
+                                  </m:groupChrPr>
+                                  <m:e>
+                                    <m:r>
+                                      <a:rPr lang="en-US" sz="1200" i="1">
+                                        <a:latin typeface="Cambria Math" panose="02040503050406030204" pitchFamily="18" charset="0"/>
+                                      </a:rPr>
+                                      <m:t>10…0</m:t>
+                                    </m:r>
+                                  </m:e>
+                                </m:groupChr>
+                              </m:e>
+                              <m:lim>
+                                <m:r>
+                                  <m:rPr>
+                                    <m:sty m:val="p"/>
+                                  </m:rPr>
+                                  <a:rPr lang="en-US" sz="1200">
+                                    <a:latin typeface="Cambria Math" panose="02040503050406030204" pitchFamily="18" charset="0"/>
+                                  </a:rPr>
+                                  <m:t>cancel</m:t>
+                                </m:r>
+                              </m:lim>
+                            </m:limLow>
+                          </m:e>
+                          <m:e>
+                            <m:limLow>
+                              <m:limLowPr>
+                                <m:ctrlPr>
+                                  <a:rPr lang="en-US" sz="1200" i="1">
+                                    <a:latin typeface="Cambria Math" panose="02040503050406030204" pitchFamily="18" charset="0"/>
+                                  </a:rPr>
+                                </m:ctrlPr>
+                              </m:limLowPr>
+                              <m:e>
+                                <m:groupChr>
+                                  <m:groupChrPr>
+                                    <m:chr m:val="⏟"/>
+                                    <m:ctrlPr>
+                                      <a:rPr lang="en-US" sz="1200" i="1">
+                                        <a:latin typeface="Cambria Math" panose="02040503050406030204" pitchFamily="18" charset="0"/>
+                                      </a:rPr>
+                                    </m:ctrlPr>
+                                  </m:groupChrPr>
+                                  <m:e>
+                                    <m:r>
+                                      <a:rPr lang="en-US" sz="1200" i="1">
+                                        <a:latin typeface="Cambria Math" panose="02040503050406030204" pitchFamily="18" charset="0"/>
+                                      </a:rPr>
+                                      <m:t>1</m:t>
+                                    </m:r>
+                                  </m:e>
+                                </m:groupChr>
+                              </m:e>
+                              <m:lim>
+                                <m:r>
+                                  <m:rPr>
+                                    <m:sty m:val="p"/>
+                                  </m:rPr>
+                                  <a:rPr lang="en-US" sz="1200">
+                                    <a:latin typeface="Cambria Math" panose="02040503050406030204" pitchFamily="18" charset="0"/>
+                                  </a:rPr>
+                                  <m:t>last</m:t>
+                                </m:r>
+                                <m:r>
+                                  <a:rPr lang="en-US" sz="1200">
+                                    <a:latin typeface="Cambria Math" panose="02040503050406030204" pitchFamily="18" charset="0"/>
+                                  </a:rPr>
+                                  <m:t> </m:t>
+                                </m:r>
+                                <m:r>
+                                  <m:rPr>
+                                    <m:sty m:val="p"/>
+                                  </m:rPr>
+                                  <a:rPr lang="en-US" sz="1200">
+                                    <a:latin typeface="Cambria Math" panose="02040503050406030204" pitchFamily="18" charset="0"/>
+                                  </a:rPr>
+                                  <m:t>bit</m:t>
+                                </m:r>
+                              </m:lim>
+                            </m:limLow>
+                          </m:e>
+                          <m:e>
+                            <m:limLow>
+                              <m:limLowPr>
+                                <m:ctrlPr>
+                                  <a:rPr lang="en-US" sz="1200" i="1">
+                                    <a:latin typeface="Cambria Math" panose="02040503050406030204" pitchFamily="18" charset="0"/>
+                                  </a:rPr>
+                                </m:ctrlPr>
+                              </m:limLowPr>
+                              <m:e>
+                                <m:groupChr>
+                                  <m:groupChrPr>
+                                    <m:chr m:val="⏟"/>
+                                    <m:ctrlPr>
+                                      <a:rPr lang="en-US" sz="1200" i="1">
+                                        <a:latin typeface="Cambria Math" panose="02040503050406030204" pitchFamily="18" charset="0"/>
+                                      </a:rPr>
+                                    </m:ctrlPr>
+                                  </m:groupChrPr>
+                                  <m:e>
+                                    <m:r>
+                                      <a:rPr lang="en-US" sz="1200" i="1">
+                                        <a:latin typeface="Cambria Math" panose="02040503050406030204" pitchFamily="18" charset="0"/>
+                                      </a:rPr>
+                                      <m:t>0…0</m:t>
+                                    </m:r>
+                                  </m:e>
+                                </m:groupChr>
+                              </m:e>
+                              <m:lim>
+                                <m:r>
+                                  <m:rPr>
+                                    <m:sty m:val="p"/>
+                                  </m:rPr>
+                                  <a:rPr lang="en-US" sz="1200">
+                                    <a:latin typeface="Cambria Math" panose="02040503050406030204" pitchFamily="18" charset="0"/>
+                                  </a:rPr>
+                                  <m:t>trailing</m:t>
+                                </m:r>
+                                <m:r>
+                                  <a:rPr lang="en-US" sz="1200">
+                                    <a:latin typeface="Cambria Math" panose="02040503050406030204" pitchFamily="18" charset="0"/>
+                                  </a:rPr>
+                                  <m:t> </m:t>
+                                </m:r>
+                                <m:r>
+                                  <a:rPr lang="en-US" sz="1200" i="1">
+                                    <a:latin typeface="Cambria Math" panose="02040503050406030204" pitchFamily="18" charset="0"/>
+                                  </a:rPr>
+                                  <m:t>0</m:t>
+                                </m:r>
+                              </m:lim>
+                            </m:limLow>
+                          </m:e>
+                        </m:mr>
+                        <m:mr>
+                          <m:e>
+                            <m:r>
+                              <a:rPr lang="en-US" sz="1200" b="0" i="1" smtClean="0">
+                                <a:latin typeface="Cambria Math" panose="02040503050406030204" pitchFamily="18" charset="0"/>
+                              </a:rPr>
+                              <m:t>~</m:t>
+                            </m:r>
+                            <m:r>
+                              <a:rPr lang="en-US" sz="1200" b="0" i="1" smtClean="0">
+                                <a:latin typeface="Cambria Math" panose="02040503050406030204" pitchFamily="18" charset="0"/>
+                              </a:rPr>
+                              <m:t>𝑖</m:t>
+                            </m:r>
+                          </m:e>
+                          <m:e>
+                            <m:r>
+                              <a:rPr lang="en-US" sz="1200" b="0" i="1" smtClean="0">
+                                <a:latin typeface="Cambria Math" panose="02040503050406030204" pitchFamily="18" charset="0"/>
+                              </a:rPr>
+                              <m:t>=</m:t>
+                            </m:r>
+                          </m:e>
+                          <m:e>
+                            <m:r>
+                              <a:rPr lang="en-US" sz="1200" i="1">
+                                <a:latin typeface="Cambria Math" panose="02040503050406030204" pitchFamily="18" charset="0"/>
+                              </a:rPr>
+                              <m:t>01…0</m:t>
+                            </m:r>
+                          </m:e>
+                          <m:e>
+                            <m:groupChr>
+                              <m:groupChrPr>
+                                <m:chr m:val="⏟"/>
+                                <m:ctrlPr>
+                                  <a:rPr lang="en-US" sz="1200" i="1">
+                                    <a:latin typeface="Cambria Math" panose="02040503050406030204" pitchFamily="18" charset="0"/>
+                                  </a:rPr>
+                                </m:ctrlPr>
+                              </m:groupChrPr>
+                              <m:e>
+                                <m:r>
+                                  <a:rPr lang="en-US" sz="1200" i="1">
+                                    <a:latin typeface="Cambria Math" panose="02040503050406030204" pitchFamily="18" charset="0"/>
+                                  </a:rPr>
+                                  <m:t>0</m:t>
+                                </m:r>
+                              </m:e>
+                            </m:groupChr>
+                          </m:e>
+                          <m:e>
+                            <m:r>
+                              <a:rPr lang="en-US" sz="1200" i="1">
+                                <a:latin typeface="Cambria Math" panose="02040503050406030204" pitchFamily="18" charset="0"/>
+                              </a:rPr>
+                              <m:t>1…1</m:t>
+                            </m:r>
+                          </m:e>
+                        </m:mr>
+                        <m:mr>
+                          <m:e>
+                            <m:r>
+                              <a:rPr lang="en-US" sz="1200" b="0" i="1" smtClean="0">
+                                <a:latin typeface="Cambria Math" panose="02040503050406030204" pitchFamily="18" charset="0"/>
+                              </a:rPr>
+                              <m:t>~</m:t>
+                            </m:r>
+                            <m:r>
+                              <a:rPr lang="en-US" sz="1200" b="0" i="1" smtClean="0">
+                                <a:latin typeface="Cambria Math" panose="02040503050406030204" pitchFamily="18" charset="0"/>
+                              </a:rPr>
+                              <m:t>𝑖</m:t>
+                            </m:r>
+                            <m:r>
+                              <a:rPr lang="en-US" sz="1200" b="0" i="1" smtClean="0">
+                                <a:latin typeface="Cambria Math" panose="02040503050406030204" pitchFamily="18" charset="0"/>
+                              </a:rPr>
+                              <m:t>+1</m:t>
+                            </m:r>
+                          </m:e>
+                          <m:e>
+                            <m:r>
+                              <a:rPr lang="en-US" sz="1200" b="0" i="1" smtClean="0">
+                                <a:latin typeface="Cambria Math" panose="02040503050406030204" pitchFamily="18" charset="0"/>
+                              </a:rPr>
+                              <m:t>=</m:t>
+                            </m:r>
+                          </m:e>
+                          <m:e>
+                            <m:r>
+                              <a:rPr lang="en-US" sz="1200" i="1">
+                                <a:latin typeface="Cambria Math" panose="02040503050406030204" pitchFamily="18" charset="0"/>
+                              </a:rPr>
+                              <m:t>01…0</m:t>
+                            </m:r>
+                          </m:e>
+                          <m:e>
+                            <m:limLow>
+                              <m:limLowPr>
+                                <m:ctrlPr>
+                                  <a:rPr lang="en-US" sz="1200" i="1">
+                                    <a:latin typeface="Cambria Math" panose="02040503050406030204" pitchFamily="18" charset="0"/>
+                                  </a:rPr>
+                                </m:ctrlPr>
+                              </m:limLowPr>
+                              <m:e>
+                                <m:groupChr>
+                                  <m:groupChrPr>
+                                    <m:chr m:val="⏟"/>
+                                    <m:ctrlPr>
+                                      <a:rPr lang="en-US" sz="1200" i="1">
+                                        <a:latin typeface="Cambria Math" panose="02040503050406030204" pitchFamily="18" charset="0"/>
+                                      </a:rPr>
+                                    </m:ctrlPr>
+                                  </m:groupChrPr>
+                                  <m:e>
+                                    <m:r>
+                                      <a:rPr lang="en-US" sz="1200" i="1">
+                                        <a:latin typeface="Cambria Math" panose="02040503050406030204" pitchFamily="18" charset="0"/>
+                                      </a:rPr>
+                                      <m:t>1</m:t>
+                                    </m:r>
+                                  </m:e>
+                                </m:groupChr>
+                              </m:e>
+                              <m:lim>
+                                <m:r>
+                                  <m:rPr>
+                                    <m:sty m:val="p"/>
+                                  </m:rPr>
+                                  <a:rPr lang="en-US" sz="1200">
+                                    <a:latin typeface="Cambria Math" panose="02040503050406030204" pitchFamily="18" charset="0"/>
+                                  </a:rPr>
+                                  <m:t>perserved</m:t>
+                                </m:r>
+                              </m:lim>
+                            </m:limLow>
+                          </m:e>
+                          <m:e>
+                            <m:r>
+                              <a:rPr lang="en-US" sz="1200" i="1">
+                                <a:latin typeface="Cambria Math" panose="02040503050406030204" pitchFamily="18" charset="0"/>
+                              </a:rPr>
+                              <m:t>0…0</m:t>
+                            </m:r>
+                          </m:e>
+                        </m:mr>
+                      </m:m>
+                    </m:oMath>
+                  </m:oMathPara>
+                </a14:m>
+                <a:endParaRPr lang="en-US" sz="1200" dirty="0"/>
+              </a:p>
+            </p:txBody>
+          </p:sp>
+        </mc:Choice>
+        <mc:Fallback>
+          <p:sp>
+            <p:nvSpPr>
+              <p:cNvPr id="7" name="TextBox 6">
+                <a:extLst>
+                  <a:ext uri="{FF2B5EF4-FFF2-40B4-BE49-F238E27FC236}">
+                    <a16:creationId xmlns:a16="http://schemas.microsoft.com/office/drawing/2014/main" id="{CDC3E803-988D-F629-2607-74BC674DF728}"/>
+                  </a:ext>
+                </a:extLst>
+              </p:cNvPr>
+              <p:cNvSpPr txBox="1">
+                <a:spLocks noRot="1" noChangeAspect="1" noMove="1" noResize="1" noEditPoints="1" noAdjustHandles="1" noChangeArrowheads="1" noChangeShapeType="1" noTextEdit="1"/>
+              </p:cNvSpPr>
+              <p:nvPr/>
+            </p:nvSpPr>
+            <p:spPr>
+              <a:xfrm>
+                <a:off x="6916534" y="2066119"/>
+                <a:ext cx="2862466" cy="983474"/>
+              </a:xfrm>
+              <a:prstGeom prst="rect">
+                <a:avLst/>
+              </a:prstGeom>
+              <a:blipFill>
+                <a:blip r:embed="rId21"/>
+                <a:stretch>
+                  <a:fillRect/>
+                </a:stretch>
+              </a:blipFill>
+            </p:spPr>
+            <p:txBody>
+              <a:bodyPr/>
+              <a:lstStyle/>
+              <a:p>
+                <a:r>
+                  <a:rPr lang="en-US">
+                    <a:noFill/>
+                  </a:rPr>
+                  <a:t> </a:t>
+                </a:r>
+              </a:p>
+            </p:txBody>
+          </p:sp>
+        </mc:Fallback>
+      </mc:AlternateContent>
+      <p:pic>
+        <p:nvPicPr>
+          <p:cNvPr id="10" name="Picture 9">
+            <a:extLst>
+              <a:ext uri="{FF2B5EF4-FFF2-40B4-BE49-F238E27FC236}">
+                <a16:creationId xmlns:a16="http://schemas.microsoft.com/office/drawing/2014/main" id="{2D158EE5-FDA3-6117-EC57-D4E99CF5A129}"/>
+              </a:ext>
+            </a:extLst>
+          </p:cNvPr>
+          <p:cNvPicPr>
+            <a:picLocks noChangeAspect="1"/>
+          </p:cNvPicPr>
+          <p:nvPr/>
+        </p:nvPicPr>
+        <p:blipFill>
+          <a:blip r:embed="rId21"/>
+          <a:stretch>
+            <a:fillRect/>
+          </a:stretch>
+        </p:blipFill>
+        <p:spPr>
+          <a:xfrm>
+            <a:off x="6096000" y="772790"/>
+            <a:ext cx="2859272" cy="981541"/>
+          </a:xfrm>
+          <a:prstGeom prst="rect">
+            <a:avLst/>
+          </a:prstGeom>
+        </p:spPr>
+      </p:pic>
     </p:spTree>
     <p:extLst>
       <p:ext uri="{BB962C8B-B14F-4D97-AF65-F5344CB8AC3E}">
         <p14:creationId xmlns:p14="http://schemas.microsoft.com/office/powerpoint/2010/main" val="530098450"/>
+      </p:ext>
+    </p:extLst>
+  </p:cSld>
+  <p:clrMapOvr>
+    <a:masterClrMapping/>
+  </p:clrMapOvr>
+</p:sld>
+</file>
+
+<file path=ppt/slides/slide2.xml><?xml version="1.0" encoding="utf-8"?>
+<p:sld xmlns:a="http://schemas.openxmlformats.org/drawingml/2006/main" xmlns:r="http://schemas.openxmlformats.org/officeDocument/2006/relationships" xmlns:p="http://schemas.openxmlformats.org/presentationml/2006/main">
+  <p:cSld>
+    <p:spTree>
+      <p:nvGrpSpPr>
+        <p:cNvPr id="1" name=""/>
+        <p:cNvGrpSpPr/>
+        <p:nvPr/>
+      </p:nvGrpSpPr>
+      <p:grpSpPr>
+        <a:xfrm>
+          <a:off x="0" y="0"/>
+          <a:ext cx="0" cy="0"/>
+          <a:chOff x="0" y="0"/>
+          <a:chExt cx="0" cy="0"/>
+        </a:xfrm>
+      </p:grpSpPr>
+    </p:spTree>
+    <p:extLst>
+      <p:ext uri="{BB962C8B-B14F-4D97-AF65-F5344CB8AC3E}">
+        <p14:creationId xmlns:p14="http://schemas.microsoft.com/office/powerpoint/2010/main" val="3352134637"/>
       </p:ext>
     </p:extLst>
   </p:cSld>

</xml_diff>

<commit_message>
feat: add data structure and dynamic programming
</commit_message>
<xml_diff>
--- a/basic/figures.pptx
+++ b/basic/figures.pptx
@@ -271,7 +271,7 @@
           <a:p>
             <a:fld id="{30F86D06-0C92-45D8-8D91-1C18C237B213}" type="datetimeFigureOut">
               <a:rPr lang="en-US" smtClean="0"/>
-              <a:t>11/23/2022</a:t>
+              <a:t>11/24/2022</a:t>
             </a:fld>
             <a:endParaRPr lang="en-US"/>
           </a:p>
@@ -469,7 +469,7 @@
           <a:p>
             <a:fld id="{30F86D06-0C92-45D8-8D91-1C18C237B213}" type="datetimeFigureOut">
               <a:rPr lang="en-US" smtClean="0"/>
-              <a:t>11/23/2022</a:t>
+              <a:t>11/24/2022</a:t>
             </a:fld>
             <a:endParaRPr lang="en-US"/>
           </a:p>
@@ -677,7 +677,7 @@
           <a:p>
             <a:fld id="{30F86D06-0C92-45D8-8D91-1C18C237B213}" type="datetimeFigureOut">
               <a:rPr lang="en-US" smtClean="0"/>
-              <a:t>11/23/2022</a:t>
+              <a:t>11/24/2022</a:t>
             </a:fld>
             <a:endParaRPr lang="en-US"/>
           </a:p>
@@ -875,7 +875,7 @@
           <a:p>
             <a:fld id="{30F86D06-0C92-45D8-8D91-1C18C237B213}" type="datetimeFigureOut">
               <a:rPr lang="en-US" smtClean="0"/>
-              <a:t>11/23/2022</a:t>
+              <a:t>11/24/2022</a:t>
             </a:fld>
             <a:endParaRPr lang="en-US"/>
           </a:p>
@@ -1150,7 +1150,7 @@
           <a:p>
             <a:fld id="{30F86D06-0C92-45D8-8D91-1C18C237B213}" type="datetimeFigureOut">
               <a:rPr lang="en-US" smtClean="0"/>
-              <a:t>11/23/2022</a:t>
+              <a:t>11/24/2022</a:t>
             </a:fld>
             <a:endParaRPr lang="en-US"/>
           </a:p>
@@ -1415,7 +1415,7 @@
           <a:p>
             <a:fld id="{30F86D06-0C92-45D8-8D91-1C18C237B213}" type="datetimeFigureOut">
               <a:rPr lang="en-US" smtClean="0"/>
-              <a:t>11/23/2022</a:t>
+              <a:t>11/24/2022</a:t>
             </a:fld>
             <a:endParaRPr lang="en-US"/>
           </a:p>
@@ -1827,7 +1827,7 @@
           <a:p>
             <a:fld id="{30F86D06-0C92-45D8-8D91-1C18C237B213}" type="datetimeFigureOut">
               <a:rPr lang="en-US" smtClean="0"/>
-              <a:t>11/23/2022</a:t>
+              <a:t>11/24/2022</a:t>
             </a:fld>
             <a:endParaRPr lang="en-US"/>
           </a:p>
@@ -1968,7 +1968,7 @@
           <a:p>
             <a:fld id="{30F86D06-0C92-45D8-8D91-1C18C237B213}" type="datetimeFigureOut">
               <a:rPr lang="en-US" smtClean="0"/>
-              <a:t>11/23/2022</a:t>
+              <a:t>11/24/2022</a:t>
             </a:fld>
             <a:endParaRPr lang="en-US"/>
           </a:p>
@@ -2081,7 +2081,7 @@
           <a:p>
             <a:fld id="{30F86D06-0C92-45D8-8D91-1C18C237B213}" type="datetimeFigureOut">
               <a:rPr lang="en-US" smtClean="0"/>
-              <a:t>11/23/2022</a:t>
+              <a:t>11/24/2022</a:t>
             </a:fld>
             <a:endParaRPr lang="en-US"/>
           </a:p>
@@ -2392,7 +2392,7 @@
           <a:p>
             <a:fld id="{30F86D06-0C92-45D8-8D91-1C18C237B213}" type="datetimeFigureOut">
               <a:rPr lang="en-US" smtClean="0"/>
-              <a:t>11/23/2022</a:t>
+              <a:t>11/24/2022</a:t>
             </a:fld>
             <a:endParaRPr lang="en-US"/>
           </a:p>
@@ -2680,7 +2680,7 @@
           <a:p>
             <a:fld id="{30F86D06-0C92-45D8-8D91-1C18C237B213}" type="datetimeFigureOut">
               <a:rPr lang="en-US" smtClean="0"/>
-              <a:t>11/23/2022</a:t>
+              <a:t>11/24/2022</a:t>
             </a:fld>
             <a:endParaRPr lang="en-US"/>
           </a:p>
@@ -2921,7 +2921,7 @@
           <a:p>
             <a:fld id="{30F86D06-0C92-45D8-8D91-1C18C237B213}" type="datetimeFigureOut">
               <a:rPr lang="en-US" smtClean="0"/>
-              <a:t>11/23/2022</a:t>
+              <a:t>11/24/2022</a:t>
             </a:fld>
             <a:endParaRPr lang="en-US"/>
           </a:p>
@@ -8619,8 +8619,8 @@
           </mc:Fallback>
         </mc:AlternateContent>
       </p:grpSp>
-      <mc:AlternateContent xmlns:mc="http://schemas.openxmlformats.org/markup-compatibility/2006">
-        <mc:Choice xmlns:a14="http://schemas.microsoft.com/office/drawing/2010/main" Requires="a14">
+      <mc:AlternateContent xmlns:mc="http://schemas.openxmlformats.org/markup-compatibility/2006" xmlns:a14="http://schemas.microsoft.com/office/drawing/2010/main">
+        <mc:Choice Requires="a14">
           <p:sp>
             <p:nvSpPr>
               <p:cNvPr id="7" name="TextBox 6">
@@ -9003,7 +9003,7 @@
             </p:txBody>
           </p:sp>
         </mc:Choice>
-        <mc:Fallback>
+        <mc:Fallback xmlns="">
           <p:sp>
             <p:nvSpPr>
               <p:cNvPr id="7" name="TextBox 6">
@@ -9063,7 +9063,7 @@
           <p:nvPr/>
         </p:nvPicPr>
         <p:blipFill>
-          <a:blip r:embed="rId21"/>
+          <a:blip r:embed="rId22"/>
           <a:stretch>
             <a:fillRect/>
           </a:stretch>
@@ -9108,6 +9108,2060 @@
           <a:chExt cx="0" cy="0"/>
         </a:xfrm>
       </p:grpSpPr>
+      <p:grpSp>
+        <p:nvGrpSpPr>
+          <p:cNvPr id="17" name="Group 16">
+            <a:extLst>
+              <a:ext uri="{FF2B5EF4-FFF2-40B4-BE49-F238E27FC236}">
+                <a16:creationId xmlns:a16="http://schemas.microsoft.com/office/drawing/2014/main" id="{A3C19B4E-9C3A-C982-5190-E67887A9AA31}"/>
+              </a:ext>
+            </a:extLst>
+          </p:cNvPr>
+          <p:cNvGrpSpPr/>
+          <p:nvPr/>
+        </p:nvGrpSpPr>
+        <p:grpSpPr>
+          <a:xfrm>
+            <a:off x="349250" y="1219200"/>
+            <a:ext cx="5346701" cy="857250"/>
+            <a:chOff x="2032000" y="1727200"/>
+            <a:chExt cx="5346701" cy="857250"/>
+          </a:xfrm>
+        </p:grpSpPr>
+        <p:sp>
+          <p:nvSpPr>
+            <p:cNvPr id="2" name="Rectangle 1">
+              <a:extLst>
+                <a:ext uri="{FF2B5EF4-FFF2-40B4-BE49-F238E27FC236}">
+                  <a16:creationId xmlns:a16="http://schemas.microsoft.com/office/drawing/2014/main" id="{7E41FFE6-4120-D914-AE18-E634913A4769}"/>
+                </a:ext>
+              </a:extLst>
+            </p:cNvPr>
+            <p:cNvSpPr/>
+            <p:nvPr/>
+          </p:nvSpPr>
+          <p:spPr>
+            <a:xfrm>
+              <a:off x="2032000" y="1727200"/>
+              <a:ext cx="857250" cy="857250"/>
+            </a:xfrm>
+            <a:prstGeom prst="rect">
+              <a:avLst/>
+            </a:prstGeom>
+            <a:noFill/>
+            <a:ln w="19050">
+              <a:solidFill>
+                <a:schemeClr val="tx1"/>
+              </a:solidFill>
+            </a:ln>
+          </p:spPr>
+          <p:style>
+            <a:lnRef idx="2">
+              <a:schemeClr val="accent1">
+                <a:shade val="50000"/>
+              </a:schemeClr>
+            </a:lnRef>
+            <a:fillRef idx="1">
+              <a:schemeClr val="accent1"/>
+            </a:fillRef>
+            <a:effectRef idx="0">
+              <a:schemeClr val="accent1"/>
+            </a:effectRef>
+            <a:fontRef idx="minor">
+              <a:schemeClr val="lt1"/>
+            </a:fontRef>
+          </p:style>
+          <p:txBody>
+            <a:bodyPr rtlCol="0" anchor="ctr"/>
+            <a:lstStyle/>
+            <a:p>
+              <a:pPr algn="ctr"/>
+              <a:endParaRPr lang="en-US"/>
+            </a:p>
+          </p:txBody>
+        </p:sp>
+        <p:sp>
+          <p:nvSpPr>
+            <p:cNvPr id="3" name="Rectangle 2">
+              <a:extLst>
+                <a:ext uri="{FF2B5EF4-FFF2-40B4-BE49-F238E27FC236}">
+                  <a16:creationId xmlns:a16="http://schemas.microsoft.com/office/drawing/2014/main" id="{F6271B44-ED96-0B48-3997-B063ACC795D8}"/>
+                </a:ext>
+              </a:extLst>
+            </p:cNvPr>
+            <p:cNvSpPr/>
+            <p:nvPr/>
+          </p:nvSpPr>
+          <p:spPr>
+            <a:xfrm>
+              <a:off x="3333750" y="1727200"/>
+              <a:ext cx="857250" cy="857250"/>
+            </a:xfrm>
+            <a:prstGeom prst="rect">
+              <a:avLst/>
+            </a:prstGeom>
+            <a:noFill/>
+            <a:ln w="19050">
+              <a:solidFill>
+                <a:schemeClr val="tx1"/>
+              </a:solidFill>
+            </a:ln>
+          </p:spPr>
+          <p:style>
+            <a:lnRef idx="2">
+              <a:schemeClr val="accent1">
+                <a:shade val="50000"/>
+              </a:schemeClr>
+            </a:lnRef>
+            <a:fillRef idx="1">
+              <a:schemeClr val="accent1"/>
+            </a:fillRef>
+            <a:effectRef idx="0">
+              <a:schemeClr val="accent1"/>
+            </a:effectRef>
+            <a:fontRef idx="minor">
+              <a:schemeClr val="lt1"/>
+            </a:fontRef>
+          </p:style>
+          <p:txBody>
+            <a:bodyPr rtlCol="0" anchor="ctr"/>
+            <a:lstStyle/>
+            <a:p>
+              <a:pPr algn="ctr"/>
+              <a:endParaRPr lang="en-US"/>
+            </a:p>
+          </p:txBody>
+        </p:sp>
+        <p:sp>
+          <p:nvSpPr>
+            <p:cNvPr id="4" name="Rectangle 3">
+              <a:extLst>
+                <a:ext uri="{FF2B5EF4-FFF2-40B4-BE49-F238E27FC236}">
+                  <a16:creationId xmlns:a16="http://schemas.microsoft.com/office/drawing/2014/main" id="{48D46102-A431-F07A-9A31-4138B16E9597}"/>
+                </a:ext>
+              </a:extLst>
+            </p:cNvPr>
+            <p:cNvSpPr/>
+            <p:nvPr/>
+          </p:nvSpPr>
+          <p:spPr>
+            <a:xfrm>
+              <a:off x="5327651" y="1727200"/>
+              <a:ext cx="857250" cy="857250"/>
+            </a:xfrm>
+            <a:prstGeom prst="rect">
+              <a:avLst/>
+            </a:prstGeom>
+            <a:noFill/>
+            <a:ln w="19050">
+              <a:solidFill>
+                <a:schemeClr val="tx1"/>
+              </a:solidFill>
+            </a:ln>
+          </p:spPr>
+          <p:style>
+            <a:lnRef idx="2">
+              <a:schemeClr val="accent1">
+                <a:shade val="50000"/>
+              </a:schemeClr>
+            </a:lnRef>
+            <a:fillRef idx="1">
+              <a:schemeClr val="accent1"/>
+            </a:fillRef>
+            <a:effectRef idx="0">
+              <a:schemeClr val="accent1"/>
+            </a:effectRef>
+            <a:fontRef idx="minor">
+              <a:schemeClr val="lt1"/>
+            </a:fontRef>
+          </p:style>
+          <p:txBody>
+            <a:bodyPr rtlCol="0" anchor="ctr"/>
+            <a:lstStyle/>
+            <a:p>
+              <a:pPr algn="ctr"/>
+              <a:endParaRPr lang="en-US"/>
+            </a:p>
+          </p:txBody>
+        </p:sp>
+        <mc:AlternateContent xmlns:mc="http://schemas.openxmlformats.org/markup-compatibility/2006" xmlns:a14="http://schemas.microsoft.com/office/drawing/2010/main">
+          <mc:Choice Requires="a14">
+            <p:sp>
+              <p:nvSpPr>
+                <p:cNvPr id="5" name="TextBox 4">
+                  <a:extLst>
+                    <a:ext uri="{FF2B5EF4-FFF2-40B4-BE49-F238E27FC236}">
+                      <a16:creationId xmlns:a16="http://schemas.microsoft.com/office/drawing/2014/main" id="{180EC92D-4704-E41C-00CC-EB9981B7308E}"/>
+                    </a:ext>
+                  </a:extLst>
+                </p:cNvPr>
+                <p:cNvSpPr txBox="1"/>
+                <p:nvPr/>
+              </p:nvSpPr>
+              <p:spPr>
+                <a:xfrm>
+                  <a:off x="2085975" y="1971159"/>
+                  <a:ext cx="749300" cy="369332"/>
+                </a:xfrm>
+                <a:prstGeom prst="rect">
+                  <a:avLst/>
+                </a:prstGeom>
+                <a:noFill/>
+              </p:spPr>
+              <p:txBody>
+                <a:bodyPr wrap="square" rtlCol="0">
+                  <a:spAutoFit/>
+                </a:bodyPr>
+                <a:lstStyle/>
+                <a:p>
+                  <a:pPr/>
+                  <a14:m>
+                    <m:oMathPara xmlns:m="http://schemas.openxmlformats.org/officeDocument/2006/math">
+                      <m:oMathParaPr>
+                        <m:jc m:val="centerGroup"/>
+                      </m:oMathParaPr>
+                      <m:oMath xmlns:m="http://schemas.openxmlformats.org/officeDocument/2006/math">
+                        <m:r>
+                          <m:rPr>
+                            <m:sty m:val="p"/>
+                          </m:rPr>
+                          <a:rPr lang="en-US" b="0" i="0" smtClean="0">
+                            <a:latin typeface="Cambria Math" panose="02040503050406030204" pitchFamily="18" charset="0"/>
+                            <a:ea typeface="Fira Code" panose="020B0809050000020004" pitchFamily="49" charset="0"/>
+                            <a:cs typeface="Fira Code" panose="020B0809050000020004" pitchFamily="49" charset="0"/>
+                          </a:rPr>
+                          <m:t>head</m:t>
+                        </m:r>
+                      </m:oMath>
+                    </m:oMathPara>
+                  </a14:m>
+                  <a:endParaRPr lang="en-US" dirty="0">
+                    <a:latin typeface="Fira Code" panose="020B0809050000020004" pitchFamily="49" charset="0"/>
+                    <a:ea typeface="Fira Code" panose="020B0809050000020004" pitchFamily="49" charset="0"/>
+                    <a:cs typeface="Fira Code" panose="020B0809050000020004" pitchFamily="49" charset="0"/>
+                  </a:endParaRPr>
+                </a:p>
+              </p:txBody>
+            </p:sp>
+          </mc:Choice>
+          <mc:Fallback xmlns="">
+            <p:sp>
+              <p:nvSpPr>
+                <p:cNvPr id="5" name="TextBox 4">
+                  <a:extLst>
+                    <a:ext uri="{FF2B5EF4-FFF2-40B4-BE49-F238E27FC236}">
+                      <a16:creationId xmlns:a16="http://schemas.microsoft.com/office/drawing/2014/main" id="{180EC92D-4704-E41C-00CC-EB9981B7308E}"/>
+                    </a:ext>
+                  </a:extLst>
+                </p:cNvPr>
+                <p:cNvSpPr txBox="1">
+                  <a:spLocks noRot="1" noChangeAspect="1" noMove="1" noResize="1" noEditPoints="1" noAdjustHandles="1" noChangeArrowheads="1" noChangeShapeType="1" noTextEdit="1"/>
+                </p:cNvSpPr>
+                <p:nvPr/>
+              </p:nvSpPr>
+              <p:spPr>
+                <a:xfrm>
+                  <a:off x="2085975" y="1971159"/>
+                  <a:ext cx="749300" cy="369332"/>
+                </a:xfrm>
+                <a:prstGeom prst="rect">
+                  <a:avLst/>
+                </a:prstGeom>
+                <a:blipFill>
+                  <a:blip r:embed="rId2"/>
+                  <a:stretch>
+                    <a:fillRect/>
+                  </a:stretch>
+                </a:blipFill>
+              </p:spPr>
+              <p:txBody>
+                <a:bodyPr/>
+                <a:lstStyle/>
+                <a:p>
+                  <a:r>
+                    <a:rPr lang="en-US">
+                      <a:noFill/>
+                    </a:rPr>
+                    <a:t> </a:t>
+                  </a:r>
+                </a:p>
+              </p:txBody>
+            </p:sp>
+          </mc:Fallback>
+        </mc:AlternateContent>
+        <p:cxnSp>
+          <p:nvCxnSpPr>
+            <p:cNvPr id="8" name="Straight Arrow Connector 7">
+              <a:extLst>
+                <a:ext uri="{FF2B5EF4-FFF2-40B4-BE49-F238E27FC236}">
+                  <a16:creationId xmlns:a16="http://schemas.microsoft.com/office/drawing/2014/main" id="{DC991DA4-165D-69DC-7517-62D699C68B8A}"/>
+                </a:ext>
+              </a:extLst>
+            </p:cNvPr>
+            <p:cNvCxnSpPr>
+              <a:stCxn id="2" idx="3"/>
+              <a:endCxn id="3" idx="1"/>
+            </p:cNvCxnSpPr>
+            <p:nvPr/>
+          </p:nvCxnSpPr>
+          <p:spPr>
+            <a:xfrm>
+              <a:off x="2889250" y="2155825"/>
+              <a:ext cx="444500" cy="0"/>
+            </a:xfrm>
+            <a:prstGeom prst="straightConnector1">
+              <a:avLst/>
+            </a:prstGeom>
+            <a:ln>
+              <a:tailEnd type="triangle"/>
+            </a:ln>
+          </p:spPr>
+          <p:style>
+            <a:lnRef idx="1">
+              <a:schemeClr val="dk1"/>
+            </a:lnRef>
+            <a:fillRef idx="0">
+              <a:schemeClr val="dk1"/>
+            </a:fillRef>
+            <a:effectRef idx="0">
+              <a:schemeClr val="dk1"/>
+            </a:effectRef>
+            <a:fontRef idx="minor">
+              <a:schemeClr val="tx1"/>
+            </a:fontRef>
+          </p:style>
+        </p:cxnSp>
+        <p:cxnSp>
+          <p:nvCxnSpPr>
+            <p:cNvPr id="12" name="Straight Arrow Connector 11">
+              <a:extLst>
+                <a:ext uri="{FF2B5EF4-FFF2-40B4-BE49-F238E27FC236}">
+                  <a16:creationId xmlns:a16="http://schemas.microsoft.com/office/drawing/2014/main" id="{1B8BC4E9-661D-76AF-C256-2DCB8BF24A9A}"/>
+                </a:ext>
+              </a:extLst>
+            </p:cNvPr>
+            <p:cNvCxnSpPr>
+              <a:cxnSpLocks/>
+              <a:stCxn id="4" idx="3"/>
+            </p:cNvCxnSpPr>
+            <p:nvPr/>
+          </p:nvCxnSpPr>
+          <p:spPr>
+            <a:xfrm>
+              <a:off x="6184901" y="2155825"/>
+              <a:ext cx="444500" cy="0"/>
+            </a:xfrm>
+            <a:prstGeom prst="straightConnector1">
+              <a:avLst/>
+            </a:prstGeom>
+            <a:ln>
+              <a:tailEnd type="triangle"/>
+            </a:ln>
+          </p:spPr>
+          <p:style>
+            <a:lnRef idx="1">
+              <a:schemeClr val="dk1"/>
+            </a:lnRef>
+            <a:fillRef idx="0">
+              <a:schemeClr val="dk1"/>
+            </a:fillRef>
+            <a:effectRef idx="0">
+              <a:schemeClr val="dk1"/>
+            </a:effectRef>
+            <a:fontRef idx="minor">
+              <a:schemeClr val="tx1"/>
+            </a:fontRef>
+          </p:style>
+        </p:cxnSp>
+        <mc:AlternateContent xmlns:mc="http://schemas.openxmlformats.org/markup-compatibility/2006" xmlns:a14="http://schemas.microsoft.com/office/drawing/2010/main">
+          <mc:Choice Requires="a14">
+            <p:sp>
+              <p:nvSpPr>
+                <p:cNvPr id="14" name="TextBox 13">
+                  <a:extLst>
+                    <a:ext uri="{FF2B5EF4-FFF2-40B4-BE49-F238E27FC236}">
+                      <a16:creationId xmlns:a16="http://schemas.microsoft.com/office/drawing/2014/main" id="{64287A82-0A6C-FF22-2CE4-8D13D5F20B98}"/>
+                    </a:ext>
+                  </a:extLst>
+                </p:cNvPr>
+                <p:cNvSpPr txBox="1"/>
+                <p:nvPr/>
+              </p:nvSpPr>
+              <p:spPr>
+                <a:xfrm>
+                  <a:off x="6629401" y="1971159"/>
+                  <a:ext cx="749300" cy="369332"/>
+                </a:xfrm>
+                <a:prstGeom prst="rect">
+                  <a:avLst/>
+                </a:prstGeom>
+                <a:noFill/>
+              </p:spPr>
+              <p:txBody>
+                <a:bodyPr wrap="square" rtlCol="0">
+                  <a:spAutoFit/>
+                </a:bodyPr>
+                <a:lstStyle/>
+                <a:p>
+                  <a:pPr/>
+                  <a14:m>
+                    <m:oMathPara xmlns:m="http://schemas.openxmlformats.org/officeDocument/2006/math">
+                      <m:oMathParaPr>
+                        <m:jc m:val="centerGroup"/>
+                      </m:oMathParaPr>
+                      <m:oMath xmlns:m="http://schemas.openxmlformats.org/officeDocument/2006/math">
+                        <m:r>
+                          <m:rPr>
+                            <m:sty m:val="p"/>
+                          </m:rPr>
+                          <a:rPr lang="en-US" b="0" i="0" smtClean="0">
+                            <a:latin typeface="Cambria Math" panose="02040503050406030204" pitchFamily="18" charset="0"/>
+                            <a:ea typeface="Fira Code" panose="020B0809050000020004" pitchFamily="49" charset="0"/>
+                            <a:cs typeface="Fira Code" panose="020B0809050000020004" pitchFamily="49" charset="0"/>
+                          </a:rPr>
+                          <m:t>null</m:t>
+                        </m:r>
+                      </m:oMath>
+                    </m:oMathPara>
+                  </a14:m>
+                  <a:endParaRPr lang="en-US" dirty="0">
+                    <a:latin typeface="Fira Code" panose="020B0809050000020004" pitchFamily="49" charset="0"/>
+                    <a:ea typeface="Fira Code" panose="020B0809050000020004" pitchFamily="49" charset="0"/>
+                    <a:cs typeface="Fira Code" panose="020B0809050000020004" pitchFamily="49" charset="0"/>
+                  </a:endParaRPr>
+                </a:p>
+              </p:txBody>
+            </p:sp>
+          </mc:Choice>
+          <mc:Fallback xmlns="">
+            <p:sp>
+              <p:nvSpPr>
+                <p:cNvPr id="14" name="TextBox 13">
+                  <a:extLst>
+                    <a:ext uri="{FF2B5EF4-FFF2-40B4-BE49-F238E27FC236}">
+                      <a16:creationId xmlns:a16="http://schemas.microsoft.com/office/drawing/2014/main" id="{64287A82-0A6C-FF22-2CE4-8D13D5F20B98}"/>
+                    </a:ext>
+                  </a:extLst>
+                </p:cNvPr>
+                <p:cNvSpPr txBox="1">
+                  <a:spLocks noRot="1" noChangeAspect="1" noMove="1" noResize="1" noEditPoints="1" noAdjustHandles="1" noChangeArrowheads="1" noChangeShapeType="1" noTextEdit="1"/>
+                </p:cNvSpPr>
+                <p:nvPr/>
+              </p:nvSpPr>
+              <p:spPr>
+                <a:xfrm>
+                  <a:off x="6629401" y="1971159"/>
+                  <a:ext cx="749300" cy="369332"/>
+                </a:xfrm>
+                <a:prstGeom prst="rect">
+                  <a:avLst/>
+                </a:prstGeom>
+                <a:blipFill>
+                  <a:blip r:embed="rId3"/>
+                  <a:stretch>
+                    <a:fillRect/>
+                  </a:stretch>
+                </a:blipFill>
+              </p:spPr>
+              <p:txBody>
+                <a:bodyPr/>
+                <a:lstStyle/>
+                <a:p>
+                  <a:r>
+                    <a:rPr lang="en-US">
+                      <a:noFill/>
+                    </a:rPr>
+                    <a:t> </a:t>
+                  </a:r>
+                </a:p>
+              </p:txBody>
+            </p:sp>
+          </mc:Fallback>
+        </mc:AlternateContent>
+        <mc:AlternateContent xmlns:mc="http://schemas.openxmlformats.org/markup-compatibility/2006" xmlns:a14="http://schemas.microsoft.com/office/drawing/2010/main">
+          <mc:Choice Requires="a14">
+            <p:sp>
+              <p:nvSpPr>
+                <p:cNvPr id="16" name="TextBox 15">
+                  <a:extLst>
+                    <a:ext uri="{FF2B5EF4-FFF2-40B4-BE49-F238E27FC236}">
+                      <a16:creationId xmlns:a16="http://schemas.microsoft.com/office/drawing/2014/main" id="{96413CF6-F91D-455D-F6EC-A4222F435E34}"/>
+                    </a:ext>
+                  </a:extLst>
+                </p:cNvPr>
+                <p:cNvSpPr txBox="1"/>
+                <p:nvPr/>
+              </p:nvSpPr>
+              <p:spPr>
+                <a:xfrm>
+                  <a:off x="4356101" y="1971159"/>
+                  <a:ext cx="749300" cy="369332"/>
+                </a:xfrm>
+                <a:prstGeom prst="rect">
+                  <a:avLst/>
+                </a:prstGeom>
+                <a:noFill/>
+              </p:spPr>
+              <p:txBody>
+                <a:bodyPr wrap="square" rtlCol="0">
+                  <a:spAutoFit/>
+                </a:bodyPr>
+                <a:lstStyle/>
+                <a:p>
+                  <a:pPr/>
+                  <a14:m>
+                    <m:oMathPara xmlns:m="http://schemas.openxmlformats.org/officeDocument/2006/math">
+                      <m:oMathParaPr>
+                        <m:jc m:val="centerGroup"/>
+                      </m:oMathParaPr>
+                      <m:oMath xmlns:m="http://schemas.openxmlformats.org/officeDocument/2006/math">
+                        <m:r>
+                          <a:rPr lang="en-US" b="0" i="1" smtClean="0">
+                            <a:latin typeface="Cambria Math" panose="02040503050406030204" pitchFamily="18" charset="0"/>
+                            <a:ea typeface="Fira Code" panose="020B0809050000020004" pitchFamily="49" charset="0"/>
+                            <a:cs typeface="Fira Code" panose="020B0809050000020004" pitchFamily="49" charset="0"/>
+                          </a:rPr>
+                          <m:t>…</m:t>
+                        </m:r>
+                      </m:oMath>
+                    </m:oMathPara>
+                  </a14:m>
+                  <a:endParaRPr lang="en-US" dirty="0">
+                    <a:latin typeface="Fira Code" panose="020B0809050000020004" pitchFamily="49" charset="0"/>
+                    <a:ea typeface="Fira Code" panose="020B0809050000020004" pitchFamily="49" charset="0"/>
+                    <a:cs typeface="Fira Code" panose="020B0809050000020004" pitchFamily="49" charset="0"/>
+                  </a:endParaRPr>
+                </a:p>
+              </p:txBody>
+            </p:sp>
+          </mc:Choice>
+          <mc:Fallback xmlns="">
+            <p:sp>
+              <p:nvSpPr>
+                <p:cNvPr id="16" name="TextBox 15">
+                  <a:extLst>
+                    <a:ext uri="{FF2B5EF4-FFF2-40B4-BE49-F238E27FC236}">
+                      <a16:creationId xmlns:a16="http://schemas.microsoft.com/office/drawing/2014/main" id="{96413CF6-F91D-455D-F6EC-A4222F435E34}"/>
+                    </a:ext>
+                  </a:extLst>
+                </p:cNvPr>
+                <p:cNvSpPr txBox="1">
+                  <a:spLocks noRot="1" noChangeAspect="1" noMove="1" noResize="1" noEditPoints="1" noAdjustHandles="1" noChangeArrowheads="1" noChangeShapeType="1" noTextEdit="1"/>
+                </p:cNvSpPr>
+                <p:nvPr/>
+              </p:nvSpPr>
+              <p:spPr>
+                <a:xfrm>
+                  <a:off x="4356101" y="1971159"/>
+                  <a:ext cx="749300" cy="369332"/>
+                </a:xfrm>
+                <a:prstGeom prst="rect">
+                  <a:avLst/>
+                </a:prstGeom>
+                <a:blipFill>
+                  <a:blip r:embed="rId4"/>
+                  <a:stretch>
+                    <a:fillRect/>
+                  </a:stretch>
+                </a:blipFill>
+              </p:spPr>
+              <p:txBody>
+                <a:bodyPr/>
+                <a:lstStyle/>
+                <a:p>
+                  <a:r>
+                    <a:rPr lang="en-US">
+                      <a:noFill/>
+                    </a:rPr>
+                    <a:t> </a:t>
+                  </a:r>
+                </a:p>
+              </p:txBody>
+            </p:sp>
+          </mc:Fallback>
+        </mc:AlternateContent>
+      </p:grpSp>
+      <p:grpSp>
+        <p:nvGrpSpPr>
+          <p:cNvPr id="18" name="Group 17">
+            <a:extLst>
+              <a:ext uri="{FF2B5EF4-FFF2-40B4-BE49-F238E27FC236}">
+                <a16:creationId xmlns:a16="http://schemas.microsoft.com/office/drawing/2014/main" id="{8604EB7F-7F36-8974-AEA0-A849D2ECBC89}"/>
+              </a:ext>
+            </a:extLst>
+          </p:cNvPr>
+          <p:cNvGrpSpPr/>
+          <p:nvPr/>
+        </p:nvGrpSpPr>
+        <p:grpSpPr>
+          <a:xfrm>
+            <a:off x="590550" y="3924300"/>
+            <a:ext cx="4356101" cy="463550"/>
+            <a:chOff x="590550" y="3924300"/>
+            <a:chExt cx="4356101" cy="463550"/>
+          </a:xfrm>
+        </p:grpSpPr>
+        <p:cxnSp>
+          <p:nvCxnSpPr>
+            <p:cNvPr id="7" name="Straight Connector 6">
+              <a:extLst>
+                <a:ext uri="{FF2B5EF4-FFF2-40B4-BE49-F238E27FC236}">
+                  <a16:creationId xmlns:a16="http://schemas.microsoft.com/office/drawing/2014/main" id="{2C952C56-F4B2-D7F1-DDA6-6E6FF2824A4D}"/>
+                </a:ext>
+              </a:extLst>
+            </p:cNvPr>
+            <p:cNvCxnSpPr/>
+            <p:nvPr/>
+          </p:nvCxnSpPr>
+          <p:spPr>
+            <a:xfrm>
+              <a:off x="590550" y="3924300"/>
+              <a:ext cx="4356101" cy="0"/>
+            </a:xfrm>
+            <a:prstGeom prst="line">
+              <a:avLst/>
+            </a:prstGeom>
+            <a:ln w="57150"/>
+          </p:spPr>
+          <p:style>
+            <a:lnRef idx="1">
+              <a:schemeClr val="dk1"/>
+            </a:lnRef>
+            <a:fillRef idx="0">
+              <a:schemeClr val="dk1"/>
+            </a:fillRef>
+            <a:effectRef idx="0">
+              <a:schemeClr val="dk1"/>
+            </a:effectRef>
+            <a:fontRef idx="minor">
+              <a:schemeClr val="tx1"/>
+            </a:fontRef>
+          </p:style>
+        </p:cxnSp>
+        <p:cxnSp>
+          <p:nvCxnSpPr>
+            <p:cNvPr id="9" name="Straight Connector 8">
+              <a:extLst>
+                <a:ext uri="{FF2B5EF4-FFF2-40B4-BE49-F238E27FC236}">
+                  <a16:creationId xmlns:a16="http://schemas.microsoft.com/office/drawing/2014/main" id="{369F3630-B798-004C-FAD4-C5EA8F3044C8}"/>
+                </a:ext>
+              </a:extLst>
+            </p:cNvPr>
+            <p:cNvCxnSpPr>
+              <a:cxnSpLocks/>
+            </p:cNvCxnSpPr>
+            <p:nvPr/>
+          </p:nvCxnSpPr>
+          <p:spPr>
+            <a:xfrm>
+              <a:off x="590550" y="4064000"/>
+              <a:ext cx="1676400" cy="0"/>
+            </a:xfrm>
+            <a:prstGeom prst="line">
+              <a:avLst/>
+            </a:prstGeom>
+            <a:ln w="19050"/>
+          </p:spPr>
+          <p:style>
+            <a:lnRef idx="1">
+              <a:schemeClr val="dk1"/>
+            </a:lnRef>
+            <a:fillRef idx="0">
+              <a:schemeClr val="dk1"/>
+            </a:fillRef>
+            <a:effectRef idx="0">
+              <a:schemeClr val="dk1"/>
+            </a:effectRef>
+            <a:fontRef idx="minor">
+              <a:schemeClr val="tx1"/>
+            </a:fontRef>
+          </p:style>
+        </p:cxnSp>
+        <p:cxnSp>
+          <p:nvCxnSpPr>
+            <p:cNvPr id="11" name="Straight Connector 10">
+              <a:extLst>
+                <a:ext uri="{FF2B5EF4-FFF2-40B4-BE49-F238E27FC236}">
+                  <a16:creationId xmlns:a16="http://schemas.microsoft.com/office/drawing/2014/main" id="{82C97234-C93F-7233-56BA-B58D6F994E16}"/>
+                </a:ext>
+              </a:extLst>
+            </p:cNvPr>
+            <p:cNvCxnSpPr>
+              <a:cxnSpLocks/>
+            </p:cNvCxnSpPr>
+            <p:nvPr/>
+          </p:nvCxnSpPr>
+          <p:spPr>
+            <a:xfrm>
+              <a:off x="1483784" y="4171950"/>
+              <a:ext cx="1676400" cy="0"/>
+            </a:xfrm>
+            <a:prstGeom prst="line">
+              <a:avLst/>
+            </a:prstGeom>
+            <a:ln w="19050"/>
+          </p:spPr>
+          <p:style>
+            <a:lnRef idx="1">
+              <a:schemeClr val="dk1"/>
+            </a:lnRef>
+            <a:fillRef idx="0">
+              <a:schemeClr val="dk1"/>
+            </a:fillRef>
+            <a:effectRef idx="0">
+              <a:schemeClr val="dk1"/>
+            </a:effectRef>
+            <a:fontRef idx="minor">
+              <a:schemeClr val="tx1"/>
+            </a:fontRef>
+          </p:style>
+        </p:cxnSp>
+        <p:cxnSp>
+          <p:nvCxnSpPr>
+            <p:cNvPr id="13" name="Straight Connector 12">
+              <a:extLst>
+                <a:ext uri="{FF2B5EF4-FFF2-40B4-BE49-F238E27FC236}">
+                  <a16:creationId xmlns:a16="http://schemas.microsoft.com/office/drawing/2014/main" id="{DCF2459F-56C1-EF31-2FBC-37A209E3B625}"/>
+                </a:ext>
+              </a:extLst>
+            </p:cNvPr>
+            <p:cNvCxnSpPr>
+              <a:cxnSpLocks/>
+            </p:cNvCxnSpPr>
+            <p:nvPr/>
+          </p:nvCxnSpPr>
+          <p:spPr>
+            <a:xfrm>
+              <a:off x="2377018" y="4279900"/>
+              <a:ext cx="1676400" cy="0"/>
+            </a:xfrm>
+            <a:prstGeom prst="line">
+              <a:avLst/>
+            </a:prstGeom>
+            <a:ln w="19050"/>
+          </p:spPr>
+          <p:style>
+            <a:lnRef idx="1">
+              <a:schemeClr val="dk1"/>
+            </a:lnRef>
+            <a:fillRef idx="0">
+              <a:schemeClr val="dk1"/>
+            </a:fillRef>
+            <a:effectRef idx="0">
+              <a:schemeClr val="dk1"/>
+            </a:effectRef>
+            <a:fontRef idx="minor">
+              <a:schemeClr val="tx1"/>
+            </a:fontRef>
+          </p:style>
+        </p:cxnSp>
+        <p:cxnSp>
+          <p:nvCxnSpPr>
+            <p:cNvPr id="15" name="Straight Connector 14">
+              <a:extLst>
+                <a:ext uri="{FF2B5EF4-FFF2-40B4-BE49-F238E27FC236}">
+                  <a16:creationId xmlns:a16="http://schemas.microsoft.com/office/drawing/2014/main" id="{C874C040-CEF1-520C-D1F6-A588A8BFE82D}"/>
+                </a:ext>
+              </a:extLst>
+            </p:cNvPr>
+            <p:cNvCxnSpPr>
+              <a:cxnSpLocks/>
+            </p:cNvCxnSpPr>
+            <p:nvPr/>
+          </p:nvCxnSpPr>
+          <p:spPr>
+            <a:xfrm>
+              <a:off x="3270251" y="4387850"/>
+              <a:ext cx="1676400" cy="0"/>
+            </a:xfrm>
+            <a:prstGeom prst="line">
+              <a:avLst/>
+            </a:prstGeom>
+            <a:ln w="19050"/>
+          </p:spPr>
+          <p:style>
+            <a:lnRef idx="1">
+              <a:schemeClr val="dk1"/>
+            </a:lnRef>
+            <a:fillRef idx="0">
+              <a:schemeClr val="dk1"/>
+            </a:fillRef>
+            <a:effectRef idx="0">
+              <a:schemeClr val="dk1"/>
+            </a:effectRef>
+            <a:fontRef idx="minor">
+              <a:schemeClr val="tx1"/>
+            </a:fontRef>
+          </p:style>
+        </p:cxnSp>
+      </p:grpSp>
+      <p:grpSp>
+        <p:nvGrpSpPr>
+          <p:cNvPr id="31" name="Group 30">
+            <a:extLst>
+              <a:ext uri="{FF2B5EF4-FFF2-40B4-BE49-F238E27FC236}">
+                <a16:creationId xmlns:a16="http://schemas.microsoft.com/office/drawing/2014/main" id="{76D8CB3C-CFAF-8334-0E30-E5A6464A2191}"/>
+              </a:ext>
+            </a:extLst>
+          </p:cNvPr>
+          <p:cNvGrpSpPr/>
+          <p:nvPr/>
+        </p:nvGrpSpPr>
+        <p:grpSpPr>
+          <a:xfrm>
+            <a:off x="456142" y="5210175"/>
+            <a:ext cx="5052483" cy="540266"/>
+            <a:chOff x="456142" y="5210175"/>
+            <a:chExt cx="5052483" cy="540266"/>
+          </a:xfrm>
+        </p:grpSpPr>
+        <p:grpSp>
+          <p:nvGrpSpPr>
+            <p:cNvPr id="25" name="Group 24">
+              <a:extLst>
+                <a:ext uri="{FF2B5EF4-FFF2-40B4-BE49-F238E27FC236}">
+                  <a16:creationId xmlns:a16="http://schemas.microsoft.com/office/drawing/2014/main" id="{5ADCBBE4-F764-FDCE-A705-E8613AEE9F76}"/>
+                </a:ext>
+              </a:extLst>
+            </p:cNvPr>
+            <p:cNvGrpSpPr/>
+            <p:nvPr/>
+          </p:nvGrpSpPr>
+          <p:grpSpPr>
+            <a:xfrm>
+              <a:off x="777875" y="5210175"/>
+              <a:ext cx="4356101" cy="139700"/>
+              <a:chOff x="777875" y="5210175"/>
+              <a:chExt cx="4356101" cy="139700"/>
+            </a:xfrm>
+          </p:grpSpPr>
+          <p:cxnSp>
+            <p:nvCxnSpPr>
+              <p:cNvPr id="20" name="Straight Connector 19">
+                <a:extLst>
+                  <a:ext uri="{FF2B5EF4-FFF2-40B4-BE49-F238E27FC236}">
+                    <a16:creationId xmlns:a16="http://schemas.microsoft.com/office/drawing/2014/main" id="{27C69870-F3FF-9C67-D04E-917B9EC03DAE}"/>
+                  </a:ext>
+                </a:extLst>
+              </p:cNvPr>
+              <p:cNvCxnSpPr/>
+              <p:nvPr/>
+            </p:nvCxnSpPr>
+            <p:spPr>
+              <a:xfrm>
+                <a:off x="777875" y="5210175"/>
+                <a:ext cx="4356101" cy="0"/>
+              </a:xfrm>
+              <a:prstGeom prst="line">
+                <a:avLst/>
+              </a:prstGeom>
+              <a:ln w="57150"/>
+            </p:spPr>
+            <p:style>
+              <a:lnRef idx="1">
+                <a:schemeClr val="dk1"/>
+              </a:lnRef>
+              <a:fillRef idx="0">
+                <a:schemeClr val="dk1"/>
+              </a:fillRef>
+              <a:effectRef idx="0">
+                <a:schemeClr val="dk1"/>
+              </a:effectRef>
+              <a:fontRef idx="minor">
+                <a:schemeClr val="tx1"/>
+              </a:fontRef>
+            </p:style>
+          </p:cxnSp>
+          <p:cxnSp>
+            <p:nvCxnSpPr>
+              <p:cNvPr id="21" name="Straight Connector 20">
+                <a:extLst>
+                  <a:ext uri="{FF2B5EF4-FFF2-40B4-BE49-F238E27FC236}">
+                    <a16:creationId xmlns:a16="http://schemas.microsoft.com/office/drawing/2014/main" id="{6BBFC646-28DD-CB51-74CE-6A6E243B31A4}"/>
+                  </a:ext>
+                </a:extLst>
+              </p:cNvPr>
+              <p:cNvCxnSpPr>
+                <a:cxnSpLocks/>
+              </p:cNvCxnSpPr>
+              <p:nvPr/>
+            </p:nvCxnSpPr>
+            <p:spPr>
+              <a:xfrm>
+                <a:off x="777875" y="5349875"/>
+                <a:ext cx="1676400" cy="0"/>
+              </a:xfrm>
+              <a:prstGeom prst="line">
+                <a:avLst/>
+              </a:prstGeom>
+              <a:ln w="19050"/>
+            </p:spPr>
+            <p:style>
+              <a:lnRef idx="1">
+                <a:schemeClr val="dk1"/>
+              </a:lnRef>
+              <a:fillRef idx="0">
+                <a:schemeClr val="dk1"/>
+              </a:fillRef>
+              <a:effectRef idx="0">
+                <a:schemeClr val="dk1"/>
+              </a:effectRef>
+              <a:fontRef idx="minor">
+                <a:schemeClr val="tx1"/>
+              </a:fontRef>
+            </p:style>
+          </p:cxnSp>
+          <p:cxnSp>
+            <p:nvCxnSpPr>
+              <p:cNvPr id="22" name="Straight Connector 21">
+                <a:extLst>
+                  <a:ext uri="{FF2B5EF4-FFF2-40B4-BE49-F238E27FC236}">
+                    <a16:creationId xmlns:a16="http://schemas.microsoft.com/office/drawing/2014/main" id="{B8778749-6CDF-A00C-3ACB-8C9BA661AE83}"/>
+                  </a:ext>
+                </a:extLst>
+              </p:cNvPr>
+              <p:cNvCxnSpPr>
+                <a:cxnSpLocks/>
+              </p:cNvCxnSpPr>
+              <p:nvPr/>
+            </p:nvCxnSpPr>
+            <p:spPr>
+              <a:xfrm>
+                <a:off x="3457576" y="5349875"/>
+                <a:ext cx="1676400" cy="0"/>
+              </a:xfrm>
+              <a:prstGeom prst="line">
+                <a:avLst/>
+              </a:prstGeom>
+              <a:ln w="19050"/>
+            </p:spPr>
+            <p:style>
+              <a:lnRef idx="1">
+                <a:schemeClr val="dk1"/>
+              </a:lnRef>
+              <a:fillRef idx="0">
+                <a:schemeClr val="dk1"/>
+              </a:fillRef>
+              <a:effectRef idx="0">
+                <a:schemeClr val="dk1"/>
+              </a:effectRef>
+              <a:fontRef idx="minor">
+                <a:schemeClr val="tx1"/>
+              </a:fontRef>
+            </p:style>
+          </p:cxnSp>
+        </p:grpSp>
+        <mc:AlternateContent xmlns:mc="http://schemas.openxmlformats.org/markup-compatibility/2006">
+          <mc:Choice xmlns:a14="http://schemas.microsoft.com/office/drawing/2010/main" Requires="a14">
+            <p:sp>
+              <p:nvSpPr>
+                <p:cNvPr id="27" name="TextBox 26">
+                  <a:extLst>
+                    <a:ext uri="{FF2B5EF4-FFF2-40B4-BE49-F238E27FC236}">
+                      <a16:creationId xmlns:a16="http://schemas.microsoft.com/office/drawing/2014/main" id="{CEC23E26-6B5D-AEA1-A0C3-FF567F512BF8}"/>
+                    </a:ext>
+                  </a:extLst>
+                </p:cNvPr>
+                <p:cNvSpPr txBox="1"/>
+                <p:nvPr/>
+              </p:nvSpPr>
+              <p:spPr>
+                <a:xfrm>
+                  <a:off x="2125134" y="5381109"/>
+                  <a:ext cx="643466" cy="369332"/>
+                </a:xfrm>
+                <a:prstGeom prst="rect">
+                  <a:avLst/>
+                </a:prstGeom>
+                <a:noFill/>
+              </p:spPr>
+              <p:txBody>
+                <a:bodyPr wrap="square" rtlCol="0">
+                  <a:spAutoFit/>
+                </a:bodyPr>
+                <a:lstStyle/>
+                <a:p>
+                  <a14:m>
+                    <m:oMathPara xmlns:m="http://schemas.openxmlformats.org/officeDocument/2006/math">
+                      <m:oMathParaPr>
+                        <m:jc m:val="centerGroup"/>
+                      </m:oMathParaPr>
+                      <m:oMath xmlns:m="http://schemas.openxmlformats.org/officeDocument/2006/math">
+                        <m:r>
+                          <a:rPr lang="en-US" b="0" i="1" smtClean="0">
+                            <a:latin typeface="Cambria Math" panose="02040503050406030204" pitchFamily="18" charset="0"/>
+                          </a:rPr>
+                          <m:t>𝑗</m:t>
+                        </m:r>
+                      </m:oMath>
+                    </m:oMathPara>
+                  </a14:m>
+                  <a:endParaRPr lang="en-US" dirty="0"/>
+                </a:p>
+              </p:txBody>
+            </p:sp>
+          </mc:Choice>
+          <mc:Fallback>
+            <p:sp>
+              <p:nvSpPr>
+                <p:cNvPr id="27" name="TextBox 26">
+                  <a:extLst>
+                    <a:ext uri="{FF2B5EF4-FFF2-40B4-BE49-F238E27FC236}">
+                      <a16:creationId xmlns:a16="http://schemas.microsoft.com/office/drawing/2014/main" id="{CEC23E26-6B5D-AEA1-A0C3-FF567F512BF8}"/>
+                    </a:ext>
+                  </a:extLst>
+                </p:cNvPr>
+                <p:cNvSpPr txBox="1">
+                  <a:spLocks noRot="1" noChangeAspect="1" noMove="1" noResize="1" noEditPoints="1" noAdjustHandles="1" noChangeArrowheads="1" noChangeShapeType="1" noTextEdit="1"/>
+                </p:cNvSpPr>
+                <p:nvPr/>
+              </p:nvSpPr>
+              <p:spPr>
+                <a:xfrm>
+                  <a:off x="2125134" y="5381109"/>
+                  <a:ext cx="643466" cy="369332"/>
+                </a:xfrm>
+                <a:prstGeom prst="rect">
+                  <a:avLst/>
+                </a:prstGeom>
+                <a:blipFill>
+                  <a:blip r:embed="rId5"/>
+                  <a:stretch>
+                    <a:fillRect b="-13333"/>
+                  </a:stretch>
+                </a:blipFill>
+              </p:spPr>
+              <p:txBody>
+                <a:bodyPr/>
+                <a:lstStyle/>
+                <a:p>
+                  <a:r>
+                    <a:rPr lang="en-US">
+                      <a:noFill/>
+                    </a:rPr>
+                    <a:t> </a:t>
+                  </a:r>
+                </a:p>
+              </p:txBody>
+            </p:sp>
+          </mc:Fallback>
+        </mc:AlternateContent>
+        <mc:AlternateContent xmlns:mc="http://schemas.openxmlformats.org/markup-compatibility/2006">
+          <mc:Choice xmlns:a14="http://schemas.microsoft.com/office/drawing/2010/main" Requires="a14">
+            <p:sp>
+              <p:nvSpPr>
+                <p:cNvPr id="28" name="TextBox 27">
+                  <a:extLst>
+                    <a:ext uri="{FF2B5EF4-FFF2-40B4-BE49-F238E27FC236}">
+                      <a16:creationId xmlns:a16="http://schemas.microsoft.com/office/drawing/2014/main" id="{67CBAEAC-E410-0712-89F4-3B4EBD570AEB}"/>
+                    </a:ext>
+                  </a:extLst>
+                </p:cNvPr>
+                <p:cNvSpPr txBox="1"/>
+                <p:nvPr/>
+              </p:nvSpPr>
+              <p:spPr>
+                <a:xfrm>
+                  <a:off x="3135843" y="5381109"/>
+                  <a:ext cx="643466" cy="369332"/>
+                </a:xfrm>
+                <a:prstGeom prst="rect">
+                  <a:avLst/>
+                </a:prstGeom>
+                <a:noFill/>
+              </p:spPr>
+              <p:txBody>
+                <a:bodyPr wrap="square" rtlCol="0">
+                  <a:spAutoFit/>
+                </a:bodyPr>
+                <a:lstStyle/>
+                <a:p>
+                  <a14:m>
+                    <m:oMathPara xmlns:m="http://schemas.openxmlformats.org/officeDocument/2006/math">
+                      <m:oMathParaPr>
+                        <m:jc m:val="centerGroup"/>
+                      </m:oMathParaPr>
+                      <m:oMath xmlns:m="http://schemas.openxmlformats.org/officeDocument/2006/math">
+                        <m:r>
+                          <a:rPr lang="en-US" b="0" i="1" smtClean="0">
+                            <a:latin typeface="Cambria Math" panose="02040503050406030204" pitchFamily="18" charset="0"/>
+                          </a:rPr>
+                          <m:t>𝑖</m:t>
+                        </m:r>
+                        <m:r>
+                          <a:rPr lang="en-US" b="0" i="1" smtClean="0">
+                            <a:latin typeface="Cambria Math" panose="02040503050406030204" pitchFamily="18" charset="0"/>
+                          </a:rPr>
+                          <m:t>−</m:t>
+                        </m:r>
+                        <m:r>
+                          <a:rPr lang="en-US" b="0" i="1" smtClean="0">
+                            <a:latin typeface="Cambria Math" panose="02040503050406030204" pitchFamily="18" charset="0"/>
+                          </a:rPr>
+                          <m:t>𝑗</m:t>
+                        </m:r>
+                      </m:oMath>
+                    </m:oMathPara>
+                  </a14:m>
+                  <a:endParaRPr lang="en-US" dirty="0"/>
+                </a:p>
+              </p:txBody>
+            </p:sp>
+          </mc:Choice>
+          <mc:Fallback>
+            <p:sp>
+              <p:nvSpPr>
+                <p:cNvPr id="28" name="TextBox 27">
+                  <a:extLst>
+                    <a:ext uri="{FF2B5EF4-FFF2-40B4-BE49-F238E27FC236}">
+                      <a16:creationId xmlns:a16="http://schemas.microsoft.com/office/drawing/2014/main" id="{67CBAEAC-E410-0712-89F4-3B4EBD570AEB}"/>
+                    </a:ext>
+                  </a:extLst>
+                </p:cNvPr>
+                <p:cNvSpPr txBox="1">
+                  <a:spLocks noRot="1" noChangeAspect="1" noMove="1" noResize="1" noEditPoints="1" noAdjustHandles="1" noChangeArrowheads="1" noChangeShapeType="1" noTextEdit="1"/>
+                </p:cNvSpPr>
+                <p:nvPr/>
+              </p:nvSpPr>
+              <p:spPr>
+                <a:xfrm>
+                  <a:off x="3135843" y="5381109"/>
+                  <a:ext cx="643466" cy="369332"/>
+                </a:xfrm>
+                <a:prstGeom prst="rect">
+                  <a:avLst/>
+                </a:prstGeom>
+                <a:blipFill>
+                  <a:blip r:embed="rId6"/>
+                  <a:stretch>
+                    <a:fillRect r="-943" b="-13333"/>
+                  </a:stretch>
+                </a:blipFill>
+              </p:spPr>
+              <p:txBody>
+                <a:bodyPr/>
+                <a:lstStyle/>
+                <a:p>
+                  <a:r>
+                    <a:rPr lang="en-US">
+                      <a:noFill/>
+                    </a:rPr>
+                    <a:t> </a:t>
+                  </a:r>
+                </a:p>
+              </p:txBody>
+            </p:sp>
+          </mc:Fallback>
+        </mc:AlternateContent>
+        <mc:AlternateContent xmlns:mc="http://schemas.openxmlformats.org/markup-compatibility/2006">
+          <mc:Choice xmlns:a14="http://schemas.microsoft.com/office/drawing/2010/main" Requires="a14">
+            <p:sp>
+              <p:nvSpPr>
+                <p:cNvPr id="29" name="TextBox 28">
+                  <a:extLst>
+                    <a:ext uri="{FF2B5EF4-FFF2-40B4-BE49-F238E27FC236}">
+                      <a16:creationId xmlns:a16="http://schemas.microsoft.com/office/drawing/2014/main" id="{CC334D88-0BC6-5131-00A6-01B8DE91443F}"/>
+                    </a:ext>
+                  </a:extLst>
+                </p:cNvPr>
+                <p:cNvSpPr txBox="1"/>
+                <p:nvPr/>
+              </p:nvSpPr>
+              <p:spPr>
+                <a:xfrm>
+                  <a:off x="4759326" y="5358884"/>
+                  <a:ext cx="749299" cy="369332"/>
+                </a:xfrm>
+                <a:prstGeom prst="rect">
+                  <a:avLst/>
+                </a:prstGeom>
+                <a:noFill/>
+              </p:spPr>
+              <p:txBody>
+                <a:bodyPr wrap="square" rtlCol="0">
+                  <a:spAutoFit/>
+                </a:bodyPr>
+                <a:lstStyle/>
+                <a:p>
+                  <a14:m>
+                    <m:oMathPara xmlns:m="http://schemas.openxmlformats.org/officeDocument/2006/math">
+                      <m:oMathParaPr>
+                        <m:jc m:val="centerGroup"/>
+                      </m:oMathParaPr>
+                      <m:oMath xmlns:m="http://schemas.openxmlformats.org/officeDocument/2006/math">
+                        <m:r>
+                          <a:rPr lang="en-US" b="0" i="1" smtClean="0">
+                            <a:latin typeface="Cambria Math" panose="02040503050406030204" pitchFamily="18" charset="0"/>
+                          </a:rPr>
+                          <m:t>𝑖</m:t>
+                        </m:r>
+                        <m:r>
+                          <a:rPr lang="en-US" b="0" i="1" smtClean="0">
+                            <a:latin typeface="Cambria Math" panose="02040503050406030204" pitchFamily="18" charset="0"/>
+                          </a:rPr>
+                          <m:t>−1</m:t>
+                        </m:r>
+                      </m:oMath>
+                    </m:oMathPara>
+                  </a14:m>
+                  <a:endParaRPr lang="en-US" dirty="0"/>
+                </a:p>
+              </p:txBody>
+            </p:sp>
+          </mc:Choice>
+          <mc:Fallback>
+            <p:sp>
+              <p:nvSpPr>
+                <p:cNvPr id="29" name="TextBox 28">
+                  <a:extLst>
+                    <a:ext uri="{FF2B5EF4-FFF2-40B4-BE49-F238E27FC236}">
+                      <a16:creationId xmlns:a16="http://schemas.microsoft.com/office/drawing/2014/main" id="{CC334D88-0BC6-5131-00A6-01B8DE91443F}"/>
+                    </a:ext>
+                  </a:extLst>
+                </p:cNvPr>
+                <p:cNvSpPr txBox="1">
+                  <a:spLocks noRot="1" noChangeAspect="1" noMove="1" noResize="1" noEditPoints="1" noAdjustHandles="1" noChangeArrowheads="1" noChangeShapeType="1" noTextEdit="1"/>
+                </p:cNvSpPr>
+                <p:nvPr/>
+              </p:nvSpPr>
+              <p:spPr>
+                <a:xfrm>
+                  <a:off x="4759326" y="5358884"/>
+                  <a:ext cx="749299" cy="369332"/>
+                </a:xfrm>
+                <a:prstGeom prst="rect">
+                  <a:avLst/>
+                </a:prstGeom>
+                <a:blipFill>
+                  <a:blip r:embed="rId7"/>
+                  <a:stretch>
+                    <a:fillRect/>
+                  </a:stretch>
+                </a:blipFill>
+              </p:spPr>
+              <p:txBody>
+                <a:bodyPr/>
+                <a:lstStyle/>
+                <a:p>
+                  <a:r>
+                    <a:rPr lang="en-US">
+                      <a:noFill/>
+                    </a:rPr>
+                    <a:t> </a:t>
+                  </a:r>
+                </a:p>
+              </p:txBody>
+            </p:sp>
+          </mc:Fallback>
+        </mc:AlternateContent>
+        <mc:AlternateContent xmlns:mc="http://schemas.openxmlformats.org/markup-compatibility/2006">
+          <mc:Choice xmlns:a14="http://schemas.microsoft.com/office/drawing/2010/main" Requires="a14">
+            <p:sp>
+              <p:nvSpPr>
+                <p:cNvPr id="30" name="TextBox 29">
+                  <a:extLst>
+                    <a:ext uri="{FF2B5EF4-FFF2-40B4-BE49-F238E27FC236}">
+                      <a16:creationId xmlns:a16="http://schemas.microsoft.com/office/drawing/2014/main" id="{691D759A-3B9A-B885-C096-CC572D58B5BA}"/>
+                    </a:ext>
+                  </a:extLst>
+                </p:cNvPr>
+                <p:cNvSpPr txBox="1"/>
+                <p:nvPr/>
+              </p:nvSpPr>
+              <p:spPr>
+                <a:xfrm>
+                  <a:off x="456142" y="5381109"/>
+                  <a:ext cx="643466" cy="369332"/>
+                </a:xfrm>
+                <a:prstGeom prst="rect">
+                  <a:avLst/>
+                </a:prstGeom>
+                <a:noFill/>
+              </p:spPr>
+              <p:txBody>
+                <a:bodyPr wrap="square" rtlCol="0">
+                  <a:spAutoFit/>
+                </a:bodyPr>
+                <a:lstStyle/>
+                <a:p>
+                  <a14:m>
+                    <m:oMathPara xmlns:m="http://schemas.openxmlformats.org/officeDocument/2006/math">
+                      <m:oMathParaPr>
+                        <m:jc m:val="centerGroup"/>
+                      </m:oMathParaPr>
+                      <m:oMath xmlns:m="http://schemas.openxmlformats.org/officeDocument/2006/math">
+                        <m:r>
+                          <a:rPr lang="en-US" b="0" i="1" smtClean="0">
+                            <a:latin typeface="Cambria Math" panose="02040503050406030204" pitchFamily="18" charset="0"/>
+                          </a:rPr>
+                          <m:t>0</m:t>
+                        </m:r>
+                      </m:oMath>
+                    </m:oMathPara>
+                  </a14:m>
+                  <a:endParaRPr lang="en-US" dirty="0"/>
+                </a:p>
+              </p:txBody>
+            </p:sp>
+          </mc:Choice>
+          <mc:Fallback>
+            <p:sp>
+              <p:nvSpPr>
+                <p:cNvPr id="30" name="TextBox 29">
+                  <a:extLst>
+                    <a:ext uri="{FF2B5EF4-FFF2-40B4-BE49-F238E27FC236}">
+                      <a16:creationId xmlns:a16="http://schemas.microsoft.com/office/drawing/2014/main" id="{691D759A-3B9A-B885-C096-CC572D58B5BA}"/>
+                    </a:ext>
+                  </a:extLst>
+                </p:cNvPr>
+                <p:cNvSpPr txBox="1">
+                  <a:spLocks noRot="1" noChangeAspect="1" noMove="1" noResize="1" noEditPoints="1" noAdjustHandles="1" noChangeArrowheads="1" noChangeShapeType="1" noTextEdit="1"/>
+                </p:cNvSpPr>
+                <p:nvPr/>
+              </p:nvSpPr>
+              <p:spPr>
+                <a:xfrm>
+                  <a:off x="456142" y="5381109"/>
+                  <a:ext cx="643466" cy="369332"/>
+                </a:xfrm>
+                <a:prstGeom prst="rect">
+                  <a:avLst/>
+                </a:prstGeom>
+                <a:blipFill>
+                  <a:blip r:embed="rId8"/>
+                  <a:stretch>
+                    <a:fillRect/>
+                  </a:stretch>
+                </a:blipFill>
+              </p:spPr>
+              <p:txBody>
+                <a:bodyPr/>
+                <a:lstStyle/>
+                <a:p>
+                  <a:r>
+                    <a:rPr lang="en-US">
+                      <a:noFill/>
+                    </a:rPr>
+                    <a:t> </a:t>
+                  </a:r>
+                </a:p>
+              </p:txBody>
+            </p:sp>
+          </mc:Fallback>
+        </mc:AlternateContent>
+      </p:grpSp>
+      <p:cxnSp>
+        <p:nvCxnSpPr>
+          <p:cNvPr id="34" name="Straight Connector 33">
+            <a:extLst>
+              <a:ext uri="{FF2B5EF4-FFF2-40B4-BE49-F238E27FC236}">
+                <a16:creationId xmlns:a16="http://schemas.microsoft.com/office/drawing/2014/main" id="{5501827D-3F12-561E-CDC0-73238C452AB2}"/>
+              </a:ext>
+            </a:extLst>
+          </p:cNvPr>
+          <p:cNvCxnSpPr/>
+          <p:nvPr/>
+        </p:nvCxnSpPr>
+        <p:spPr>
+          <a:xfrm>
+            <a:off x="6371590" y="3873500"/>
+            <a:ext cx="4356101" cy="0"/>
+          </a:xfrm>
+          <a:prstGeom prst="line">
+            <a:avLst/>
+          </a:prstGeom>
+          <a:ln w="28575"/>
+        </p:spPr>
+        <p:style>
+          <a:lnRef idx="1">
+            <a:schemeClr val="dk1"/>
+          </a:lnRef>
+          <a:fillRef idx="0">
+            <a:schemeClr val="dk1"/>
+          </a:fillRef>
+          <a:effectRef idx="0">
+            <a:schemeClr val="dk1"/>
+          </a:effectRef>
+          <a:fontRef idx="minor">
+            <a:schemeClr val="tx1"/>
+          </a:fontRef>
+        </p:style>
+      </p:cxnSp>
+      <p:cxnSp>
+        <p:nvCxnSpPr>
+          <p:cNvPr id="35" name="Straight Connector 34">
+            <a:extLst>
+              <a:ext uri="{FF2B5EF4-FFF2-40B4-BE49-F238E27FC236}">
+                <a16:creationId xmlns:a16="http://schemas.microsoft.com/office/drawing/2014/main" id="{E3FE5714-7B19-4304-3208-271B5B0B27A2}"/>
+              </a:ext>
+            </a:extLst>
+          </p:cNvPr>
+          <p:cNvCxnSpPr>
+            <a:cxnSpLocks/>
+          </p:cNvCxnSpPr>
+          <p:nvPr/>
+        </p:nvCxnSpPr>
+        <p:spPr>
+          <a:xfrm>
+            <a:off x="7076440" y="4171950"/>
+            <a:ext cx="1676400" cy="0"/>
+          </a:xfrm>
+          <a:prstGeom prst="line">
+            <a:avLst/>
+          </a:prstGeom>
+          <a:ln w="19050"/>
+        </p:spPr>
+        <p:style>
+          <a:lnRef idx="1">
+            <a:schemeClr val="dk1"/>
+          </a:lnRef>
+          <a:fillRef idx="0">
+            <a:schemeClr val="dk1"/>
+          </a:fillRef>
+          <a:effectRef idx="0">
+            <a:schemeClr val="dk1"/>
+          </a:effectRef>
+          <a:fontRef idx="minor">
+            <a:schemeClr val="tx1"/>
+          </a:fontRef>
+        </p:style>
+      </p:cxnSp>
+      <p:grpSp>
+        <p:nvGrpSpPr>
+          <p:cNvPr id="48" name="Group 47">
+            <a:extLst>
+              <a:ext uri="{FF2B5EF4-FFF2-40B4-BE49-F238E27FC236}">
+                <a16:creationId xmlns:a16="http://schemas.microsoft.com/office/drawing/2014/main" id="{B32BB9A6-42F1-D055-F429-A69CB351A5A8}"/>
+              </a:ext>
+            </a:extLst>
+          </p:cNvPr>
+          <p:cNvGrpSpPr/>
+          <p:nvPr/>
+        </p:nvGrpSpPr>
+        <p:grpSpPr>
+          <a:xfrm>
+            <a:off x="7076440" y="3608704"/>
+            <a:ext cx="1366520" cy="860423"/>
+            <a:chOff x="7076440" y="3608705"/>
+            <a:chExt cx="1366520" cy="563242"/>
+          </a:xfrm>
+        </p:grpSpPr>
+        <p:cxnSp>
+          <p:nvCxnSpPr>
+            <p:cNvPr id="40" name="Straight Connector 39">
+              <a:extLst>
+                <a:ext uri="{FF2B5EF4-FFF2-40B4-BE49-F238E27FC236}">
+                  <a16:creationId xmlns:a16="http://schemas.microsoft.com/office/drawing/2014/main" id="{E9D0A349-2FB5-9E18-469F-E8389A5C1DF7}"/>
+                </a:ext>
+              </a:extLst>
+            </p:cNvPr>
+            <p:cNvCxnSpPr>
+              <a:cxnSpLocks/>
+            </p:cNvCxnSpPr>
+            <p:nvPr/>
+          </p:nvCxnSpPr>
+          <p:spPr>
+            <a:xfrm>
+              <a:off x="7076440" y="3608705"/>
+              <a:ext cx="0" cy="563242"/>
+            </a:xfrm>
+            <a:prstGeom prst="line">
+              <a:avLst/>
+            </a:prstGeom>
+          </p:spPr>
+          <p:style>
+            <a:lnRef idx="1">
+              <a:schemeClr val="dk1"/>
+            </a:lnRef>
+            <a:fillRef idx="0">
+              <a:schemeClr val="dk1"/>
+            </a:fillRef>
+            <a:effectRef idx="0">
+              <a:schemeClr val="dk1"/>
+            </a:effectRef>
+            <a:fontRef idx="minor">
+              <a:schemeClr val="tx1"/>
+            </a:fontRef>
+          </p:style>
+        </p:cxnSp>
+        <p:cxnSp>
+          <p:nvCxnSpPr>
+            <p:cNvPr id="41" name="Straight Connector 40">
+              <a:extLst>
+                <a:ext uri="{FF2B5EF4-FFF2-40B4-BE49-F238E27FC236}">
+                  <a16:creationId xmlns:a16="http://schemas.microsoft.com/office/drawing/2014/main" id="{D5B1DA82-FC9C-DF3E-889E-2C11537778A8}"/>
+                </a:ext>
+              </a:extLst>
+            </p:cNvPr>
+            <p:cNvCxnSpPr>
+              <a:cxnSpLocks/>
+            </p:cNvCxnSpPr>
+            <p:nvPr/>
+          </p:nvCxnSpPr>
+          <p:spPr>
+            <a:xfrm>
+              <a:off x="8442960" y="3608705"/>
+              <a:ext cx="0" cy="563242"/>
+            </a:xfrm>
+            <a:prstGeom prst="line">
+              <a:avLst/>
+            </a:prstGeom>
+          </p:spPr>
+          <p:style>
+            <a:lnRef idx="1">
+              <a:schemeClr val="dk1"/>
+            </a:lnRef>
+            <a:fillRef idx="0">
+              <a:schemeClr val="dk1"/>
+            </a:fillRef>
+            <a:effectRef idx="0">
+              <a:schemeClr val="dk1"/>
+            </a:effectRef>
+            <a:fontRef idx="minor">
+              <a:schemeClr val="tx1"/>
+            </a:fontRef>
+          </p:style>
+        </p:cxnSp>
+      </p:grpSp>
+      <p:cxnSp>
+        <p:nvCxnSpPr>
+          <p:cNvPr id="45" name="Straight Connector 44">
+            <a:extLst>
+              <a:ext uri="{FF2B5EF4-FFF2-40B4-BE49-F238E27FC236}">
+                <a16:creationId xmlns:a16="http://schemas.microsoft.com/office/drawing/2014/main" id="{FA7483D4-1F8D-EA42-A2EF-4031D0663A1C}"/>
+              </a:ext>
+            </a:extLst>
+          </p:cNvPr>
+          <p:cNvCxnSpPr>
+            <a:cxnSpLocks/>
+          </p:cNvCxnSpPr>
+          <p:nvPr/>
+        </p:nvCxnSpPr>
+        <p:spPr>
+          <a:xfrm>
+            <a:off x="7914640" y="4469127"/>
+            <a:ext cx="1676400" cy="0"/>
+          </a:xfrm>
+          <a:prstGeom prst="line">
+            <a:avLst/>
+          </a:prstGeom>
+          <a:ln w="19050"/>
+        </p:spPr>
+        <p:style>
+          <a:lnRef idx="1">
+            <a:schemeClr val="dk1"/>
+          </a:lnRef>
+          <a:fillRef idx="0">
+            <a:schemeClr val="dk1"/>
+          </a:fillRef>
+          <a:effectRef idx="0">
+            <a:schemeClr val="dk1"/>
+          </a:effectRef>
+          <a:fontRef idx="minor">
+            <a:schemeClr val="tx1"/>
+          </a:fontRef>
+        </p:style>
+      </p:cxnSp>
+      <p:sp>
+        <p:nvSpPr>
+          <p:cNvPr id="46" name="Oval 45">
+            <a:extLst>
+              <a:ext uri="{FF2B5EF4-FFF2-40B4-BE49-F238E27FC236}">
+                <a16:creationId xmlns:a16="http://schemas.microsoft.com/office/drawing/2014/main" id="{CD6EFE9B-236C-C2BE-49E9-DA3036A50185}"/>
+              </a:ext>
+            </a:extLst>
+          </p:cNvPr>
+          <p:cNvSpPr/>
+          <p:nvPr/>
+        </p:nvSpPr>
+        <p:spPr>
+          <a:xfrm>
+            <a:off x="8442008" y="3783971"/>
+            <a:ext cx="70483" cy="70483"/>
+          </a:xfrm>
+          <a:prstGeom prst="ellipse">
+            <a:avLst/>
+          </a:prstGeom>
+          <a:noFill/>
+          <a:ln>
+            <a:solidFill>
+              <a:schemeClr val="accent4"/>
+            </a:solidFill>
+          </a:ln>
+        </p:spPr>
+        <p:style>
+          <a:lnRef idx="2">
+            <a:schemeClr val="dk1">
+              <a:shade val="50000"/>
+            </a:schemeClr>
+          </a:lnRef>
+          <a:fillRef idx="1">
+            <a:schemeClr val="dk1"/>
+          </a:fillRef>
+          <a:effectRef idx="0">
+            <a:schemeClr val="dk1"/>
+          </a:effectRef>
+          <a:fontRef idx="minor">
+            <a:schemeClr val="lt1"/>
+          </a:fontRef>
+        </p:style>
+        <p:txBody>
+          <a:bodyPr rtlCol="0" anchor="ctr"/>
+          <a:lstStyle/>
+          <a:p>
+            <a:pPr algn="ctr"/>
+            <a:endParaRPr lang="en-US"/>
+          </a:p>
+        </p:txBody>
+      </p:sp>
+      <p:sp>
+        <p:nvSpPr>
+          <p:cNvPr id="47" name="Oval 46">
+            <a:extLst>
+              <a:ext uri="{FF2B5EF4-FFF2-40B4-BE49-F238E27FC236}">
+                <a16:creationId xmlns:a16="http://schemas.microsoft.com/office/drawing/2014/main" id="{B99B60EE-11AB-CD6A-D133-3493640CDEDD}"/>
+              </a:ext>
+            </a:extLst>
+          </p:cNvPr>
+          <p:cNvSpPr/>
+          <p:nvPr/>
+        </p:nvSpPr>
+        <p:spPr>
+          <a:xfrm>
+            <a:off x="8442008" y="4085597"/>
+            <a:ext cx="70483" cy="70483"/>
+          </a:xfrm>
+          <a:prstGeom prst="ellipse">
+            <a:avLst/>
+          </a:prstGeom>
+          <a:noFill/>
+          <a:ln>
+            <a:solidFill>
+              <a:schemeClr val="accent5"/>
+            </a:solidFill>
+          </a:ln>
+        </p:spPr>
+        <p:style>
+          <a:lnRef idx="2">
+            <a:schemeClr val="dk1">
+              <a:shade val="50000"/>
+            </a:schemeClr>
+          </a:lnRef>
+          <a:fillRef idx="1">
+            <a:schemeClr val="dk1"/>
+          </a:fillRef>
+          <a:effectRef idx="0">
+            <a:schemeClr val="dk1"/>
+          </a:effectRef>
+          <a:fontRef idx="minor">
+            <a:schemeClr val="lt1"/>
+          </a:fontRef>
+        </p:style>
+        <p:txBody>
+          <a:bodyPr rtlCol="0" anchor="ctr"/>
+          <a:lstStyle/>
+          <a:p>
+            <a:pPr algn="ctr"/>
+            <a:endParaRPr lang="en-US"/>
+          </a:p>
+        </p:txBody>
+      </p:sp>
+      <mc:AlternateContent xmlns:mc="http://schemas.openxmlformats.org/markup-compatibility/2006">
+        <mc:Choice xmlns:a14="http://schemas.microsoft.com/office/drawing/2010/main" Requires="a14">
+          <p:sp>
+            <p:nvSpPr>
+              <p:cNvPr id="49" name="TextBox 48">
+                <a:extLst>
+                  <a:ext uri="{FF2B5EF4-FFF2-40B4-BE49-F238E27FC236}">
+                    <a16:creationId xmlns:a16="http://schemas.microsoft.com/office/drawing/2014/main" id="{A7D292B8-F696-181D-69E4-8E70236AE1C6}"/>
+                  </a:ext>
+                </a:extLst>
+              </p:cNvPr>
+              <p:cNvSpPr txBox="1"/>
+              <p:nvPr/>
+            </p:nvSpPr>
+            <p:spPr>
+              <a:xfrm>
+                <a:off x="7917497" y="3351048"/>
+                <a:ext cx="523240" cy="253916"/>
+              </a:xfrm>
+              <a:prstGeom prst="rect">
+                <a:avLst/>
+              </a:prstGeom>
+              <a:noFill/>
+            </p:spPr>
+            <p:txBody>
+              <a:bodyPr wrap="square" rtlCol="0">
+                <a:spAutoFit/>
+              </a:bodyPr>
+              <a:lstStyle/>
+              <a:p>
+                <a:pPr/>
+                <a14:m>
+                  <m:oMathPara xmlns:m="http://schemas.openxmlformats.org/officeDocument/2006/math">
+                    <m:oMathParaPr>
+                      <m:jc m:val="center"/>
+                    </m:oMathParaPr>
+                    <m:oMath xmlns:m="http://schemas.openxmlformats.org/officeDocument/2006/math">
+                      <m:r>
+                        <a:rPr lang="en-US" sz="1050" b="0" i="1" smtClean="0">
+                          <a:latin typeface="Cambria Math" panose="02040503050406030204" pitchFamily="18" charset="0"/>
+                        </a:rPr>
+                        <m:t>𝑖</m:t>
+                      </m:r>
+                      <m:r>
+                        <a:rPr lang="en-US" sz="1050" b="0" i="1" smtClean="0">
+                          <a:latin typeface="Cambria Math" panose="02040503050406030204" pitchFamily="18" charset="0"/>
+                        </a:rPr>
+                        <m:t>−1</m:t>
+                      </m:r>
+                    </m:oMath>
+                  </m:oMathPara>
+                </a14:m>
+                <a:endParaRPr lang="en-US" sz="1050" dirty="0"/>
+              </a:p>
+            </p:txBody>
+          </p:sp>
+        </mc:Choice>
+        <mc:Fallback>
+          <p:sp>
+            <p:nvSpPr>
+              <p:cNvPr id="49" name="TextBox 48">
+                <a:extLst>
+                  <a:ext uri="{FF2B5EF4-FFF2-40B4-BE49-F238E27FC236}">
+                    <a16:creationId xmlns:a16="http://schemas.microsoft.com/office/drawing/2014/main" id="{A7D292B8-F696-181D-69E4-8E70236AE1C6}"/>
+                  </a:ext>
+                </a:extLst>
+              </p:cNvPr>
+              <p:cNvSpPr txBox="1">
+                <a:spLocks noRot="1" noChangeAspect="1" noMove="1" noResize="1" noEditPoints="1" noAdjustHandles="1" noChangeArrowheads="1" noChangeShapeType="1" noTextEdit="1"/>
+              </p:cNvSpPr>
+              <p:nvPr/>
+            </p:nvSpPr>
+            <p:spPr>
+              <a:xfrm>
+                <a:off x="7917497" y="3351048"/>
+                <a:ext cx="523240" cy="253916"/>
+              </a:xfrm>
+              <a:prstGeom prst="rect">
+                <a:avLst/>
+              </a:prstGeom>
+              <a:blipFill>
+                <a:blip r:embed="rId9"/>
+                <a:stretch>
+                  <a:fillRect/>
+                </a:stretch>
+              </a:blipFill>
+            </p:spPr>
+            <p:txBody>
+              <a:bodyPr/>
+              <a:lstStyle/>
+              <a:p>
+                <a:r>
+                  <a:rPr lang="en-US">
+                    <a:noFill/>
+                  </a:rPr>
+                  <a:t> </a:t>
+                </a:r>
+              </a:p>
+            </p:txBody>
+          </p:sp>
+        </mc:Fallback>
+      </mc:AlternateContent>
+      <mc:AlternateContent xmlns:mc="http://schemas.openxmlformats.org/markup-compatibility/2006">
+        <mc:Choice xmlns:a14="http://schemas.microsoft.com/office/drawing/2010/main" Requires="a14">
+          <p:sp>
+            <p:nvSpPr>
+              <p:cNvPr id="50" name="TextBox 49">
+                <a:extLst>
+                  <a:ext uri="{FF2B5EF4-FFF2-40B4-BE49-F238E27FC236}">
+                    <a16:creationId xmlns:a16="http://schemas.microsoft.com/office/drawing/2014/main" id="{2773BE53-8BDC-EF04-E6D0-51F2AAC47482}"/>
+                  </a:ext>
+                </a:extLst>
+              </p:cNvPr>
+              <p:cNvSpPr txBox="1"/>
+              <p:nvPr/>
+            </p:nvSpPr>
+            <p:spPr>
+              <a:xfrm>
+                <a:off x="8441213" y="3351048"/>
+                <a:ext cx="523240" cy="253916"/>
+              </a:xfrm>
+              <a:prstGeom prst="rect">
+                <a:avLst/>
+              </a:prstGeom>
+              <a:noFill/>
+            </p:spPr>
+            <p:txBody>
+              <a:bodyPr wrap="square" rtlCol="0">
+                <a:spAutoFit/>
+              </a:bodyPr>
+              <a:lstStyle/>
+              <a:p>
+                <a:pPr/>
+                <a14:m>
+                  <m:oMathPara xmlns:m="http://schemas.openxmlformats.org/officeDocument/2006/math">
+                    <m:oMathParaPr>
+                      <m:jc m:val="center"/>
+                    </m:oMathParaPr>
+                    <m:oMath xmlns:m="http://schemas.openxmlformats.org/officeDocument/2006/math">
+                      <m:r>
+                        <a:rPr lang="en-US" sz="1050" b="0" i="1" smtClean="0">
+                          <a:latin typeface="Cambria Math" panose="02040503050406030204" pitchFamily="18" charset="0"/>
+                        </a:rPr>
+                        <m:t>𝑖</m:t>
+                      </m:r>
+                    </m:oMath>
+                  </m:oMathPara>
+                </a14:m>
+                <a:endParaRPr lang="en-US" sz="1050" dirty="0"/>
+              </a:p>
+            </p:txBody>
+          </p:sp>
+        </mc:Choice>
+        <mc:Fallback>
+          <p:sp>
+            <p:nvSpPr>
+              <p:cNvPr id="50" name="TextBox 49">
+                <a:extLst>
+                  <a:ext uri="{FF2B5EF4-FFF2-40B4-BE49-F238E27FC236}">
+                    <a16:creationId xmlns:a16="http://schemas.microsoft.com/office/drawing/2014/main" id="{2773BE53-8BDC-EF04-E6D0-51F2AAC47482}"/>
+                  </a:ext>
+                </a:extLst>
+              </p:cNvPr>
+              <p:cNvSpPr txBox="1">
+                <a:spLocks noRot="1" noChangeAspect="1" noMove="1" noResize="1" noEditPoints="1" noAdjustHandles="1" noChangeArrowheads="1" noChangeShapeType="1" noTextEdit="1"/>
+              </p:cNvSpPr>
+              <p:nvPr/>
+            </p:nvSpPr>
+            <p:spPr>
+              <a:xfrm>
+                <a:off x="8441213" y="3351048"/>
+                <a:ext cx="523240" cy="253916"/>
+              </a:xfrm>
+              <a:prstGeom prst="rect">
+                <a:avLst/>
+              </a:prstGeom>
+              <a:blipFill>
+                <a:blip r:embed="rId10"/>
+                <a:stretch>
+                  <a:fillRect/>
+                </a:stretch>
+              </a:blipFill>
+            </p:spPr>
+            <p:txBody>
+              <a:bodyPr/>
+              <a:lstStyle/>
+              <a:p>
+                <a:r>
+                  <a:rPr lang="en-US">
+                    <a:noFill/>
+                  </a:rPr>
+                  <a:t> </a:t>
+                </a:r>
+              </a:p>
+            </p:txBody>
+          </p:sp>
+        </mc:Fallback>
+      </mc:AlternateContent>
+      <mc:AlternateContent xmlns:mc="http://schemas.openxmlformats.org/markup-compatibility/2006">
+        <mc:Choice xmlns:a14="http://schemas.microsoft.com/office/drawing/2010/main" Requires="a14">
+          <p:sp>
+            <p:nvSpPr>
+              <p:cNvPr id="52" name="TextBox 51">
+                <a:extLst>
+                  <a:ext uri="{FF2B5EF4-FFF2-40B4-BE49-F238E27FC236}">
+                    <a16:creationId xmlns:a16="http://schemas.microsoft.com/office/drawing/2014/main" id="{54A94573-D1D6-B2DC-C50F-8ED9D59DA731}"/>
+                  </a:ext>
+                </a:extLst>
+              </p:cNvPr>
+              <p:cNvSpPr txBox="1"/>
+              <p:nvPr/>
+            </p:nvSpPr>
+            <p:spPr>
+              <a:xfrm>
+                <a:off x="7917497" y="4177710"/>
+                <a:ext cx="523240" cy="253916"/>
+              </a:xfrm>
+              <a:prstGeom prst="rect">
+                <a:avLst/>
+              </a:prstGeom>
+              <a:noFill/>
+            </p:spPr>
+            <p:txBody>
+              <a:bodyPr wrap="square" rtlCol="0">
+                <a:spAutoFit/>
+              </a:bodyPr>
+              <a:lstStyle/>
+              <a:p>
+                <a:pPr/>
+                <a14:m>
+                  <m:oMathPara xmlns:m="http://schemas.openxmlformats.org/officeDocument/2006/math">
+                    <m:oMathParaPr>
+                      <m:jc m:val="center"/>
+                    </m:oMathParaPr>
+                    <m:oMath xmlns:m="http://schemas.openxmlformats.org/officeDocument/2006/math">
+                      <m:r>
+                        <a:rPr lang="en-US" sz="1050" b="0" i="1" smtClean="0">
+                          <a:latin typeface="Cambria Math" panose="02040503050406030204" pitchFamily="18" charset="0"/>
+                        </a:rPr>
+                        <m:t>𝑗</m:t>
+                      </m:r>
+                    </m:oMath>
+                  </m:oMathPara>
+                </a14:m>
+                <a:endParaRPr lang="en-US" sz="1050" dirty="0"/>
+              </a:p>
+            </p:txBody>
+          </p:sp>
+        </mc:Choice>
+        <mc:Fallback>
+          <p:sp>
+            <p:nvSpPr>
+              <p:cNvPr id="52" name="TextBox 51">
+                <a:extLst>
+                  <a:ext uri="{FF2B5EF4-FFF2-40B4-BE49-F238E27FC236}">
+                    <a16:creationId xmlns:a16="http://schemas.microsoft.com/office/drawing/2014/main" id="{54A94573-D1D6-B2DC-C50F-8ED9D59DA731}"/>
+                  </a:ext>
+                </a:extLst>
+              </p:cNvPr>
+              <p:cNvSpPr txBox="1">
+                <a:spLocks noRot="1" noChangeAspect="1" noMove="1" noResize="1" noEditPoints="1" noAdjustHandles="1" noChangeArrowheads="1" noChangeShapeType="1" noTextEdit="1"/>
+              </p:cNvSpPr>
+              <p:nvPr/>
+            </p:nvSpPr>
+            <p:spPr>
+              <a:xfrm>
+                <a:off x="7917497" y="4177710"/>
+                <a:ext cx="523240" cy="253916"/>
+              </a:xfrm>
+              <a:prstGeom prst="rect">
+                <a:avLst/>
+              </a:prstGeom>
+              <a:blipFill>
+                <a:blip r:embed="rId11"/>
+                <a:stretch>
+                  <a:fillRect b="-4762"/>
+                </a:stretch>
+              </a:blipFill>
+            </p:spPr>
+            <p:txBody>
+              <a:bodyPr/>
+              <a:lstStyle/>
+              <a:p>
+                <a:r>
+                  <a:rPr lang="en-US">
+                    <a:noFill/>
+                  </a:rPr>
+                  <a:t> </a:t>
+                </a:r>
+              </a:p>
+            </p:txBody>
+          </p:sp>
+        </mc:Fallback>
+      </mc:AlternateContent>
+      <mc:AlternateContent xmlns:mc="http://schemas.openxmlformats.org/markup-compatibility/2006">
+        <mc:Choice xmlns:a14="http://schemas.microsoft.com/office/drawing/2010/main" Requires="a14">
+          <p:sp>
+            <p:nvSpPr>
+              <p:cNvPr id="53" name="TextBox 52">
+                <a:extLst>
+                  <a:ext uri="{FF2B5EF4-FFF2-40B4-BE49-F238E27FC236}">
+                    <a16:creationId xmlns:a16="http://schemas.microsoft.com/office/drawing/2014/main" id="{BA52F616-807B-00EE-D452-BB6EC867C6F5}"/>
+                  </a:ext>
+                </a:extLst>
+              </p:cNvPr>
+              <p:cNvSpPr txBox="1"/>
+              <p:nvPr/>
+            </p:nvSpPr>
+            <p:spPr>
+              <a:xfrm>
+                <a:off x="8441213" y="4177710"/>
+                <a:ext cx="523240" cy="253916"/>
+              </a:xfrm>
+              <a:prstGeom prst="rect">
+                <a:avLst/>
+              </a:prstGeom>
+              <a:noFill/>
+            </p:spPr>
+            <p:txBody>
+              <a:bodyPr wrap="square" rtlCol="0">
+                <a:spAutoFit/>
+              </a:bodyPr>
+              <a:lstStyle/>
+              <a:p>
+                <a:pPr/>
+                <a14:m>
+                  <m:oMathPara xmlns:m="http://schemas.openxmlformats.org/officeDocument/2006/math">
+                    <m:oMathParaPr>
+                      <m:jc m:val="center"/>
+                    </m:oMathParaPr>
+                    <m:oMath xmlns:m="http://schemas.openxmlformats.org/officeDocument/2006/math">
+                      <m:r>
+                        <a:rPr lang="en-US" sz="1050" b="0" i="1" smtClean="0">
+                          <a:latin typeface="Cambria Math" panose="02040503050406030204" pitchFamily="18" charset="0"/>
+                        </a:rPr>
+                        <m:t>𝑗</m:t>
+                      </m:r>
+                      <m:r>
+                        <a:rPr lang="en-US" sz="1050" b="0" i="1" smtClean="0">
+                          <a:latin typeface="Cambria Math" panose="02040503050406030204" pitchFamily="18" charset="0"/>
+                        </a:rPr>
+                        <m:t>+1</m:t>
+                      </m:r>
+                    </m:oMath>
+                  </m:oMathPara>
+                </a14:m>
+                <a:endParaRPr lang="en-US" sz="1050" dirty="0"/>
+              </a:p>
+            </p:txBody>
+          </p:sp>
+        </mc:Choice>
+        <mc:Fallback>
+          <p:sp>
+            <p:nvSpPr>
+              <p:cNvPr id="53" name="TextBox 52">
+                <a:extLst>
+                  <a:ext uri="{FF2B5EF4-FFF2-40B4-BE49-F238E27FC236}">
+                    <a16:creationId xmlns:a16="http://schemas.microsoft.com/office/drawing/2014/main" id="{BA52F616-807B-00EE-D452-BB6EC867C6F5}"/>
+                  </a:ext>
+                </a:extLst>
+              </p:cNvPr>
+              <p:cNvSpPr txBox="1">
+                <a:spLocks noRot="1" noChangeAspect="1" noMove="1" noResize="1" noEditPoints="1" noAdjustHandles="1" noChangeArrowheads="1" noChangeShapeType="1" noTextEdit="1"/>
+              </p:cNvSpPr>
+              <p:nvPr/>
+            </p:nvSpPr>
+            <p:spPr>
+              <a:xfrm>
+                <a:off x="8441213" y="4177710"/>
+                <a:ext cx="523240" cy="253916"/>
+              </a:xfrm>
+              <a:prstGeom prst="rect">
+                <a:avLst/>
+              </a:prstGeom>
+              <a:blipFill>
+                <a:blip r:embed="rId12"/>
+                <a:stretch>
+                  <a:fillRect b="-4762"/>
+                </a:stretch>
+              </a:blipFill>
+            </p:spPr>
+            <p:txBody>
+              <a:bodyPr/>
+              <a:lstStyle/>
+              <a:p>
+                <a:r>
+                  <a:rPr lang="en-US">
+                    <a:noFill/>
+                  </a:rPr>
+                  <a:t> </a:t>
+                </a:r>
+              </a:p>
+            </p:txBody>
+          </p:sp>
+        </mc:Fallback>
+      </mc:AlternateContent>
     </p:spTree>
     <p:extLst>
       <p:ext uri="{BB962C8B-B14F-4D97-AF65-F5344CB8AC3E}">

</xml_diff>